<commit_message>
updated r-value sec., added timeseries analysis, some slide updates
</commit_message>
<xml_diff>
--- a/Slide_Deck.pptx
+++ b/Slide_Deck.pptx
@@ -5,7 +5,7 @@
     <p:sldMasterId id="2147483648" r:id="rId1"/>
   </p:sldMasterIdLst>
   <p:notesMasterIdLst>
-    <p:notesMasterId r:id="rId17"/>
+    <p:notesMasterId r:id="rId18"/>
   </p:notesMasterIdLst>
   <p:sldIdLst>
     <p:sldId id="256" r:id="rId2"/>
@@ -14,15 +14,16 @@
     <p:sldId id="262" r:id="rId5"/>
     <p:sldId id="263" r:id="rId6"/>
     <p:sldId id="264" r:id="rId7"/>
-    <p:sldId id="261" r:id="rId8"/>
-    <p:sldId id="258" r:id="rId9"/>
-    <p:sldId id="257" r:id="rId10"/>
-    <p:sldId id="265" r:id="rId11"/>
-    <p:sldId id="266" r:id="rId12"/>
-    <p:sldId id="267" r:id="rId13"/>
-    <p:sldId id="268" r:id="rId14"/>
-    <p:sldId id="269" r:id="rId15"/>
-    <p:sldId id="270" r:id="rId16"/>
+    <p:sldId id="271" r:id="rId8"/>
+    <p:sldId id="261" r:id="rId9"/>
+    <p:sldId id="258" r:id="rId10"/>
+    <p:sldId id="257" r:id="rId11"/>
+    <p:sldId id="265" r:id="rId12"/>
+    <p:sldId id="266" r:id="rId13"/>
+    <p:sldId id="267" r:id="rId14"/>
+    <p:sldId id="268" r:id="rId15"/>
+    <p:sldId id="269" r:id="rId16"/>
+    <p:sldId id="270" r:id="rId17"/>
   </p:sldIdLst>
   <p:sldSz cx="12192000" cy="6858000"/>
   <p:notesSz cx="6858000" cy="9144000"/>
@@ -2649,7 +2650,7 @@
           <a:p>
             <a:fld id="{FFFBAEDC-AF75-4BDD-978D-5D83F3B4ECCC}" type="datetimeFigureOut">
               <a:rPr lang="en-US" smtClean="0"/>
-              <a:t>4/5/2023</a:t>
+              <a:t>4/6/2023</a:t>
             </a:fld>
             <a:endParaRPr lang="en-US"/>
           </a:p>
@@ -2981,7 +2982,7 @@
           <a:p>
             <a:fld id="{81877F35-DD72-4AEE-98C4-BACA01E52352}" type="slidenum">
               <a:rPr lang="en-US" smtClean="0"/>
-              <a:t>12</a:t>
+              <a:t>13</a:t>
             </a:fld>
             <a:endParaRPr lang="en-US"/>
           </a:p>
@@ -3065,7 +3066,7 @@
           <a:p>
             <a:fld id="{6624EA6F-41C5-8449-8FBC-886BDC0FF6B4}" type="slidenum">
               <a:rPr lang="en-US" smtClean="0"/>
-              <a:t>15</a:t>
+              <a:t>16</a:t>
             </a:fld>
             <a:endParaRPr lang="en-US"/>
           </a:p>
@@ -3231,7 +3232,7 @@
           <a:p>
             <a:fld id="{F3E3D61B-7364-4AC2-9DB3-C4410285676E}" type="datetimeFigureOut">
               <a:rPr lang="en-US" smtClean="0"/>
-              <a:t>4/5/2023</a:t>
+              <a:t>4/6/2023</a:t>
             </a:fld>
             <a:endParaRPr lang="en-US"/>
           </a:p>
@@ -3429,7 +3430,7 @@
           <a:p>
             <a:fld id="{F3E3D61B-7364-4AC2-9DB3-C4410285676E}" type="datetimeFigureOut">
               <a:rPr lang="en-US" smtClean="0"/>
-              <a:t>4/5/2023</a:t>
+              <a:t>4/6/2023</a:t>
             </a:fld>
             <a:endParaRPr lang="en-US"/>
           </a:p>
@@ -3637,7 +3638,7 @@
           <a:p>
             <a:fld id="{F3E3D61B-7364-4AC2-9DB3-C4410285676E}" type="datetimeFigureOut">
               <a:rPr lang="en-US" smtClean="0"/>
-              <a:t>4/5/2023</a:t>
+              <a:t>4/6/2023</a:t>
             </a:fld>
             <a:endParaRPr lang="en-US"/>
           </a:p>
@@ -3835,7 +3836,7 @@
           <a:p>
             <a:fld id="{F3E3D61B-7364-4AC2-9DB3-C4410285676E}" type="datetimeFigureOut">
               <a:rPr lang="en-US" smtClean="0"/>
-              <a:t>4/5/2023</a:t>
+              <a:t>4/6/2023</a:t>
             </a:fld>
             <a:endParaRPr lang="en-US"/>
           </a:p>
@@ -4110,7 +4111,7 @@
           <a:p>
             <a:fld id="{F3E3D61B-7364-4AC2-9DB3-C4410285676E}" type="datetimeFigureOut">
               <a:rPr lang="en-US" smtClean="0"/>
-              <a:t>4/5/2023</a:t>
+              <a:t>4/6/2023</a:t>
             </a:fld>
             <a:endParaRPr lang="en-US"/>
           </a:p>
@@ -4375,7 +4376,7 @@
           <a:p>
             <a:fld id="{F3E3D61B-7364-4AC2-9DB3-C4410285676E}" type="datetimeFigureOut">
               <a:rPr lang="en-US" smtClean="0"/>
-              <a:t>4/5/2023</a:t>
+              <a:t>4/6/2023</a:t>
             </a:fld>
             <a:endParaRPr lang="en-US"/>
           </a:p>
@@ -4787,7 +4788,7 @@
           <a:p>
             <a:fld id="{F3E3D61B-7364-4AC2-9DB3-C4410285676E}" type="datetimeFigureOut">
               <a:rPr lang="en-US" smtClean="0"/>
-              <a:t>4/5/2023</a:t>
+              <a:t>4/6/2023</a:t>
             </a:fld>
             <a:endParaRPr lang="en-US"/>
           </a:p>
@@ -4928,7 +4929,7 @@
           <a:p>
             <a:fld id="{F3E3D61B-7364-4AC2-9DB3-C4410285676E}" type="datetimeFigureOut">
               <a:rPr lang="en-US" smtClean="0"/>
-              <a:t>4/5/2023</a:t>
+              <a:t>4/6/2023</a:t>
             </a:fld>
             <a:endParaRPr lang="en-US"/>
           </a:p>
@@ -5041,7 +5042,7 @@
           <a:p>
             <a:fld id="{F3E3D61B-7364-4AC2-9DB3-C4410285676E}" type="datetimeFigureOut">
               <a:rPr lang="en-US" smtClean="0"/>
-              <a:t>4/5/2023</a:t>
+              <a:t>4/6/2023</a:t>
             </a:fld>
             <a:endParaRPr lang="en-US"/>
           </a:p>
@@ -5352,7 +5353,7 @@
           <a:p>
             <a:fld id="{F3E3D61B-7364-4AC2-9DB3-C4410285676E}" type="datetimeFigureOut">
               <a:rPr lang="en-US" smtClean="0"/>
-              <a:t>4/5/2023</a:t>
+              <a:t>4/6/2023</a:t>
             </a:fld>
             <a:endParaRPr lang="en-US"/>
           </a:p>
@@ -5640,7 +5641,7 @@
           <a:p>
             <a:fld id="{F3E3D61B-7364-4AC2-9DB3-C4410285676E}" type="datetimeFigureOut">
               <a:rPr lang="en-US" smtClean="0"/>
-              <a:t>4/5/2023</a:t>
+              <a:t>4/6/2023</a:t>
             </a:fld>
             <a:endParaRPr lang="en-US"/>
           </a:p>
@@ -5881,7 +5882,7 @@
           <a:p>
             <a:fld id="{F3E3D61B-7364-4AC2-9DB3-C4410285676E}" type="datetimeFigureOut">
               <a:rPr lang="en-US" smtClean="0"/>
-              <a:t>4/5/2023</a:t>
+              <a:t>4/6/2023</a:t>
             </a:fld>
             <a:endParaRPr lang="en-US"/>
           </a:p>
@@ -6369,6 +6370,756 @@
 <file path=ppt/slides/slide10.xml><?xml version="1.0" encoding="utf-8"?>
 <p:sld xmlns:a="http://schemas.openxmlformats.org/drawingml/2006/main" xmlns:r="http://schemas.openxmlformats.org/officeDocument/2006/relationships" xmlns:p="http://schemas.openxmlformats.org/presentationml/2006/main">
   <p:cSld>
+    <p:bg>
+      <p:bgPr>
+        <a:solidFill>
+          <a:schemeClr val="bg1"/>
+        </a:solidFill>
+        <a:effectLst/>
+      </p:bgPr>
+    </p:bg>
+    <p:spTree>
+      <p:nvGrpSpPr>
+        <p:cNvPr id="1" name=""/>
+        <p:cNvGrpSpPr/>
+        <p:nvPr/>
+      </p:nvGrpSpPr>
+      <p:grpSpPr>
+        <a:xfrm>
+          <a:off x="0" y="0"/>
+          <a:ext cx="0" cy="0"/>
+          <a:chOff x="0" y="0"/>
+          <a:chExt cx="0" cy="0"/>
+        </a:xfrm>
+      </p:grpSpPr>
+      <p:sp useBgFill="1">
+        <p:nvSpPr>
+          <p:cNvPr id="14" name="Rectangle 13">
+            <a:extLst>
+              <a:ext uri="{FF2B5EF4-FFF2-40B4-BE49-F238E27FC236}">
+                <a16:creationId xmlns:a16="http://schemas.microsoft.com/office/drawing/2014/main" id="{115719BB-48A7-4AF4-BB91-DC82E0DF727D}"/>
+              </a:ext>
+              <a:ext uri="{C183D7F6-B498-43B3-948B-1728B52AA6E4}">
+                <adec:decorative xmlns:adec="http://schemas.microsoft.com/office/drawing/2017/decorative" val="1"/>
+              </a:ext>
+            </a:extLst>
+          </p:cNvPr>
+          <p:cNvSpPr>
+            <a:spLocks noGrp="1" noRot="1" noChangeAspect="1" noMove="1" noResize="1" noEditPoints="1" noAdjustHandles="1" noChangeArrowheads="1" noChangeShapeType="1" noTextEdit="1"/>
+          </p:cNvSpPr>
+          <p:nvPr>
+            <p:extLst>
+              <p:ext uri="{386F3935-93C4-4BCD-93E2-E3B085C9AB24}">
+                <p16:designElem xmlns:p16="http://schemas.microsoft.com/office/powerpoint/2015/main" val="1"/>
+              </p:ext>
+            </p:extLst>
+          </p:nvPr>
+        </p:nvSpPr>
+        <p:spPr>
+          <a:xfrm>
+            <a:off x="0" y="0"/>
+            <a:ext cx="12192000" cy="6858000"/>
+          </a:xfrm>
+          <a:prstGeom prst="rect">
+            <a:avLst/>
+          </a:prstGeom>
+          <a:ln>
+            <a:noFill/>
+          </a:ln>
+        </p:spPr>
+        <p:style>
+          <a:lnRef idx="2">
+            <a:schemeClr val="accent1">
+              <a:shade val="50000"/>
+            </a:schemeClr>
+          </a:lnRef>
+          <a:fillRef idx="1">
+            <a:schemeClr val="accent1"/>
+          </a:fillRef>
+          <a:effectRef idx="0">
+            <a:schemeClr val="accent1"/>
+          </a:effectRef>
+          <a:fontRef idx="minor">
+            <a:schemeClr val="lt1"/>
+          </a:fontRef>
+        </p:style>
+        <p:txBody>
+          <a:bodyPr rtlCol="0" anchor="ctr"/>
+          <a:lstStyle/>
+          <a:p>
+            <a:pPr algn="ctr"/>
+            <a:endParaRPr lang="en-US"/>
+          </a:p>
+        </p:txBody>
+      </p:sp>
+      <p:sp useBgFill="1">
+        <p:nvSpPr>
+          <p:cNvPr id="16" name="Freeform: Shape 15">
+            <a:extLst>
+              <a:ext uri="{FF2B5EF4-FFF2-40B4-BE49-F238E27FC236}">
+                <a16:creationId xmlns:a16="http://schemas.microsoft.com/office/drawing/2014/main" id="{10973A55-5440-4A99-B526-B5812E46271E}"/>
+              </a:ext>
+              <a:ext uri="{C183D7F6-B498-43B3-948B-1728B52AA6E4}">
+                <adec:decorative xmlns:adec="http://schemas.microsoft.com/office/drawing/2017/decorative" val="1"/>
+              </a:ext>
+            </a:extLst>
+          </p:cNvPr>
+          <p:cNvSpPr>
+            <a:spLocks noGrp="1" noRot="1" noChangeAspect="1" noMove="1" noResize="1" noEditPoints="1" noAdjustHandles="1" noChangeArrowheads="1" noChangeShapeType="1" noTextEdit="1"/>
+          </p:cNvSpPr>
+          <p:nvPr>
+            <p:extLst>
+              <p:ext uri="{386F3935-93C4-4BCD-93E2-E3B085C9AB24}">
+                <p16:designElem xmlns:p16="http://schemas.microsoft.com/office/powerpoint/2015/main" val="1"/>
+              </p:ext>
+            </p:extLst>
+          </p:nvPr>
+        </p:nvSpPr>
+        <p:spPr>
+          <a:xfrm>
+            <a:off x="-1" y="0"/>
+            <a:ext cx="6096002" cy="6858000"/>
+          </a:xfrm>
+          <a:custGeom>
+            <a:avLst/>
+            <a:gdLst>
+              <a:gd name="connsiteX0" fmla="*/ 0 w 6096002"/>
+              <a:gd name="connsiteY0" fmla="*/ 0 h 6858000"/>
+              <a:gd name="connsiteX1" fmla="*/ 4885967 w 6096002"/>
+              <a:gd name="connsiteY1" fmla="*/ 0 h 6858000"/>
+              <a:gd name="connsiteX2" fmla="*/ 4946007 w 6096002"/>
+              <a:gd name="connsiteY2" fmla="*/ 69271 h 6858000"/>
+              <a:gd name="connsiteX3" fmla="*/ 6096002 w 6096002"/>
+              <a:gd name="connsiteY3" fmla="*/ 3429000 h 6858000"/>
+              <a:gd name="connsiteX4" fmla="*/ 4946007 w 6096002"/>
+              <a:gd name="connsiteY4" fmla="*/ 6788730 h 6858000"/>
+              <a:gd name="connsiteX5" fmla="*/ 4885967 w 6096002"/>
+              <a:gd name="connsiteY5" fmla="*/ 6858000 h 6858000"/>
+              <a:gd name="connsiteX6" fmla="*/ 0 w 6096002"/>
+              <a:gd name="connsiteY6" fmla="*/ 6858000 h 6858000"/>
+            </a:gdLst>
+            <a:ahLst/>
+            <a:cxnLst>
+              <a:cxn ang="0">
+                <a:pos x="connsiteX0" y="connsiteY0"/>
+              </a:cxn>
+              <a:cxn ang="0">
+                <a:pos x="connsiteX1" y="connsiteY1"/>
+              </a:cxn>
+              <a:cxn ang="0">
+                <a:pos x="connsiteX2" y="connsiteY2"/>
+              </a:cxn>
+              <a:cxn ang="0">
+                <a:pos x="connsiteX3" y="connsiteY3"/>
+              </a:cxn>
+              <a:cxn ang="0">
+                <a:pos x="connsiteX4" y="connsiteY4"/>
+              </a:cxn>
+              <a:cxn ang="0">
+                <a:pos x="connsiteX5" y="connsiteY5"/>
+              </a:cxn>
+              <a:cxn ang="0">
+                <a:pos x="connsiteX6" y="connsiteY6"/>
+              </a:cxn>
+            </a:cxnLst>
+            <a:rect l="l" t="t" r="r" b="b"/>
+            <a:pathLst>
+              <a:path w="6096002" h="6858000">
+                <a:moveTo>
+                  <a:pt x="0" y="0"/>
+                </a:moveTo>
+                <a:lnTo>
+                  <a:pt x="4885967" y="0"/>
+                </a:lnTo>
+                <a:lnTo>
+                  <a:pt x="4946007" y="69271"/>
+                </a:lnTo>
+                <a:cubicBezTo>
+                  <a:pt x="5656533" y="929100"/>
+                  <a:pt x="6096002" y="2116944"/>
+                  <a:pt x="6096002" y="3429000"/>
+                </a:cubicBezTo>
+                <a:cubicBezTo>
+                  <a:pt x="6096002" y="4741056"/>
+                  <a:pt x="5656533" y="5928900"/>
+                  <a:pt x="4946007" y="6788730"/>
+                </a:cubicBezTo>
+                <a:lnTo>
+                  <a:pt x="4885967" y="6858000"/>
+                </a:lnTo>
+                <a:lnTo>
+                  <a:pt x="0" y="6858000"/>
+                </a:lnTo>
+                <a:close/>
+              </a:path>
+            </a:pathLst>
+          </a:custGeom>
+          <a:ln w="9525">
+            <a:solidFill>
+              <a:srgbClr val="EFEFEF"/>
+            </a:solidFill>
+          </a:ln>
+          <a:effectLst>
+            <a:outerShdw blurRad="88900" dist="38100" algn="l" rotWithShape="0">
+              <a:schemeClr val="bg1">
+                <a:lumMod val="85000"/>
+                <a:alpha val="50000"/>
+              </a:schemeClr>
+            </a:outerShdw>
+          </a:effectLst>
+        </p:spPr>
+        <p:style>
+          <a:lnRef idx="2">
+            <a:schemeClr val="accent1">
+              <a:shade val="50000"/>
+            </a:schemeClr>
+          </a:lnRef>
+          <a:fillRef idx="1">
+            <a:schemeClr val="accent1"/>
+          </a:fillRef>
+          <a:effectRef idx="0">
+            <a:schemeClr val="accent1"/>
+          </a:effectRef>
+          <a:fontRef idx="minor">
+            <a:schemeClr val="lt1"/>
+          </a:fontRef>
+        </p:style>
+        <p:txBody>
+          <a:bodyPr wrap="square" rtlCol="0" anchor="ctr">
+            <a:noAutofit/>
+          </a:bodyPr>
+          <a:lstStyle/>
+          <a:p>
+            <a:pPr marL="0" marR="0" lvl="0" indent="0" algn="ctr" defTabSz="914400" rtl="0" eaLnBrk="1" fontAlgn="auto" latinLnBrk="0" hangingPunct="1">
+              <a:lnSpc>
+                <a:spcPct val="100000"/>
+              </a:lnSpc>
+              <a:spcBef>
+                <a:spcPts val="0"/>
+              </a:spcBef>
+              <a:spcAft>
+                <a:spcPts val="0"/>
+              </a:spcAft>
+              <a:buClrTx/>
+              <a:buSzTx/>
+              <a:buFontTx/>
+              <a:buNone/>
+              <a:tabLst/>
+              <a:defRPr/>
+            </a:pPr>
+            <a:endParaRPr kumimoji="0" lang="en-US" sz="1800" b="0" i="0" u="none" strike="noStrike" kern="1200" cap="none" spc="0" normalizeH="0" baseline="0" noProof="0">
+              <a:ln>
+                <a:noFill/>
+              </a:ln>
+              <a:solidFill>
+                <a:prstClr val="white"/>
+              </a:solidFill>
+              <a:effectLst/>
+              <a:uLnTx/>
+              <a:uFillTx/>
+              <a:latin typeface="Calibri" panose="020F0502020204030204"/>
+              <a:ea typeface="+mn-ea"/>
+              <a:cs typeface="+mn-cs"/>
+            </a:endParaRPr>
+          </a:p>
+        </p:txBody>
+      </p:sp>
+      <p:sp useBgFill="1">
+        <p:nvSpPr>
+          <p:cNvPr id="18" name="Freeform: Shape 17">
+            <a:extLst>
+              <a:ext uri="{FF2B5EF4-FFF2-40B4-BE49-F238E27FC236}">
+                <a16:creationId xmlns:a16="http://schemas.microsoft.com/office/drawing/2014/main" id="{A9682493-588A-4D52-98F6-FBBD80C07ECB}"/>
+              </a:ext>
+              <a:ext uri="{C183D7F6-B498-43B3-948B-1728B52AA6E4}">
+                <adec:decorative xmlns:adec="http://schemas.microsoft.com/office/drawing/2017/decorative" val="1"/>
+              </a:ext>
+            </a:extLst>
+          </p:cNvPr>
+          <p:cNvSpPr>
+            <a:spLocks noGrp="1" noRot="1" noChangeAspect="1" noMove="1" noResize="1" noEditPoints="1" noAdjustHandles="1" noChangeArrowheads="1" noChangeShapeType="1" noTextEdit="1"/>
+          </p:cNvSpPr>
+          <p:nvPr>
+            <p:extLst>
+              <p:ext uri="{386F3935-93C4-4BCD-93E2-E3B085C9AB24}">
+                <p16:designElem xmlns:p16="http://schemas.microsoft.com/office/powerpoint/2015/main" val="1"/>
+              </p:ext>
+            </p:extLst>
+          </p:nvPr>
+        </p:nvSpPr>
+        <p:spPr>
+          <a:xfrm>
+            <a:off x="0" y="0"/>
+            <a:ext cx="6085370" cy="6858000"/>
+          </a:xfrm>
+          <a:custGeom>
+            <a:avLst/>
+            <a:gdLst>
+              <a:gd name="connsiteX0" fmla="*/ 0 w 6085370"/>
+              <a:gd name="connsiteY0" fmla="*/ 0 h 6858000"/>
+              <a:gd name="connsiteX1" fmla="*/ 4875335 w 6085370"/>
+              <a:gd name="connsiteY1" fmla="*/ 0 h 6858000"/>
+              <a:gd name="connsiteX2" fmla="*/ 4935375 w 6085370"/>
+              <a:gd name="connsiteY2" fmla="*/ 69271 h 6858000"/>
+              <a:gd name="connsiteX3" fmla="*/ 6085370 w 6085370"/>
+              <a:gd name="connsiteY3" fmla="*/ 3429000 h 6858000"/>
+              <a:gd name="connsiteX4" fmla="*/ 4935375 w 6085370"/>
+              <a:gd name="connsiteY4" fmla="*/ 6788730 h 6858000"/>
+              <a:gd name="connsiteX5" fmla="*/ 4875335 w 6085370"/>
+              <a:gd name="connsiteY5" fmla="*/ 6858000 h 6858000"/>
+              <a:gd name="connsiteX6" fmla="*/ 0 w 6085370"/>
+              <a:gd name="connsiteY6" fmla="*/ 6858000 h 6858000"/>
+            </a:gdLst>
+            <a:ahLst/>
+            <a:cxnLst>
+              <a:cxn ang="0">
+                <a:pos x="connsiteX0" y="connsiteY0"/>
+              </a:cxn>
+              <a:cxn ang="0">
+                <a:pos x="connsiteX1" y="connsiteY1"/>
+              </a:cxn>
+              <a:cxn ang="0">
+                <a:pos x="connsiteX2" y="connsiteY2"/>
+              </a:cxn>
+              <a:cxn ang="0">
+                <a:pos x="connsiteX3" y="connsiteY3"/>
+              </a:cxn>
+              <a:cxn ang="0">
+                <a:pos x="connsiteX4" y="connsiteY4"/>
+              </a:cxn>
+              <a:cxn ang="0">
+                <a:pos x="connsiteX5" y="connsiteY5"/>
+              </a:cxn>
+              <a:cxn ang="0">
+                <a:pos x="connsiteX6" y="connsiteY6"/>
+              </a:cxn>
+            </a:cxnLst>
+            <a:rect l="l" t="t" r="r" b="b"/>
+            <a:pathLst>
+              <a:path w="6085370" h="6858000">
+                <a:moveTo>
+                  <a:pt x="0" y="0"/>
+                </a:moveTo>
+                <a:lnTo>
+                  <a:pt x="4875335" y="0"/>
+                </a:lnTo>
+                <a:lnTo>
+                  <a:pt x="4935375" y="69271"/>
+                </a:lnTo>
+                <a:cubicBezTo>
+                  <a:pt x="5645901" y="929100"/>
+                  <a:pt x="6085370" y="2116944"/>
+                  <a:pt x="6085370" y="3429000"/>
+                </a:cubicBezTo>
+                <a:cubicBezTo>
+                  <a:pt x="6085370" y="4741056"/>
+                  <a:pt x="5645901" y="5928900"/>
+                  <a:pt x="4935375" y="6788730"/>
+                </a:cubicBezTo>
+                <a:lnTo>
+                  <a:pt x="4875335" y="6858000"/>
+                </a:lnTo>
+                <a:lnTo>
+                  <a:pt x="0" y="6858000"/>
+                </a:lnTo>
+                <a:close/>
+              </a:path>
+            </a:pathLst>
+          </a:custGeom>
+          <a:ln w="9525">
+            <a:noFill/>
+          </a:ln>
+          <a:effectLst/>
+        </p:spPr>
+        <p:style>
+          <a:lnRef idx="2">
+            <a:schemeClr val="accent1">
+              <a:shade val="50000"/>
+            </a:schemeClr>
+          </a:lnRef>
+          <a:fillRef idx="1">
+            <a:schemeClr val="accent1"/>
+          </a:fillRef>
+          <a:effectRef idx="0">
+            <a:schemeClr val="accent1"/>
+          </a:effectRef>
+          <a:fontRef idx="minor">
+            <a:schemeClr val="lt1"/>
+          </a:fontRef>
+        </p:style>
+        <p:txBody>
+          <a:bodyPr wrap="square" rtlCol="0" anchor="ctr">
+            <a:noAutofit/>
+          </a:bodyPr>
+          <a:lstStyle/>
+          <a:p>
+            <a:pPr marL="0" marR="0" lvl="0" indent="0" algn="ctr" defTabSz="914400" rtl="0" eaLnBrk="1" fontAlgn="auto" latinLnBrk="0" hangingPunct="1">
+              <a:lnSpc>
+                <a:spcPct val="100000"/>
+              </a:lnSpc>
+              <a:spcBef>
+                <a:spcPts val="0"/>
+              </a:spcBef>
+              <a:spcAft>
+                <a:spcPts val="0"/>
+              </a:spcAft>
+              <a:buClrTx/>
+              <a:buSzTx/>
+              <a:buFontTx/>
+              <a:buNone/>
+              <a:tabLst/>
+              <a:defRPr/>
+            </a:pPr>
+            <a:endParaRPr kumimoji="0" lang="en-US" sz="1800" b="0" i="0" u="none" strike="noStrike" kern="1200" cap="none" spc="0" normalizeH="0" baseline="0" noProof="0">
+              <a:ln>
+                <a:noFill/>
+              </a:ln>
+              <a:solidFill>
+                <a:prstClr val="white"/>
+              </a:solidFill>
+              <a:effectLst/>
+              <a:uLnTx/>
+              <a:uFillTx/>
+              <a:latin typeface="Calibri" panose="020F0502020204030204"/>
+              <a:ea typeface="+mn-ea"/>
+              <a:cs typeface="+mn-cs"/>
+            </a:endParaRPr>
+          </a:p>
+        </p:txBody>
+      </p:sp>
+      <p:sp>
+        <p:nvSpPr>
+          <p:cNvPr id="2" name="Title 1">
+            <a:extLst>
+              <a:ext uri="{FF2B5EF4-FFF2-40B4-BE49-F238E27FC236}">
+                <a16:creationId xmlns:a16="http://schemas.microsoft.com/office/drawing/2014/main" id="{AA8476FD-ED7D-33A4-13B0-0560C0D3B77B}"/>
+              </a:ext>
+            </a:extLst>
+          </p:cNvPr>
+          <p:cNvSpPr>
+            <a:spLocks noGrp="1"/>
+          </p:cNvSpPr>
+          <p:nvPr>
+            <p:ph type="title"/>
+          </p:nvPr>
+        </p:nvSpPr>
+        <p:spPr>
+          <a:xfrm>
+            <a:off x="438913" y="859536"/>
+            <a:ext cx="4832802" cy="1170432"/>
+          </a:xfrm>
+        </p:spPr>
+        <p:txBody>
+          <a:bodyPr anchor="b">
+            <a:normAutofit/>
+          </a:bodyPr>
+          <a:lstStyle/>
+          <a:p>
+            <a:r>
+              <a:rPr lang="en-US" sz="3400"/>
+              <a:t>Park Data</a:t>
+            </a:r>
+          </a:p>
+        </p:txBody>
+      </p:sp>
+      <p:sp>
+        <p:nvSpPr>
+          <p:cNvPr id="20" name="Rectangle 19">
+            <a:extLst>
+              <a:ext uri="{FF2B5EF4-FFF2-40B4-BE49-F238E27FC236}">
+                <a16:creationId xmlns:a16="http://schemas.microsoft.com/office/drawing/2014/main" id="{FBEC5A7A-ADE4-48D9-B89C-2BA1C9110632}"/>
+              </a:ext>
+              <a:ext uri="{C183D7F6-B498-43B3-948B-1728B52AA6E4}">
+                <adec:decorative xmlns:adec="http://schemas.microsoft.com/office/drawing/2017/decorative" val="1"/>
+              </a:ext>
+            </a:extLst>
+          </p:cNvPr>
+          <p:cNvSpPr>
+            <a:spLocks noGrp="1" noRot="1" noChangeAspect="1" noMove="1" noResize="1" noEditPoints="1" noAdjustHandles="1" noChangeArrowheads="1" noChangeShapeType="1" noTextEdit="1"/>
+          </p:cNvSpPr>
+          <p:nvPr>
+            <p:extLst>
+              <p:ext uri="{386F3935-93C4-4BCD-93E2-E3B085C9AB24}">
+                <p16:designElem xmlns:p16="http://schemas.microsoft.com/office/powerpoint/2015/main" val="1"/>
+              </p:ext>
+            </p:extLst>
+          </p:nvPr>
+        </p:nvSpPr>
+        <p:spPr>
+          <a:xfrm rot="5400000">
+            <a:off x="703236" y="363389"/>
+            <a:ext cx="73152" cy="548640"/>
+          </a:xfrm>
+          <a:prstGeom prst="rect">
+            <a:avLst/>
+          </a:prstGeom>
+          <a:solidFill>
+            <a:schemeClr val="accent2"/>
+          </a:solidFill>
+          <a:ln>
+            <a:noFill/>
+          </a:ln>
+        </p:spPr>
+        <p:style>
+          <a:lnRef idx="2">
+            <a:schemeClr val="accent1">
+              <a:shade val="50000"/>
+            </a:schemeClr>
+          </a:lnRef>
+          <a:fillRef idx="1">
+            <a:schemeClr val="accent1"/>
+          </a:fillRef>
+          <a:effectRef idx="0">
+            <a:schemeClr val="accent1"/>
+          </a:effectRef>
+          <a:fontRef idx="minor">
+            <a:schemeClr val="lt1"/>
+          </a:fontRef>
+        </p:style>
+        <p:txBody>
+          <a:bodyPr rtlCol="0" anchor="ctr"/>
+          <a:lstStyle/>
+          <a:p>
+            <a:pPr algn="ctr"/>
+            <a:endParaRPr lang="en-US">
+              <a:solidFill>
+                <a:prstClr val="white"/>
+              </a:solidFill>
+              <a:latin typeface="Calibri" panose="020F0502020204030204"/>
+            </a:endParaRPr>
+          </a:p>
+        </p:txBody>
+      </p:sp>
+      <p:sp>
+        <p:nvSpPr>
+          <p:cNvPr id="22" name="Rectangle 21">
+            <a:extLst>
+              <a:ext uri="{FF2B5EF4-FFF2-40B4-BE49-F238E27FC236}">
+                <a16:creationId xmlns:a16="http://schemas.microsoft.com/office/drawing/2014/main" id="{82095FCE-EF05-4443-B97A-85DEE3A5CA17}"/>
+              </a:ext>
+              <a:ext uri="{C183D7F6-B498-43B3-948B-1728B52AA6E4}">
+                <adec:decorative xmlns:adec="http://schemas.microsoft.com/office/drawing/2017/decorative" val="1"/>
+              </a:ext>
+            </a:extLst>
+          </p:cNvPr>
+          <p:cNvSpPr>
+            <a:spLocks noGrp="1" noRot="1" noChangeAspect="1" noMove="1" noResize="1" noEditPoints="1" noAdjustHandles="1" noChangeArrowheads="1" noChangeShapeType="1" noTextEdit="1"/>
+          </p:cNvSpPr>
+          <p:nvPr>
+            <p:extLst>
+              <p:ext uri="{386F3935-93C4-4BCD-93E2-E3B085C9AB24}">
+                <p16:designElem xmlns:p16="http://schemas.microsoft.com/office/powerpoint/2015/main" val="1"/>
+              </p:ext>
+            </p:extLst>
+          </p:nvPr>
+        </p:nvSpPr>
+        <p:spPr>
+          <a:xfrm>
+            <a:off x="465492" y="2185062"/>
+            <a:ext cx="4937760" cy="18288"/>
+          </a:xfrm>
+          <a:prstGeom prst="rect">
+            <a:avLst/>
+          </a:prstGeom>
+          <a:solidFill>
+            <a:srgbClr val="D5D5D5"/>
+          </a:solidFill>
+          <a:ln w="3175">
+            <a:noFill/>
+          </a:ln>
+          <a:effectLst/>
+        </p:spPr>
+        <p:style>
+          <a:lnRef idx="2">
+            <a:schemeClr val="accent1">
+              <a:shade val="50000"/>
+            </a:schemeClr>
+          </a:lnRef>
+          <a:fillRef idx="1">
+            <a:schemeClr val="accent1"/>
+          </a:fillRef>
+          <a:effectRef idx="0">
+            <a:schemeClr val="accent1"/>
+          </a:effectRef>
+          <a:fontRef idx="minor">
+            <a:schemeClr val="lt1"/>
+          </a:fontRef>
+        </p:style>
+        <p:txBody>
+          <a:bodyPr rtlCol="0" anchor="ctr"/>
+          <a:lstStyle/>
+          <a:p>
+            <a:pPr marL="0" marR="0" lvl="0" indent="0" algn="ctr" defTabSz="914400" rtl="0" eaLnBrk="1" fontAlgn="auto" latinLnBrk="0" hangingPunct="1">
+              <a:lnSpc>
+                <a:spcPct val="100000"/>
+              </a:lnSpc>
+              <a:spcBef>
+                <a:spcPts val="0"/>
+              </a:spcBef>
+              <a:spcAft>
+                <a:spcPts val="0"/>
+              </a:spcAft>
+              <a:buClrTx/>
+              <a:buSzTx/>
+              <a:buFontTx/>
+              <a:buNone/>
+              <a:tabLst/>
+              <a:defRPr/>
+            </a:pPr>
+            <a:endParaRPr kumimoji="0" lang="en-US" sz="1800" b="0" i="0" u="none" strike="noStrike" kern="1200" cap="none" spc="0" normalizeH="0" baseline="0" noProof="0">
+              <a:ln>
+                <a:noFill/>
+              </a:ln>
+              <a:solidFill>
+                <a:prstClr val="white"/>
+              </a:solidFill>
+              <a:effectLst/>
+              <a:uLnTx/>
+              <a:uFillTx/>
+              <a:latin typeface="Calibri" panose="020F0502020204030204"/>
+              <a:ea typeface="+mn-ea"/>
+              <a:cs typeface="+mn-cs"/>
+            </a:endParaRPr>
+          </a:p>
+        </p:txBody>
+      </p:sp>
+      <p:sp>
+        <p:nvSpPr>
+          <p:cNvPr id="11" name="Content Placeholder 10">
+            <a:extLst>
+              <a:ext uri="{FF2B5EF4-FFF2-40B4-BE49-F238E27FC236}">
+                <a16:creationId xmlns:a16="http://schemas.microsoft.com/office/drawing/2014/main" id="{D676152A-A8FD-283A-8776-E919A481B5D6}"/>
+              </a:ext>
+            </a:extLst>
+          </p:cNvPr>
+          <p:cNvSpPr>
+            <a:spLocks noGrp="1"/>
+          </p:cNvSpPr>
+          <p:nvPr>
+            <p:ph idx="1"/>
+          </p:nvPr>
+        </p:nvSpPr>
+        <p:spPr>
+          <a:xfrm>
+            <a:off x="438912" y="2512611"/>
+            <a:ext cx="4832803" cy="3664351"/>
+          </a:xfrm>
+        </p:spPr>
+        <p:txBody>
+          <a:bodyPr>
+            <a:normAutofit/>
+          </a:bodyPr>
+          <a:lstStyle/>
+          <a:p>
+            <a:r>
+              <a:rPr lang="en-US" sz="1800" dirty="0"/>
+              <a:t>Radius – 3 km</a:t>
+            </a:r>
+          </a:p>
+          <a:p>
+            <a:endParaRPr lang="en-US" sz="1800" dirty="0"/>
+          </a:p>
+          <a:p>
+            <a:r>
+              <a:rPr lang="en-US" sz="1800" dirty="0"/>
+              <a:t>Golden has A LOT of parks!?</a:t>
+            </a:r>
+          </a:p>
+          <a:p>
+            <a:endParaRPr lang="en-US" sz="1800" dirty="0"/>
+          </a:p>
+          <a:p>
+            <a:r>
+              <a:rPr lang="en-US" sz="1800" dirty="0"/>
+              <a:t>The number of parks does not seem to be strongly correlated to Typical Home Value with a calculated </a:t>
+            </a:r>
+            <a:r>
+              <a:rPr lang="en-US" sz="1800" dirty="0" err="1"/>
+              <a:t>r-value</a:t>
+            </a:r>
+            <a:r>
+              <a:rPr lang="en-US" sz="1800" dirty="0"/>
+              <a:t> of -0.15.</a:t>
+            </a:r>
+          </a:p>
+        </p:txBody>
+      </p:sp>
+      <p:pic>
+        <p:nvPicPr>
+          <p:cNvPr id="5" name="Content Placeholder 4">
+            <a:extLst>
+              <a:ext uri="{FF2B5EF4-FFF2-40B4-BE49-F238E27FC236}">
+                <a16:creationId xmlns:a16="http://schemas.microsoft.com/office/drawing/2014/main" id="{95C03CB6-8288-7A43-1F25-A44047F1C63B}"/>
+              </a:ext>
+            </a:extLst>
+          </p:cNvPr>
+          <p:cNvPicPr>
+            <a:picLocks noChangeAspect="1"/>
+          </p:cNvPicPr>
+          <p:nvPr/>
+        </p:nvPicPr>
+        <p:blipFill>
+          <a:blip r:embed="rId2"/>
+          <a:stretch>
+            <a:fillRect/>
+          </a:stretch>
+        </p:blipFill>
+        <p:spPr>
+          <a:xfrm>
+            <a:off x="5958800" y="294183"/>
+            <a:ext cx="5673876" cy="3134817"/>
+          </a:xfrm>
+          <a:prstGeom prst="rect">
+            <a:avLst/>
+          </a:prstGeom>
+        </p:spPr>
+      </p:pic>
+      <p:pic>
+        <p:nvPicPr>
+          <p:cNvPr id="7" name="Picture 6">
+            <a:extLst>
+              <a:ext uri="{FF2B5EF4-FFF2-40B4-BE49-F238E27FC236}">
+                <a16:creationId xmlns:a16="http://schemas.microsoft.com/office/drawing/2014/main" id="{AA24B2B0-FA19-9793-DC5E-EDF150333B24}"/>
+              </a:ext>
+            </a:extLst>
+          </p:cNvPr>
+          <p:cNvPicPr>
+            <a:picLocks noChangeAspect="1"/>
+          </p:cNvPicPr>
+          <p:nvPr/>
+        </p:nvPicPr>
+        <p:blipFill>
+          <a:blip r:embed="rId3"/>
+          <a:stretch>
+            <a:fillRect/>
+          </a:stretch>
+        </p:blipFill>
+        <p:spPr>
+          <a:xfrm>
+            <a:off x="5823749" y="3341856"/>
+            <a:ext cx="6481373" cy="3516144"/>
+          </a:xfrm>
+          <a:prstGeom prst="rect">
+            <a:avLst/>
+          </a:prstGeom>
+        </p:spPr>
+      </p:pic>
+    </p:spTree>
+    <p:extLst>
+      <p:ext uri="{BB962C8B-B14F-4D97-AF65-F5344CB8AC3E}">
+        <p14:creationId xmlns:p14="http://schemas.microsoft.com/office/powerpoint/2010/main" val="3496206486"/>
+      </p:ext>
+    </p:extLst>
+  </p:cSld>
+  <p:clrMapOvr>
+    <a:masterClrMapping/>
+  </p:clrMapOvr>
+</p:sld>
+</file>
+
+<file path=ppt/slides/slide11.xml><?xml version="1.0" encoding="utf-8"?>
+<p:sld xmlns:a="http://schemas.openxmlformats.org/drawingml/2006/main" xmlns:r="http://schemas.openxmlformats.org/officeDocument/2006/relationships" xmlns:p="http://schemas.openxmlformats.org/presentationml/2006/main">
+  <p:cSld>
     <p:spTree>
       <p:nvGrpSpPr>
         <p:cNvPr id="1" name=""/>
@@ -6647,92 +7398,6 @@
 </p:sld>
 </file>
 
-<file path=ppt/slides/slide11.xml><?xml version="1.0" encoding="utf-8"?>
-<p:sld xmlns:a="http://schemas.openxmlformats.org/drawingml/2006/main" xmlns:r="http://schemas.openxmlformats.org/officeDocument/2006/relationships" xmlns:p="http://schemas.openxmlformats.org/presentationml/2006/main">
-  <p:cSld>
-    <p:spTree>
-      <p:nvGrpSpPr>
-        <p:cNvPr id="1" name=""/>
-        <p:cNvGrpSpPr/>
-        <p:nvPr/>
-      </p:nvGrpSpPr>
-      <p:grpSpPr>
-        <a:xfrm>
-          <a:off x="0" y="0"/>
-          <a:ext cx="0" cy="0"/>
-          <a:chOff x="0" y="0"/>
-          <a:chExt cx="0" cy="0"/>
-        </a:xfrm>
-      </p:grpSpPr>
-      <p:sp>
-        <p:nvSpPr>
-          <p:cNvPr id="2" name="Title 1">
-            <a:extLst>
-              <a:ext uri="{FF2B5EF4-FFF2-40B4-BE49-F238E27FC236}">
-                <a16:creationId xmlns:a16="http://schemas.microsoft.com/office/drawing/2014/main" id="{447A74B5-E0BD-2FE4-073A-CF12653E693A}"/>
-              </a:ext>
-            </a:extLst>
-          </p:cNvPr>
-          <p:cNvSpPr>
-            <a:spLocks noGrp="1"/>
-          </p:cNvSpPr>
-          <p:nvPr>
-            <p:ph type="ctrTitle"/>
-          </p:nvPr>
-        </p:nvSpPr>
-        <p:spPr/>
-        <p:txBody>
-          <a:bodyPr/>
-          <a:lstStyle/>
-          <a:p>
-            <a:r>
-              <a:rPr lang="en-US" dirty="0"/>
-              <a:t>Healthcare</a:t>
-            </a:r>
-          </a:p>
-        </p:txBody>
-      </p:sp>
-      <p:sp>
-        <p:nvSpPr>
-          <p:cNvPr id="3" name="Subtitle 2">
-            <a:extLst>
-              <a:ext uri="{FF2B5EF4-FFF2-40B4-BE49-F238E27FC236}">
-                <a16:creationId xmlns:a16="http://schemas.microsoft.com/office/drawing/2014/main" id="{7123102D-6989-1C1A-E414-43CC96A5F011}"/>
-              </a:ext>
-            </a:extLst>
-          </p:cNvPr>
-          <p:cNvSpPr>
-            <a:spLocks noGrp="1"/>
-          </p:cNvSpPr>
-          <p:nvPr>
-            <p:ph type="subTitle" idx="1"/>
-          </p:nvPr>
-        </p:nvSpPr>
-        <p:spPr/>
-        <p:txBody>
-          <a:bodyPr/>
-          <a:lstStyle/>
-          <a:p>
-            <a:r>
-              <a:rPr lang="en-US" dirty="0"/>
-              <a:t>does the number of hospitals in a city impact home pricing  </a:t>
-            </a:r>
-          </a:p>
-        </p:txBody>
-      </p:sp>
-    </p:spTree>
-    <p:extLst>
-      <p:ext uri="{BB962C8B-B14F-4D97-AF65-F5344CB8AC3E}">
-        <p14:creationId xmlns:p14="http://schemas.microsoft.com/office/powerpoint/2010/main" val="3783998158"/>
-      </p:ext>
-    </p:extLst>
-  </p:cSld>
-  <p:clrMapOvr>
-    <a:masterClrMapping/>
-  </p:clrMapOvr>
-</p:sld>
-</file>
-
 <file path=ppt/slides/slide12.xml><?xml version="1.0" encoding="utf-8"?>
 <p:sld xmlns:a="http://schemas.openxmlformats.org/drawingml/2006/main" xmlns:r="http://schemas.openxmlformats.org/officeDocument/2006/relationships" xmlns:p="http://schemas.openxmlformats.org/presentationml/2006/main">
   <p:cSld>
@@ -6755,6 +7420,92 @@
           <p:cNvPr id="2" name="Title 1">
             <a:extLst>
               <a:ext uri="{FF2B5EF4-FFF2-40B4-BE49-F238E27FC236}">
+                <a16:creationId xmlns:a16="http://schemas.microsoft.com/office/drawing/2014/main" id="{447A74B5-E0BD-2FE4-073A-CF12653E693A}"/>
+              </a:ext>
+            </a:extLst>
+          </p:cNvPr>
+          <p:cNvSpPr>
+            <a:spLocks noGrp="1"/>
+          </p:cNvSpPr>
+          <p:nvPr>
+            <p:ph type="ctrTitle"/>
+          </p:nvPr>
+        </p:nvSpPr>
+        <p:spPr/>
+        <p:txBody>
+          <a:bodyPr/>
+          <a:lstStyle/>
+          <a:p>
+            <a:r>
+              <a:rPr lang="en-US" dirty="0"/>
+              <a:t>Healthcare</a:t>
+            </a:r>
+          </a:p>
+        </p:txBody>
+      </p:sp>
+      <p:sp>
+        <p:nvSpPr>
+          <p:cNvPr id="3" name="Subtitle 2">
+            <a:extLst>
+              <a:ext uri="{FF2B5EF4-FFF2-40B4-BE49-F238E27FC236}">
+                <a16:creationId xmlns:a16="http://schemas.microsoft.com/office/drawing/2014/main" id="{7123102D-6989-1C1A-E414-43CC96A5F011}"/>
+              </a:ext>
+            </a:extLst>
+          </p:cNvPr>
+          <p:cNvSpPr>
+            <a:spLocks noGrp="1"/>
+          </p:cNvSpPr>
+          <p:nvPr>
+            <p:ph type="subTitle" idx="1"/>
+          </p:nvPr>
+        </p:nvSpPr>
+        <p:spPr/>
+        <p:txBody>
+          <a:bodyPr/>
+          <a:lstStyle/>
+          <a:p>
+            <a:r>
+              <a:rPr lang="en-US" dirty="0"/>
+              <a:t>does the number of hospitals in a city impact home pricing  </a:t>
+            </a:r>
+          </a:p>
+        </p:txBody>
+      </p:sp>
+    </p:spTree>
+    <p:extLst>
+      <p:ext uri="{BB962C8B-B14F-4D97-AF65-F5344CB8AC3E}">
+        <p14:creationId xmlns:p14="http://schemas.microsoft.com/office/powerpoint/2010/main" val="3783998158"/>
+      </p:ext>
+    </p:extLst>
+  </p:cSld>
+  <p:clrMapOvr>
+    <a:masterClrMapping/>
+  </p:clrMapOvr>
+</p:sld>
+</file>
+
+<file path=ppt/slides/slide13.xml><?xml version="1.0" encoding="utf-8"?>
+<p:sld xmlns:a="http://schemas.openxmlformats.org/drawingml/2006/main" xmlns:r="http://schemas.openxmlformats.org/officeDocument/2006/relationships" xmlns:p="http://schemas.openxmlformats.org/presentationml/2006/main">
+  <p:cSld>
+    <p:spTree>
+      <p:nvGrpSpPr>
+        <p:cNvPr id="1" name=""/>
+        <p:cNvGrpSpPr/>
+        <p:nvPr/>
+      </p:nvGrpSpPr>
+      <p:grpSpPr>
+        <a:xfrm>
+          <a:off x="0" y="0"/>
+          <a:ext cx="0" cy="0"/>
+          <a:chOff x="0" y="0"/>
+          <a:chExt cx="0" cy="0"/>
+        </a:xfrm>
+      </p:grpSpPr>
+      <p:sp>
+        <p:nvSpPr>
+          <p:cNvPr id="2" name="Title 1">
+            <a:extLst>
+              <a:ext uri="{FF2B5EF4-FFF2-40B4-BE49-F238E27FC236}">
                 <a16:creationId xmlns:a16="http://schemas.microsoft.com/office/drawing/2014/main" id="{56A84AA6-A35E-2415-4EA5-FFCBD6455B89}"/>
               </a:ext>
             </a:extLst>
@@ -6919,7 +7670,7 @@
 </p:sld>
 </file>
 
-<file path=ppt/slides/slide13.xml><?xml version="1.0" encoding="utf-8"?>
+<file path=ppt/slides/slide14.xml><?xml version="1.0" encoding="utf-8"?>
 <p:sld xmlns:a="http://schemas.openxmlformats.org/drawingml/2006/main" xmlns:r="http://schemas.openxmlformats.org/officeDocument/2006/relationships" xmlns:p="http://schemas.openxmlformats.org/presentationml/2006/main">
   <p:cSld>
     <p:spTree>
@@ -7021,7 +7772,7 @@
 </p:sld>
 </file>
 
-<file path=ppt/slides/slide14.xml><?xml version="1.0" encoding="utf-8"?>
+<file path=ppt/slides/slide15.xml><?xml version="1.0" encoding="utf-8"?>
 <p:sld xmlns:a="http://schemas.openxmlformats.org/drawingml/2006/main" xmlns:r="http://schemas.openxmlformats.org/officeDocument/2006/relationships" xmlns:p="http://schemas.openxmlformats.org/presentationml/2006/main">
   <p:cSld>
     <p:spTree>
@@ -7255,7 +8006,7 @@
 </p:sld>
 </file>
 
-<file path=ppt/slides/slide15.xml><?xml version="1.0" encoding="utf-8"?>
+<file path=ppt/slides/slide16.xml><?xml version="1.0" encoding="utf-8"?>
 <p:sld xmlns:a="http://schemas.openxmlformats.org/drawingml/2006/main" xmlns:r="http://schemas.openxmlformats.org/officeDocument/2006/relationships" xmlns:p="http://schemas.openxmlformats.org/presentationml/2006/main">
   <p:cSld>
     <p:spTree>
@@ -7587,7 +8338,7 @@
                 <a:effectLst/>
                 <a:latin typeface="Roboto" panose="02000000000000000000" pitchFamily="2" charset="0"/>
               </a:rPr>
-              <a:t>data collection &amp; cleanup,</a:t>
+              <a:t>data collection &amp; cleanup</a:t>
             </a:r>
             <a:endParaRPr lang="en-US" dirty="0"/>
           </a:p>
@@ -8939,6 +9690,146 @@
           <p:cNvPr id="2" name="Title 1">
             <a:extLst>
               <a:ext uri="{FF2B5EF4-FFF2-40B4-BE49-F238E27FC236}">
+                <a16:creationId xmlns:a16="http://schemas.microsoft.com/office/drawing/2014/main" id="{2AFDFEE9-944D-FDA7-0A0A-534143B71004}"/>
+              </a:ext>
+            </a:extLst>
+          </p:cNvPr>
+          <p:cNvSpPr>
+            <a:spLocks noGrp="1"/>
+          </p:cNvSpPr>
+          <p:nvPr>
+            <p:ph type="title"/>
+          </p:nvPr>
+        </p:nvSpPr>
+        <p:spPr/>
+        <p:txBody>
+          <a:bodyPr/>
+          <a:lstStyle/>
+          <a:p>
+            <a:r>
+              <a:rPr lang="en-US" b="0" i="0" dirty="0">
+                <a:solidFill>
+                  <a:srgbClr val="2B2B2B"/>
+                </a:solidFill>
+                <a:effectLst/>
+                <a:latin typeface="Roboto" panose="02000000000000000000" pitchFamily="2" charset="0"/>
+              </a:rPr>
+              <a:t>data collection &amp; cleanup</a:t>
+            </a:r>
+            <a:endParaRPr lang="en-US" dirty="0"/>
+          </a:p>
+        </p:txBody>
+      </p:sp>
+      <p:sp>
+        <p:nvSpPr>
+          <p:cNvPr id="3" name="Content Placeholder 2">
+            <a:extLst>
+              <a:ext uri="{FF2B5EF4-FFF2-40B4-BE49-F238E27FC236}">
+                <a16:creationId xmlns:a16="http://schemas.microsoft.com/office/drawing/2014/main" id="{D615F34F-1593-E2D2-F512-143B6061ADB6}"/>
+              </a:ext>
+            </a:extLst>
+          </p:cNvPr>
+          <p:cNvSpPr>
+            <a:spLocks noGrp="1"/>
+          </p:cNvSpPr>
+          <p:nvPr>
+            <p:ph idx="1"/>
+          </p:nvPr>
+        </p:nvSpPr>
+        <p:spPr/>
+        <p:txBody>
+          <a:bodyPr/>
+          <a:lstStyle/>
+          <a:p>
+            <a:r>
+              <a:rPr lang="en-US" dirty="0"/>
+              <a:t>After getting the typical home value for 19 Colorado cities, we used </a:t>
+            </a:r>
+            <a:r>
+              <a:rPr lang="en-US" dirty="0" err="1"/>
+              <a:t>Geoapify</a:t>
+            </a:r>
+            <a:r>
+              <a:rPr lang="en-US" dirty="0"/>
+              <a:t> to get coordinates for each city</a:t>
+            </a:r>
+          </a:p>
+          <a:p>
+            <a:endParaRPr lang="en-US" dirty="0"/>
+          </a:p>
+          <a:p>
+            <a:r>
+              <a:rPr lang="en-US" dirty="0"/>
+              <a:t>Using the </a:t>
+            </a:r>
+            <a:r>
+              <a:rPr lang="en-US" dirty="0" err="1"/>
+              <a:t>coords</a:t>
+            </a:r>
+            <a:r>
+              <a:rPr lang="en-US" dirty="0"/>
+              <a:t> for each city, we explored the different categories on the </a:t>
+            </a:r>
+            <a:r>
+              <a:rPr lang="en-US" dirty="0" err="1"/>
+              <a:t>Geoapify</a:t>
+            </a:r>
+            <a:r>
+              <a:rPr lang="en-US" dirty="0"/>
+              <a:t> Places API</a:t>
+            </a:r>
+          </a:p>
+          <a:p>
+            <a:pPr lvl="1"/>
+            <a:r>
+              <a:rPr lang="en-US" dirty="0"/>
+              <a:t>How many of each feature is within x radius from city</a:t>
+            </a:r>
+          </a:p>
+          <a:p>
+            <a:pPr lvl="1"/>
+            <a:r>
+              <a:rPr lang="en-US" dirty="0"/>
+              <a:t>How does this relate to home value?</a:t>
+            </a:r>
+          </a:p>
+        </p:txBody>
+      </p:sp>
+    </p:spTree>
+    <p:extLst>
+      <p:ext uri="{BB962C8B-B14F-4D97-AF65-F5344CB8AC3E}">
+        <p14:creationId xmlns:p14="http://schemas.microsoft.com/office/powerpoint/2010/main" val="2427319144"/>
+      </p:ext>
+    </p:extLst>
+  </p:cSld>
+  <p:clrMapOvr>
+    <a:masterClrMapping/>
+  </p:clrMapOvr>
+</p:sld>
+</file>
+
+<file path=ppt/slides/slide8.xml><?xml version="1.0" encoding="utf-8"?>
+<p:sld xmlns:a="http://schemas.openxmlformats.org/drawingml/2006/main" xmlns:r="http://schemas.openxmlformats.org/officeDocument/2006/relationships" xmlns:p="http://schemas.openxmlformats.org/presentationml/2006/main">
+  <p:cSld>
+    <p:spTree>
+      <p:nvGrpSpPr>
+        <p:cNvPr id="1" name=""/>
+        <p:cNvGrpSpPr/>
+        <p:nvPr/>
+      </p:nvGrpSpPr>
+      <p:grpSpPr>
+        <a:xfrm>
+          <a:off x="0" y="0"/>
+          <a:ext cx="0" cy="0"/>
+          <a:chOff x="0" y="0"/>
+          <a:chExt cx="0" cy="0"/>
+        </a:xfrm>
+      </p:grpSpPr>
+      <p:sp>
+        <p:nvSpPr>
+          <p:cNvPr id="2" name="Title 1">
+            <a:extLst>
+              <a:ext uri="{FF2B5EF4-FFF2-40B4-BE49-F238E27FC236}">
                 <a16:creationId xmlns:a16="http://schemas.microsoft.com/office/drawing/2014/main" id="{8DBD18E2-3EDD-11CD-035E-587B93AE4143}"/>
               </a:ext>
             </a:extLst>
@@ -9080,7 +9971,7 @@
 </p:sld>
 </file>
 
-<file path=ppt/slides/slide8.xml><?xml version="1.0" encoding="utf-8"?>
+<file path=ppt/slides/slide9.xml><?xml version="1.0" encoding="utf-8"?>
 <p:sld xmlns:a="http://schemas.openxmlformats.org/drawingml/2006/main" xmlns:r="http://schemas.openxmlformats.org/officeDocument/2006/relationships" xmlns:p="http://schemas.openxmlformats.org/presentationml/2006/main">
   <p:cSld>
     <p:bg>
@@ -9820,756 +10711,6 @@
     <p:extLst>
       <p:ext uri="{BB962C8B-B14F-4D97-AF65-F5344CB8AC3E}">
         <p14:creationId xmlns:p14="http://schemas.microsoft.com/office/powerpoint/2010/main" val="500679354"/>
-      </p:ext>
-    </p:extLst>
-  </p:cSld>
-  <p:clrMapOvr>
-    <a:masterClrMapping/>
-  </p:clrMapOvr>
-</p:sld>
-</file>
-
-<file path=ppt/slides/slide9.xml><?xml version="1.0" encoding="utf-8"?>
-<p:sld xmlns:a="http://schemas.openxmlformats.org/drawingml/2006/main" xmlns:r="http://schemas.openxmlformats.org/officeDocument/2006/relationships" xmlns:p="http://schemas.openxmlformats.org/presentationml/2006/main">
-  <p:cSld>
-    <p:bg>
-      <p:bgPr>
-        <a:solidFill>
-          <a:schemeClr val="bg1"/>
-        </a:solidFill>
-        <a:effectLst/>
-      </p:bgPr>
-    </p:bg>
-    <p:spTree>
-      <p:nvGrpSpPr>
-        <p:cNvPr id="1" name=""/>
-        <p:cNvGrpSpPr/>
-        <p:nvPr/>
-      </p:nvGrpSpPr>
-      <p:grpSpPr>
-        <a:xfrm>
-          <a:off x="0" y="0"/>
-          <a:ext cx="0" cy="0"/>
-          <a:chOff x="0" y="0"/>
-          <a:chExt cx="0" cy="0"/>
-        </a:xfrm>
-      </p:grpSpPr>
-      <p:sp useBgFill="1">
-        <p:nvSpPr>
-          <p:cNvPr id="14" name="Rectangle 13">
-            <a:extLst>
-              <a:ext uri="{FF2B5EF4-FFF2-40B4-BE49-F238E27FC236}">
-                <a16:creationId xmlns:a16="http://schemas.microsoft.com/office/drawing/2014/main" id="{115719BB-48A7-4AF4-BB91-DC82E0DF727D}"/>
-              </a:ext>
-              <a:ext uri="{C183D7F6-B498-43B3-948B-1728B52AA6E4}">
-                <adec:decorative xmlns:adec="http://schemas.microsoft.com/office/drawing/2017/decorative" val="1"/>
-              </a:ext>
-            </a:extLst>
-          </p:cNvPr>
-          <p:cNvSpPr>
-            <a:spLocks noGrp="1" noRot="1" noChangeAspect="1" noMove="1" noResize="1" noEditPoints="1" noAdjustHandles="1" noChangeArrowheads="1" noChangeShapeType="1" noTextEdit="1"/>
-          </p:cNvSpPr>
-          <p:nvPr>
-            <p:extLst>
-              <p:ext uri="{386F3935-93C4-4BCD-93E2-E3B085C9AB24}">
-                <p16:designElem xmlns:p16="http://schemas.microsoft.com/office/powerpoint/2015/main" val="1"/>
-              </p:ext>
-            </p:extLst>
-          </p:nvPr>
-        </p:nvSpPr>
-        <p:spPr>
-          <a:xfrm>
-            <a:off x="0" y="0"/>
-            <a:ext cx="12192000" cy="6858000"/>
-          </a:xfrm>
-          <a:prstGeom prst="rect">
-            <a:avLst/>
-          </a:prstGeom>
-          <a:ln>
-            <a:noFill/>
-          </a:ln>
-        </p:spPr>
-        <p:style>
-          <a:lnRef idx="2">
-            <a:schemeClr val="accent1">
-              <a:shade val="50000"/>
-            </a:schemeClr>
-          </a:lnRef>
-          <a:fillRef idx="1">
-            <a:schemeClr val="accent1"/>
-          </a:fillRef>
-          <a:effectRef idx="0">
-            <a:schemeClr val="accent1"/>
-          </a:effectRef>
-          <a:fontRef idx="minor">
-            <a:schemeClr val="lt1"/>
-          </a:fontRef>
-        </p:style>
-        <p:txBody>
-          <a:bodyPr rtlCol="0" anchor="ctr"/>
-          <a:lstStyle/>
-          <a:p>
-            <a:pPr algn="ctr"/>
-            <a:endParaRPr lang="en-US"/>
-          </a:p>
-        </p:txBody>
-      </p:sp>
-      <p:sp useBgFill="1">
-        <p:nvSpPr>
-          <p:cNvPr id="16" name="Freeform: Shape 15">
-            <a:extLst>
-              <a:ext uri="{FF2B5EF4-FFF2-40B4-BE49-F238E27FC236}">
-                <a16:creationId xmlns:a16="http://schemas.microsoft.com/office/drawing/2014/main" id="{10973A55-5440-4A99-B526-B5812E46271E}"/>
-              </a:ext>
-              <a:ext uri="{C183D7F6-B498-43B3-948B-1728B52AA6E4}">
-                <adec:decorative xmlns:adec="http://schemas.microsoft.com/office/drawing/2017/decorative" val="1"/>
-              </a:ext>
-            </a:extLst>
-          </p:cNvPr>
-          <p:cNvSpPr>
-            <a:spLocks noGrp="1" noRot="1" noChangeAspect="1" noMove="1" noResize="1" noEditPoints="1" noAdjustHandles="1" noChangeArrowheads="1" noChangeShapeType="1" noTextEdit="1"/>
-          </p:cNvSpPr>
-          <p:nvPr>
-            <p:extLst>
-              <p:ext uri="{386F3935-93C4-4BCD-93E2-E3B085C9AB24}">
-                <p16:designElem xmlns:p16="http://schemas.microsoft.com/office/powerpoint/2015/main" val="1"/>
-              </p:ext>
-            </p:extLst>
-          </p:nvPr>
-        </p:nvSpPr>
-        <p:spPr>
-          <a:xfrm>
-            <a:off x="-1" y="0"/>
-            <a:ext cx="6096002" cy="6858000"/>
-          </a:xfrm>
-          <a:custGeom>
-            <a:avLst/>
-            <a:gdLst>
-              <a:gd name="connsiteX0" fmla="*/ 0 w 6096002"/>
-              <a:gd name="connsiteY0" fmla="*/ 0 h 6858000"/>
-              <a:gd name="connsiteX1" fmla="*/ 4885967 w 6096002"/>
-              <a:gd name="connsiteY1" fmla="*/ 0 h 6858000"/>
-              <a:gd name="connsiteX2" fmla="*/ 4946007 w 6096002"/>
-              <a:gd name="connsiteY2" fmla="*/ 69271 h 6858000"/>
-              <a:gd name="connsiteX3" fmla="*/ 6096002 w 6096002"/>
-              <a:gd name="connsiteY3" fmla="*/ 3429000 h 6858000"/>
-              <a:gd name="connsiteX4" fmla="*/ 4946007 w 6096002"/>
-              <a:gd name="connsiteY4" fmla="*/ 6788730 h 6858000"/>
-              <a:gd name="connsiteX5" fmla="*/ 4885967 w 6096002"/>
-              <a:gd name="connsiteY5" fmla="*/ 6858000 h 6858000"/>
-              <a:gd name="connsiteX6" fmla="*/ 0 w 6096002"/>
-              <a:gd name="connsiteY6" fmla="*/ 6858000 h 6858000"/>
-            </a:gdLst>
-            <a:ahLst/>
-            <a:cxnLst>
-              <a:cxn ang="0">
-                <a:pos x="connsiteX0" y="connsiteY0"/>
-              </a:cxn>
-              <a:cxn ang="0">
-                <a:pos x="connsiteX1" y="connsiteY1"/>
-              </a:cxn>
-              <a:cxn ang="0">
-                <a:pos x="connsiteX2" y="connsiteY2"/>
-              </a:cxn>
-              <a:cxn ang="0">
-                <a:pos x="connsiteX3" y="connsiteY3"/>
-              </a:cxn>
-              <a:cxn ang="0">
-                <a:pos x="connsiteX4" y="connsiteY4"/>
-              </a:cxn>
-              <a:cxn ang="0">
-                <a:pos x="connsiteX5" y="connsiteY5"/>
-              </a:cxn>
-              <a:cxn ang="0">
-                <a:pos x="connsiteX6" y="connsiteY6"/>
-              </a:cxn>
-            </a:cxnLst>
-            <a:rect l="l" t="t" r="r" b="b"/>
-            <a:pathLst>
-              <a:path w="6096002" h="6858000">
-                <a:moveTo>
-                  <a:pt x="0" y="0"/>
-                </a:moveTo>
-                <a:lnTo>
-                  <a:pt x="4885967" y="0"/>
-                </a:lnTo>
-                <a:lnTo>
-                  <a:pt x="4946007" y="69271"/>
-                </a:lnTo>
-                <a:cubicBezTo>
-                  <a:pt x="5656533" y="929100"/>
-                  <a:pt x="6096002" y="2116944"/>
-                  <a:pt x="6096002" y="3429000"/>
-                </a:cubicBezTo>
-                <a:cubicBezTo>
-                  <a:pt x="6096002" y="4741056"/>
-                  <a:pt x="5656533" y="5928900"/>
-                  <a:pt x="4946007" y="6788730"/>
-                </a:cubicBezTo>
-                <a:lnTo>
-                  <a:pt x="4885967" y="6858000"/>
-                </a:lnTo>
-                <a:lnTo>
-                  <a:pt x="0" y="6858000"/>
-                </a:lnTo>
-                <a:close/>
-              </a:path>
-            </a:pathLst>
-          </a:custGeom>
-          <a:ln w="9525">
-            <a:solidFill>
-              <a:srgbClr val="EFEFEF"/>
-            </a:solidFill>
-          </a:ln>
-          <a:effectLst>
-            <a:outerShdw blurRad="88900" dist="38100" algn="l" rotWithShape="0">
-              <a:schemeClr val="bg1">
-                <a:lumMod val="85000"/>
-                <a:alpha val="50000"/>
-              </a:schemeClr>
-            </a:outerShdw>
-          </a:effectLst>
-        </p:spPr>
-        <p:style>
-          <a:lnRef idx="2">
-            <a:schemeClr val="accent1">
-              <a:shade val="50000"/>
-            </a:schemeClr>
-          </a:lnRef>
-          <a:fillRef idx="1">
-            <a:schemeClr val="accent1"/>
-          </a:fillRef>
-          <a:effectRef idx="0">
-            <a:schemeClr val="accent1"/>
-          </a:effectRef>
-          <a:fontRef idx="minor">
-            <a:schemeClr val="lt1"/>
-          </a:fontRef>
-        </p:style>
-        <p:txBody>
-          <a:bodyPr wrap="square" rtlCol="0" anchor="ctr">
-            <a:noAutofit/>
-          </a:bodyPr>
-          <a:lstStyle/>
-          <a:p>
-            <a:pPr marL="0" marR="0" lvl="0" indent="0" algn="ctr" defTabSz="914400" rtl="0" eaLnBrk="1" fontAlgn="auto" latinLnBrk="0" hangingPunct="1">
-              <a:lnSpc>
-                <a:spcPct val="100000"/>
-              </a:lnSpc>
-              <a:spcBef>
-                <a:spcPts val="0"/>
-              </a:spcBef>
-              <a:spcAft>
-                <a:spcPts val="0"/>
-              </a:spcAft>
-              <a:buClrTx/>
-              <a:buSzTx/>
-              <a:buFontTx/>
-              <a:buNone/>
-              <a:tabLst/>
-              <a:defRPr/>
-            </a:pPr>
-            <a:endParaRPr kumimoji="0" lang="en-US" sz="1800" b="0" i="0" u="none" strike="noStrike" kern="1200" cap="none" spc="0" normalizeH="0" baseline="0" noProof="0">
-              <a:ln>
-                <a:noFill/>
-              </a:ln>
-              <a:solidFill>
-                <a:prstClr val="white"/>
-              </a:solidFill>
-              <a:effectLst/>
-              <a:uLnTx/>
-              <a:uFillTx/>
-              <a:latin typeface="Calibri" panose="020F0502020204030204"/>
-              <a:ea typeface="+mn-ea"/>
-              <a:cs typeface="+mn-cs"/>
-            </a:endParaRPr>
-          </a:p>
-        </p:txBody>
-      </p:sp>
-      <p:sp useBgFill="1">
-        <p:nvSpPr>
-          <p:cNvPr id="18" name="Freeform: Shape 17">
-            <a:extLst>
-              <a:ext uri="{FF2B5EF4-FFF2-40B4-BE49-F238E27FC236}">
-                <a16:creationId xmlns:a16="http://schemas.microsoft.com/office/drawing/2014/main" id="{A9682493-588A-4D52-98F6-FBBD80C07ECB}"/>
-              </a:ext>
-              <a:ext uri="{C183D7F6-B498-43B3-948B-1728B52AA6E4}">
-                <adec:decorative xmlns:adec="http://schemas.microsoft.com/office/drawing/2017/decorative" val="1"/>
-              </a:ext>
-            </a:extLst>
-          </p:cNvPr>
-          <p:cNvSpPr>
-            <a:spLocks noGrp="1" noRot="1" noChangeAspect="1" noMove="1" noResize="1" noEditPoints="1" noAdjustHandles="1" noChangeArrowheads="1" noChangeShapeType="1" noTextEdit="1"/>
-          </p:cNvSpPr>
-          <p:nvPr>
-            <p:extLst>
-              <p:ext uri="{386F3935-93C4-4BCD-93E2-E3B085C9AB24}">
-                <p16:designElem xmlns:p16="http://schemas.microsoft.com/office/powerpoint/2015/main" val="1"/>
-              </p:ext>
-            </p:extLst>
-          </p:nvPr>
-        </p:nvSpPr>
-        <p:spPr>
-          <a:xfrm>
-            <a:off x="0" y="0"/>
-            <a:ext cx="6085370" cy="6858000"/>
-          </a:xfrm>
-          <a:custGeom>
-            <a:avLst/>
-            <a:gdLst>
-              <a:gd name="connsiteX0" fmla="*/ 0 w 6085370"/>
-              <a:gd name="connsiteY0" fmla="*/ 0 h 6858000"/>
-              <a:gd name="connsiteX1" fmla="*/ 4875335 w 6085370"/>
-              <a:gd name="connsiteY1" fmla="*/ 0 h 6858000"/>
-              <a:gd name="connsiteX2" fmla="*/ 4935375 w 6085370"/>
-              <a:gd name="connsiteY2" fmla="*/ 69271 h 6858000"/>
-              <a:gd name="connsiteX3" fmla="*/ 6085370 w 6085370"/>
-              <a:gd name="connsiteY3" fmla="*/ 3429000 h 6858000"/>
-              <a:gd name="connsiteX4" fmla="*/ 4935375 w 6085370"/>
-              <a:gd name="connsiteY4" fmla="*/ 6788730 h 6858000"/>
-              <a:gd name="connsiteX5" fmla="*/ 4875335 w 6085370"/>
-              <a:gd name="connsiteY5" fmla="*/ 6858000 h 6858000"/>
-              <a:gd name="connsiteX6" fmla="*/ 0 w 6085370"/>
-              <a:gd name="connsiteY6" fmla="*/ 6858000 h 6858000"/>
-            </a:gdLst>
-            <a:ahLst/>
-            <a:cxnLst>
-              <a:cxn ang="0">
-                <a:pos x="connsiteX0" y="connsiteY0"/>
-              </a:cxn>
-              <a:cxn ang="0">
-                <a:pos x="connsiteX1" y="connsiteY1"/>
-              </a:cxn>
-              <a:cxn ang="0">
-                <a:pos x="connsiteX2" y="connsiteY2"/>
-              </a:cxn>
-              <a:cxn ang="0">
-                <a:pos x="connsiteX3" y="connsiteY3"/>
-              </a:cxn>
-              <a:cxn ang="0">
-                <a:pos x="connsiteX4" y="connsiteY4"/>
-              </a:cxn>
-              <a:cxn ang="0">
-                <a:pos x="connsiteX5" y="connsiteY5"/>
-              </a:cxn>
-              <a:cxn ang="0">
-                <a:pos x="connsiteX6" y="connsiteY6"/>
-              </a:cxn>
-            </a:cxnLst>
-            <a:rect l="l" t="t" r="r" b="b"/>
-            <a:pathLst>
-              <a:path w="6085370" h="6858000">
-                <a:moveTo>
-                  <a:pt x="0" y="0"/>
-                </a:moveTo>
-                <a:lnTo>
-                  <a:pt x="4875335" y="0"/>
-                </a:lnTo>
-                <a:lnTo>
-                  <a:pt x="4935375" y="69271"/>
-                </a:lnTo>
-                <a:cubicBezTo>
-                  <a:pt x="5645901" y="929100"/>
-                  <a:pt x="6085370" y="2116944"/>
-                  <a:pt x="6085370" y="3429000"/>
-                </a:cubicBezTo>
-                <a:cubicBezTo>
-                  <a:pt x="6085370" y="4741056"/>
-                  <a:pt x="5645901" y="5928900"/>
-                  <a:pt x="4935375" y="6788730"/>
-                </a:cubicBezTo>
-                <a:lnTo>
-                  <a:pt x="4875335" y="6858000"/>
-                </a:lnTo>
-                <a:lnTo>
-                  <a:pt x="0" y="6858000"/>
-                </a:lnTo>
-                <a:close/>
-              </a:path>
-            </a:pathLst>
-          </a:custGeom>
-          <a:ln w="9525">
-            <a:noFill/>
-          </a:ln>
-          <a:effectLst/>
-        </p:spPr>
-        <p:style>
-          <a:lnRef idx="2">
-            <a:schemeClr val="accent1">
-              <a:shade val="50000"/>
-            </a:schemeClr>
-          </a:lnRef>
-          <a:fillRef idx="1">
-            <a:schemeClr val="accent1"/>
-          </a:fillRef>
-          <a:effectRef idx="0">
-            <a:schemeClr val="accent1"/>
-          </a:effectRef>
-          <a:fontRef idx="minor">
-            <a:schemeClr val="lt1"/>
-          </a:fontRef>
-        </p:style>
-        <p:txBody>
-          <a:bodyPr wrap="square" rtlCol="0" anchor="ctr">
-            <a:noAutofit/>
-          </a:bodyPr>
-          <a:lstStyle/>
-          <a:p>
-            <a:pPr marL="0" marR="0" lvl="0" indent="0" algn="ctr" defTabSz="914400" rtl="0" eaLnBrk="1" fontAlgn="auto" latinLnBrk="0" hangingPunct="1">
-              <a:lnSpc>
-                <a:spcPct val="100000"/>
-              </a:lnSpc>
-              <a:spcBef>
-                <a:spcPts val="0"/>
-              </a:spcBef>
-              <a:spcAft>
-                <a:spcPts val="0"/>
-              </a:spcAft>
-              <a:buClrTx/>
-              <a:buSzTx/>
-              <a:buFontTx/>
-              <a:buNone/>
-              <a:tabLst/>
-              <a:defRPr/>
-            </a:pPr>
-            <a:endParaRPr kumimoji="0" lang="en-US" sz="1800" b="0" i="0" u="none" strike="noStrike" kern="1200" cap="none" spc="0" normalizeH="0" baseline="0" noProof="0">
-              <a:ln>
-                <a:noFill/>
-              </a:ln>
-              <a:solidFill>
-                <a:prstClr val="white"/>
-              </a:solidFill>
-              <a:effectLst/>
-              <a:uLnTx/>
-              <a:uFillTx/>
-              <a:latin typeface="Calibri" panose="020F0502020204030204"/>
-              <a:ea typeface="+mn-ea"/>
-              <a:cs typeface="+mn-cs"/>
-            </a:endParaRPr>
-          </a:p>
-        </p:txBody>
-      </p:sp>
-      <p:sp>
-        <p:nvSpPr>
-          <p:cNvPr id="2" name="Title 1">
-            <a:extLst>
-              <a:ext uri="{FF2B5EF4-FFF2-40B4-BE49-F238E27FC236}">
-                <a16:creationId xmlns:a16="http://schemas.microsoft.com/office/drawing/2014/main" id="{AA8476FD-ED7D-33A4-13B0-0560C0D3B77B}"/>
-              </a:ext>
-            </a:extLst>
-          </p:cNvPr>
-          <p:cNvSpPr>
-            <a:spLocks noGrp="1"/>
-          </p:cNvSpPr>
-          <p:nvPr>
-            <p:ph type="title"/>
-          </p:nvPr>
-        </p:nvSpPr>
-        <p:spPr>
-          <a:xfrm>
-            <a:off x="438913" y="859536"/>
-            <a:ext cx="4832802" cy="1170432"/>
-          </a:xfrm>
-        </p:spPr>
-        <p:txBody>
-          <a:bodyPr anchor="b">
-            <a:normAutofit/>
-          </a:bodyPr>
-          <a:lstStyle/>
-          <a:p>
-            <a:r>
-              <a:rPr lang="en-US" sz="3400"/>
-              <a:t>Park Data</a:t>
-            </a:r>
-          </a:p>
-        </p:txBody>
-      </p:sp>
-      <p:sp>
-        <p:nvSpPr>
-          <p:cNvPr id="20" name="Rectangle 19">
-            <a:extLst>
-              <a:ext uri="{FF2B5EF4-FFF2-40B4-BE49-F238E27FC236}">
-                <a16:creationId xmlns:a16="http://schemas.microsoft.com/office/drawing/2014/main" id="{FBEC5A7A-ADE4-48D9-B89C-2BA1C9110632}"/>
-              </a:ext>
-              <a:ext uri="{C183D7F6-B498-43B3-948B-1728B52AA6E4}">
-                <adec:decorative xmlns:adec="http://schemas.microsoft.com/office/drawing/2017/decorative" val="1"/>
-              </a:ext>
-            </a:extLst>
-          </p:cNvPr>
-          <p:cNvSpPr>
-            <a:spLocks noGrp="1" noRot="1" noChangeAspect="1" noMove="1" noResize="1" noEditPoints="1" noAdjustHandles="1" noChangeArrowheads="1" noChangeShapeType="1" noTextEdit="1"/>
-          </p:cNvSpPr>
-          <p:nvPr>
-            <p:extLst>
-              <p:ext uri="{386F3935-93C4-4BCD-93E2-E3B085C9AB24}">
-                <p16:designElem xmlns:p16="http://schemas.microsoft.com/office/powerpoint/2015/main" val="1"/>
-              </p:ext>
-            </p:extLst>
-          </p:nvPr>
-        </p:nvSpPr>
-        <p:spPr>
-          <a:xfrm rot="5400000">
-            <a:off x="703236" y="363389"/>
-            <a:ext cx="73152" cy="548640"/>
-          </a:xfrm>
-          <a:prstGeom prst="rect">
-            <a:avLst/>
-          </a:prstGeom>
-          <a:solidFill>
-            <a:schemeClr val="accent2"/>
-          </a:solidFill>
-          <a:ln>
-            <a:noFill/>
-          </a:ln>
-        </p:spPr>
-        <p:style>
-          <a:lnRef idx="2">
-            <a:schemeClr val="accent1">
-              <a:shade val="50000"/>
-            </a:schemeClr>
-          </a:lnRef>
-          <a:fillRef idx="1">
-            <a:schemeClr val="accent1"/>
-          </a:fillRef>
-          <a:effectRef idx="0">
-            <a:schemeClr val="accent1"/>
-          </a:effectRef>
-          <a:fontRef idx="minor">
-            <a:schemeClr val="lt1"/>
-          </a:fontRef>
-        </p:style>
-        <p:txBody>
-          <a:bodyPr rtlCol="0" anchor="ctr"/>
-          <a:lstStyle/>
-          <a:p>
-            <a:pPr algn="ctr"/>
-            <a:endParaRPr lang="en-US">
-              <a:solidFill>
-                <a:prstClr val="white"/>
-              </a:solidFill>
-              <a:latin typeface="Calibri" panose="020F0502020204030204"/>
-            </a:endParaRPr>
-          </a:p>
-        </p:txBody>
-      </p:sp>
-      <p:sp>
-        <p:nvSpPr>
-          <p:cNvPr id="22" name="Rectangle 21">
-            <a:extLst>
-              <a:ext uri="{FF2B5EF4-FFF2-40B4-BE49-F238E27FC236}">
-                <a16:creationId xmlns:a16="http://schemas.microsoft.com/office/drawing/2014/main" id="{82095FCE-EF05-4443-B97A-85DEE3A5CA17}"/>
-              </a:ext>
-              <a:ext uri="{C183D7F6-B498-43B3-948B-1728B52AA6E4}">
-                <adec:decorative xmlns:adec="http://schemas.microsoft.com/office/drawing/2017/decorative" val="1"/>
-              </a:ext>
-            </a:extLst>
-          </p:cNvPr>
-          <p:cNvSpPr>
-            <a:spLocks noGrp="1" noRot="1" noChangeAspect="1" noMove="1" noResize="1" noEditPoints="1" noAdjustHandles="1" noChangeArrowheads="1" noChangeShapeType="1" noTextEdit="1"/>
-          </p:cNvSpPr>
-          <p:nvPr>
-            <p:extLst>
-              <p:ext uri="{386F3935-93C4-4BCD-93E2-E3B085C9AB24}">
-                <p16:designElem xmlns:p16="http://schemas.microsoft.com/office/powerpoint/2015/main" val="1"/>
-              </p:ext>
-            </p:extLst>
-          </p:nvPr>
-        </p:nvSpPr>
-        <p:spPr>
-          <a:xfrm>
-            <a:off x="465492" y="2185062"/>
-            <a:ext cx="4937760" cy="18288"/>
-          </a:xfrm>
-          <a:prstGeom prst="rect">
-            <a:avLst/>
-          </a:prstGeom>
-          <a:solidFill>
-            <a:srgbClr val="D5D5D5"/>
-          </a:solidFill>
-          <a:ln w="3175">
-            <a:noFill/>
-          </a:ln>
-          <a:effectLst/>
-        </p:spPr>
-        <p:style>
-          <a:lnRef idx="2">
-            <a:schemeClr val="accent1">
-              <a:shade val="50000"/>
-            </a:schemeClr>
-          </a:lnRef>
-          <a:fillRef idx="1">
-            <a:schemeClr val="accent1"/>
-          </a:fillRef>
-          <a:effectRef idx="0">
-            <a:schemeClr val="accent1"/>
-          </a:effectRef>
-          <a:fontRef idx="minor">
-            <a:schemeClr val="lt1"/>
-          </a:fontRef>
-        </p:style>
-        <p:txBody>
-          <a:bodyPr rtlCol="0" anchor="ctr"/>
-          <a:lstStyle/>
-          <a:p>
-            <a:pPr marL="0" marR="0" lvl="0" indent="0" algn="ctr" defTabSz="914400" rtl="0" eaLnBrk="1" fontAlgn="auto" latinLnBrk="0" hangingPunct="1">
-              <a:lnSpc>
-                <a:spcPct val="100000"/>
-              </a:lnSpc>
-              <a:spcBef>
-                <a:spcPts val="0"/>
-              </a:spcBef>
-              <a:spcAft>
-                <a:spcPts val="0"/>
-              </a:spcAft>
-              <a:buClrTx/>
-              <a:buSzTx/>
-              <a:buFontTx/>
-              <a:buNone/>
-              <a:tabLst/>
-              <a:defRPr/>
-            </a:pPr>
-            <a:endParaRPr kumimoji="0" lang="en-US" sz="1800" b="0" i="0" u="none" strike="noStrike" kern="1200" cap="none" spc="0" normalizeH="0" baseline="0" noProof="0">
-              <a:ln>
-                <a:noFill/>
-              </a:ln>
-              <a:solidFill>
-                <a:prstClr val="white"/>
-              </a:solidFill>
-              <a:effectLst/>
-              <a:uLnTx/>
-              <a:uFillTx/>
-              <a:latin typeface="Calibri" panose="020F0502020204030204"/>
-              <a:ea typeface="+mn-ea"/>
-              <a:cs typeface="+mn-cs"/>
-            </a:endParaRPr>
-          </a:p>
-        </p:txBody>
-      </p:sp>
-      <p:sp>
-        <p:nvSpPr>
-          <p:cNvPr id="11" name="Content Placeholder 10">
-            <a:extLst>
-              <a:ext uri="{FF2B5EF4-FFF2-40B4-BE49-F238E27FC236}">
-                <a16:creationId xmlns:a16="http://schemas.microsoft.com/office/drawing/2014/main" id="{D676152A-A8FD-283A-8776-E919A481B5D6}"/>
-              </a:ext>
-            </a:extLst>
-          </p:cNvPr>
-          <p:cNvSpPr>
-            <a:spLocks noGrp="1"/>
-          </p:cNvSpPr>
-          <p:nvPr>
-            <p:ph idx="1"/>
-          </p:nvPr>
-        </p:nvSpPr>
-        <p:spPr>
-          <a:xfrm>
-            <a:off x="438912" y="2512611"/>
-            <a:ext cx="4832803" cy="3664351"/>
-          </a:xfrm>
-        </p:spPr>
-        <p:txBody>
-          <a:bodyPr>
-            <a:normAutofit/>
-          </a:bodyPr>
-          <a:lstStyle/>
-          <a:p>
-            <a:r>
-              <a:rPr lang="en-US" sz="1800" dirty="0"/>
-              <a:t>Radius – 3 km</a:t>
-            </a:r>
-          </a:p>
-          <a:p>
-            <a:endParaRPr lang="en-US" sz="1800" dirty="0"/>
-          </a:p>
-          <a:p>
-            <a:r>
-              <a:rPr lang="en-US" sz="1800" dirty="0"/>
-              <a:t>Golden has A LOT of parks!?</a:t>
-            </a:r>
-          </a:p>
-          <a:p>
-            <a:endParaRPr lang="en-US" sz="1800" dirty="0"/>
-          </a:p>
-          <a:p>
-            <a:r>
-              <a:rPr lang="en-US" sz="1800" dirty="0"/>
-              <a:t>The number of parks does not seem to be strongly correlated to Typical Home Value with a calculated </a:t>
-            </a:r>
-            <a:r>
-              <a:rPr lang="en-US" sz="1800" dirty="0" err="1"/>
-              <a:t>r-value</a:t>
-            </a:r>
-            <a:r>
-              <a:rPr lang="en-US" sz="1800" dirty="0"/>
-              <a:t> of -0.15.</a:t>
-            </a:r>
-          </a:p>
-        </p:txBody>
-      </p:sp>
-      <p:pic>
-        <p:nvPicPr>
-          <p:cNvPr id="5" name="Content Placeholder 4">
-            <a:extLst>
-              <a:ext uri="{FF2B5EF4-FFF2-40B4-BE49-F238E27FC236}">
-                <a16:creationId xmlns:a16="http://schemas.microsoft.com/office/drawing/2014/main" id="{95C03CB6-8288-7A43-1F25-A44047F1C63B}"/>
-              </a:ext>
-            </a:extLst>
-          </p:cNvPr>
-          <p:cNvPicPr>
-            <a:picLocks noChangeAspect="1"/>
-          </p:cNvPicPr>
-          <p:nvPr/>
-        </p:nvPicPr>
-        <p:blipFill>
-          <a:blip r:embed="rId2"/>
-          <a:stretch>
-            <a:fillRect/>
-          </a:stretch>
-        </p:blipFill>
-        <p:spPr>
-          <a:xfrm>
-            <a:off x="5958800" y="294183"/>
-            <a:ext cx="5673876" cy="3134817"/>
-          </a:xfrm>
-          <a:prstGeom prst="rect">
-            <a:avLst/>
-          </a:prstGeom>
-        </p:spPr>
-      </p:pic>
-      <p:pic>
-        <p:nvPicPr>
-          <p:cNvPr id="7" name="Picture 6">
-            <a:extLst>
-              <a:ext uri="{FF2B5EF4-FFF2-40B4-BE49-F238E27FC236}">
-                <a16:creationId xmlns:a16="http://schemas.microsoft.com/office/drawing/2014/main" id="{AA24B2B0-FA19-9793-DC5E-EDF150333B24}"/>
-              </a:ext>
-            </a:extLst>
-          </p:cNvPr>
-          <p:cNvPicPr>
-            <a:picLocks noChangeAspect="1"/>
-          </p:cNvPicPr>
-          <p:nvPr/>
-        </p:nvPicPr>
-        <p:blipFill>
-          <a:blip r:embed="rId3"/>
-          <a:stretch>
-            <a:fillRect/>
-          </a:stretch>
-        </p:blipFill>
-        <p:spPr>
-          <a:xfrm>
-            <a:off x="5823749" y="3341856"/>
-            <a:ext cx="6481373" cy="3516144"/>
-          </a:xfrm>
-          <a:prstGeom prst="rect">
-            <a:avLst/>
-          </a:prstGeom>
-        </p:spPr>
-      </p:pic>
-    </p:spTree>
-    <p:extLst>
-      <p:ext uri="{BB962C8B-B14F-4D97-AF65-F5344CB8AC3E}">
-        <p14:creationId xmlns:p14="http://schemas.microsoft.com/office/powerpoint/2010/main" val="3496206486"/>
       </p:ext>
     </p:extLst>
   </p:cSld>

</xml_diff>

<commit_message>
updated slide deck to be more cohesive, updated realestate_main with my code
</commit_message>
<xml_diff>
--- a/Slide_Deck.pptx
+++ b/Slide_Deck.pptx
@@ -5,7 +5,7 @@
     <p:sldMasterId id="2147483648" r:id="rId1"/>
   </p:sldMasterIdLst>
   <p:notesMasterIdLst>
-    <p:notesMasterId r:id="rId19"/>
+    <p:notesMasterId r:id="rId23"/>
   </p:notesMasterIdLst>
   <p:sldIdLst>
     <p:sldId id="256" r:id="rId2"/>
@@ -19,12 +19,16 @@
     <p:sldId id="258" r:id="rId10"/>
     <p:sldId id="273" r:id="rId11"/>
     <p:sldId id="257" r:id="rId12"/>
-    <p:sldId id="265" r:id="rId13"/>
-    <p:sldId id="266" r:id="rId14"/>
-    <p:sldId id="267" r:id="rId15"/>
-    <p:sldId id="268" r:id="rId16"/>
-    <p:sldId id="269" r:id="rId17"/>
-    <p:sldId id="270" r:id="rId18"/>
+    <p:sldId id="276" r:id="rId13"/>
+    <p:sldId id="265" r:id="rId14"/>
+    <p:sldId id="266" r:id="rId15"/>
+    <p:sldId id="277" r:id="rId16"/>
+    <p:sldId id="267" r:id="rId17"/>
+    <p:sldId id="268" r:id="rId18"/>
+    <p:sldId id="278" r:id="rId19"/>
+    <p:sldId id="269" r:id="rId20"/>
+    <p:sldId id="279" r:id="rId21"/>
+    <p:sldId id="270" r:id="rId22"/>
   </p:sldIdLst>
   <p:sldSz cx="12192000" cy="6858000"/>
   <p:notesSz cx="6858000" cy="9144000"/>
@@ -5449,7 +5453,7 @@
           <a:p>
             <a:fld id="{FFFBAEDC-AF75-4BDD-978D-5D83F3B4ECCC}" type="datetimeFigureOut">
               <a:rPr lang="en-US" smtClean="0"/>
-              <a:t>4/6/2023</a:t>
+              <a:t>4/6/23</a:t>
             </a:fld>
             <a:endParaRPr lang="en-US"/>
           </a:p>
@@ -5781,7 +5785,7 @@
           <a:p>
             <a:fld id="{81877F35-DD72-4AEE-98C4-BACA01E52352}" type="slidenum">
               <a:rPr lang="en-US" smtClean="0"/>
-              <a:t>14</a:t>
+              <a:t>16</a:t>
             </a:fld>
             <a:endParaRPr lang="en-US"/>
           </a:p>
@@ -5865,7 +5869,7 @@
           <a:p>
             <a:fld id="{6624EA6F-41C5-8449-8FBC-886BDC0FF6B4}" type="slidenum">
               <a:rPr lang="en-US" smtClean="0"/>
-              <a:t>17</a:t>
+              <a:t>21</a:t>
             </a:fld>
             <a:endParaRPr lang="en-US"/>
           </a:p>
@@ -6031,7 +6035,7 @@
           <a:p>
             <a:fld id="{F3E3D61B-7364-4AC2-9DB3-C4410285676E}" type="datetimeFigureOut">
               <a:rPr lang="en-US" smtClean="0"/>
-              <a:t>4/6/2023</a:t>
+              <a:t>4/6/23</a:t>
             </a:fld>
             <a:endParaRPr lang="en-US"/>
           </a:p>
@@ -6229,7 +6233,7 @@
           <a:p>
             <a:fld id="{F3E3D61B-7364-4AC2-9DB3-C4410285676E}" type="datetimeFigureOut">
               <a:rPr lang="en-US" smtClean="0"/>
-              <a:t>4/6/2023</a:t>
+              <a:t>4/6/23</a:t>
             </a:fld>
             <a:endParaRPr lang="en-US"/>
           </a:p>
@@ -6437,7 +6441,7 @@
           <a:p>
             <a:fld id="{F3E3D61B-7364-4AC2-9DB3-C4410285676E}" type="datetimeFigureOut">
               <a:rPr lang="en-US" smtClean="0"/>
-              <a:t>4/6/2023</a:t>
+              <a:t>4/6/23</a:t>
             </a:fld>
             <a:endParaRPr lang="en-US"/>
           </a:p>
@@ -6635,7 +6639,7 @@
           <a:p>
             <a:fld id="{F3E3D61B-7364-4AC2-9DB3-C4410285676E}" type="datetimeFigureOut">
               <a:rPr lang="en-US" smtClean="0"/>
-              <a:t>4/6/2023</a:t>
+              <a:t>4/6/23</a:t>
             </a:fld>
             <a:endParaRPr lang="en-US"/>
           </a:p>
@@ -6910,7 +6914,7 @@
           <a:p>
             <a:fld id="{F3E3D61B-7364-4AC2-9DB3-C4410285676E}" type="datetimeFigureOut">
               <a:rPr lang="en-US" smtClean="0"/>
-              <a:t>4/6/2023</a:t>
+              <a:t>4/6/23</a:t>
             </a:fld>
             <a:endParaRPr lang="en-US"/>
           </a:p>
@@ -7175,7 +7179,7 @@
           <a:p>
             <a:fld id="{F3E3D61B-7364-4AC2-9DB3-C4410285676E}" type="datetimeFigureOut">
               <a:rPr lang="en-US" smtClean="0"/>
-              <a:t>4/6/2023</a:t>
+              <a:t>4/6/23</a:t>
             </a:fld>
             <a:endParaRPr lang="en-US"/>
           </a:p>
@@ -7587,7 +7591,7 @@
           <a:p>
             <a:fld id="{F3E3D61B-7364-4AC2-9DB3-C4410285676E}" type="datetimeFigureOut">
               <a:rPr lang="en-US" smtClean="0"/>
-              <a:t>4/6/2023</a:t>
+              <a:t>4/6/23</a:t>
             </a:fld>
             <a:endParaRPr lang="en-US"/>
           </a:p>
@@ -7728,7 +7732,7 @@
           <a:p>
             <a:fld id="{F3E3D61B-7364-4AC2-9DB3-C4410285676E}" type="datetimeFigureOut">
               <a:rPr lang="en-US" smtClean="0"/>
-              <a:t>4/6/2023</a:t>
+              <a:t>4/6/23</a:t>
             </a:fld>
             <a:endParaRPr lang="en-US"/>
           </a:p>
@@ -7841,7 +7845,7 @@
           <a:p>
             <a:fld id="{F3E3D61B-7364-4AC2-9DB3-C4410285676E}" type="datetimeFigureOut">
               <a:rPr lang="en-US" smtClean="0"/>
-              <a:t>4/6/2023</a:t>
+              <a:t>4/6/23</a:t>
             </a:fld>
             <a:endParaRPr lang="en-US"/>
           </a:p>
@@ -8152,7 +8156,7 @@
           <a:p>
             <a:fld id="{F3E3D61B-7364-4AC2-9DB3-C4410285676E}" type="datetimeFigureOut">
               <a:rPr lang="en-US" smtClean="0"/>
-              <a:t>4/6/2023</a:t>
+              <a:t>4/6/23</a:t>
             </a:fld>
             <a:endParaRPr lang="en-US"/>
           </a:p>
@@ -8440,7 +8444,7 @@
           <a:p>
             <a:fld id="{F3E3D61B-7364-4AC2-9DB3-C4410285676E}" type="datetimeFigureOut">
               <a:rPr lang="en-US" smtClean="0"/>
-              <a:t>4/6/2023</a:t>
+              <a:t>4/6/23</a:t>
             </a:fld>
             <a:endParaRPr lang="en-US"/>
           </a:p>
@@ -8681,7 +8685,7 @@
           <a:p>
             <a:fld id="{F3E3D61B-7364-4AC2-9DB3-C4410285676E}" type="datetimeFigureOut">
               <a:rPr lang="en-US" smtClean="0"/>
-              <a:t>4/6/2023</a:t>
+              <a:t>4/6/23</a:t>
             </a:fld>
             <a:endParaRPr lang="en-US"/>
           </a:p>
@@ -12537,16 +12541,15 @@
           </p:cNvPicPr>
           <p:nvPr/>
         </p:nvPicPr>
-        <p:blipFill>
+        <p:blipFill rotWithShape="1">
           <a:blip r:embed="rId2"/>
-          <a:stretch>
-            <a:fillRect/>
-          </a:stretch>
+          <a:srcRect l="8625" r="11269"/>
+          <a:stretch/>
         </p:blipFill>
         <p:spPr>
           <a:xfrm>
-            <a:off x="5958800" y="294183"/>
-            <a:ext cx="5673876" cy="3134817"/>
+            <a:off x="6539946" y="2385"/>
+            <a:ext cx="4840356" cy="3338460"/>
           </a:xfrm>
           <a:prstGeom prst="rect">
             <a:avLst/>
@@ -12567,16 +12570,15 @@
           </p:cNvPicPr>
           <p:nvPr/>
         </p:nvPicPr>
-        <p:blipFill>
+        <p:blipFill rotWithShape="1">
           <a:blip r:embed="rId3"/>
-          <a:stretch>
-            <a:fillRect/>
-          </a:stretch>
+          <a:srcRect l="8366" r="17350"/>
+          <a:stretch/>
         </p:blipFill>
         <p:spPr>
           <a:xfrm>
-            <a:off x="5823749" y="3341856"/>
-            <a:ext cx="6481373" cy="3516144"/>
+            <a:off x="6483626" y="3249528"/>
+            <a:ext cx="4936435" cy="3605076"/>
           </a:xfrm>
           <a:prstGeom prst="rect">
             <a:avLst/>
@@ -12598,6 +12600,798 @@
 
 <file path=ppt/slides/slide12.xml><?xml version="1.0" encoding="utf-8"?>
 <p:sld xmlns:a="http://schemas.openxmlformats.org/drawingml/2006/main" xmlns:r="http://schemas.openxmlformats.org/officeDocument/2006/relationships" xmlns:p="http://schemas.openxmlformats.org/presentationml/2006/main">
+  <p:cSld>
+    <p:bg>
+      <p:bgPr>
+        <a:solidFill>
+          <a:schemeClr val="bg1"/>
+        </a:solidFill>
+        <a:effectLst/>
+      </p:bgPr>
+    </p:bg>
+    <p:spTree>
+      <p:nvGrpSpPr>
+        <p:cNvPr id="1" name=""/>
+        <p:cNvGrpSpPr/>
+        <p:nvPr/>
+      </p:nvGrpSpPr>
+      <p:grpSpPr>
+        <a:xfrm>
+          <a:off x="0" y="0"/>
+          <a:ext cx="0" cy="0"/>
+          <a:chOff x="0" y="0"/>
+          <a:chExt cx="0" cy="0"/>
+        </a:xfrm>
+      </p:grpSpPr>
+      <p:sp useBgFill="1">
+        <p:nvSpPr>
+          <p:cNvPr id="14" name="Rectangle 13">
+            <a:extLst>
+              <a:ext uri="{FF2B5EF4-FFF2-40B4-BE49-F238E27FC236}">
+                <a16:creationId xmlns:a16="http://schemas.microsoft.com/office/drawing/2014/main" id="{115719BB-48A7-4AF4-BB91-DC82E0DF727D}"/>
+              </a:ext>
+              <a:ext uri="{C183D7F6-B498-43B3-948B-1728B52AA6E4}">
+                <adec:decorative xmlns:adec="http://schemas.microsoft.com/office/drawing/2017/decorative" val="1"/>
+              </a:ext>
+            </a:extLst>
+          </p:cNvPr>
+          <p:cNvSpPr>
+            <a:spLocks noGrp="1" noRot="1" noChangeAspect="1" noMove="1" noResize="1" noEditPoints="1" noAdjustHandles="1" noChangeArrowheads="1" noChangeShapeType="1" noTextEdit="1"/>
+          </p:cNvSpPr>
+          <p:nvPr>
+            <p:extLst>
+              <p:ext uri="{386F3935-93C4-4BCD-93E2-E3B085C9AB24}">
+                <p16:designElem xmlns:p16="http://schemas.microsoft.com/office/powerpoint/2015/main" val="1"/>
+              </p:ext>
+            </p:extLst>
+          </p:nvPr>
+        </p:nvSpPr>
+        <p:spPr>
+          <a:xfrm>
+            <a:off x="0" y="0"/>
+            <a:ext cx="12192000" cy="6858000"/>
+          </a:xfrm>
+          <a:prstGeom prst="rect">
+            <a:avLst/>
+          </a:prstGeom>
+          <a:ln>
+            <a:noFill/>
+          </a:ln>
+        </p:spPr>
+        <p:style>
+          <a:lnRef idx="2">
+            <a:schemeClr val="accent1">
+              <a:shade val="50000"/>
+            </a:schemeClr>
+          </a:lnRef>
+          <a:fillRef idx="1">
+            <a:schemeClr val="accent1"/>
+          </a:fillRef>
+          <a:effectRef idx="0">
+            <a:schemeClr val="accent1"/>
+          </a:effectRef>
+          <a:fontRef idx="minor">
+            <a:schemeClr val="lt1"/>
+          </a:fontRef>
+        </p:style>
+        <p:txBody>
+          <a:bodyPr rtlCol="0" anchor="ctr"/>
+          <a:lstStyle/>
+          <a:p>
+            <a:pPr algn="ctr"/>
+            <a:endParaRPr lang="en-US"/>
+          </a:p>
+        </p:txBody>
+      </p:sp>
+      <p:sp useBgFill="1">
+        <p:nvSpPr>
+          <p:cNvPr id="16" name="Freeform: Shape 15">
+            <a:extLst>
+              <a:ext uri="{FF2B5EF4-FFF2-40B4-BE49-F238E27FC236}">
+                <a16:creationId xmlns:a16="http://schemas.microsoft.com/office/drawing/2014/main" id="{10973A55-5440-4A99-B526-B5812E46271E}"/>
+              </a:ext>
+              <a:ext uri="{C183D7F6-B498-43B3-948B-1728B52AA6E4}">
+                <adec:decorative xmlns:adec="http://schemas.microsoft.com/office/drawing/2017/decorative" val="1"/>
+              </a:ext>
+            </a:extLst>
+          </p:cNvPr>
+          <p:cNvSpPr>
+            <a:spLocks noGrp="1" noRot="1" noChangeAspect="1" noMove="1" noResize="1" noEditPoints="1" noAdjustHandles="1" noChangeArrowheads="1" noChangeShapeType="1" noTextEdit="1"/>
+          </p:cNvSpPr>
+          <p:nvPr>
+            <p:extLst>
+              <p:ext uri="{386F3935-93C4-4BCD-93E2-E3B085C9AB24}">
+                <p16:designElem xmlns:p16="http://schemas.microsoft.com/office/powerpoint/2015/main" val="1"/>
+              </p:ext>
+            </p:extLst>
+          </p:nvPr>
+        </p:nvSpPr>
+        <p:spPr>
+          <a:xfrm>
+            <a:off x="-1" y="0"/>
+            <a:ext cx="6096002" cy="6858000"/>
+          </a:xfrm>
+          <a:custGeom>
+            <a:avLst/>
+            <a:gdLst>
+              <a:gd name="connsiteX0" fmla="*/ 0 w 6096002"/>
+              <a:gd name="connsiteY0" fmla="*/ 0 h 6858000"/>
+              <a:gd name="connsiteX1" fmla="*/ 4885967 w 6096002"/>
+              <a:gd name="connsiteY1" fmla="*/ 0 h 6858000"/>
+              <a:gd name="connsiteX2" fmla="*/ 4946007 w 6096002"/>
+              <a:gd name="connsiteY2" fmla="*/ 69271 h 6858000"/>
+              <a:gd name="connsiteX3" fmla="*/ 6096002 w 6096002"/>
+              <a:gd name="connsiteY3" fmla="*/ 3429000 h 6858000"/>
+              <a:gd name="connsiteX4" fmla="*/ 4946007 w 6096002"/>
+              <a:gd name="connsiteY4" fmla="*/ 6788730 h 6858000"/>
+              <a:gd name="connsiteX5" fmla="*/ 4885967 w 6096002"/>
+              <a:gd name="connsiteY5" fmla="*/ 6858000 h 6858000"/>
+              <a:gd name="connsiteX6" fmla="*/ 0 w 6096002"/>
+              <a:gd name="connsiteY6" fmla="*/ 6858000 h 6858000"/>
+            </a:gdLst>
+            <a:ahLst/>
+            <a:cxnLst>
+              <a:cxn ang="0">
+                <a:pos x="connsiteX0" y="connsiteY0"/>
+              </a:cxn>
+              <a:cxn ang="0">
+                <a:pos x="connsiteX1" y="connsiteY1"/>
+              </a:cxn>
+              <a:cxn ang="0">
+                <a:pos x="connsiteX2" y="connsiteY2"/>
+              </a:cxn>
+              <a:cxn ang="0">
+                <a:pos x="connsiteX3" y="connsiteY3"/>
+              </a:cxn>
+              <a:cxn ang="0">
+                <a:pos x="connsiteX4" y="connsiteY4"/>
+              </a:cxn>
+              <a:cxn ang="0">
+                <a:pos x="connsiteX5" y="connsiteY5"/>
+              </a:cxn>
+              <a:cxn ang="0">
+                <a:pos x="connsiteX6" y="connsiteY6"/>
+              </a:cxn>
+            </a:cxnLst>
+            <a:rect l="l" t="t" r="r" b="b"/>
+            <a:pathLst>
+              <a:path w="6096002" h="6858000">
+                <a:moveTo>
+                  <a:pt x="0" y="0"/>
+                </a:moveTo>
+                <a:lnTo>
+                  <a:pt x="4885967" y="0"/>
+                </a:lnTo>
+                <a:lnTo>
+                  <a:pt x="4946007" y="69271"/>
+                </a:lnTo>
+                <a:cubicBezTo>
+                  <a:pt x="5656533" y="929100"/>
+                  <a:pt x="6096002" y="2116944"/>
+                  <a:pt x="6096002" y="3429000"/>
+                </a:cubicBezTo>
+                <a:cubicBezTo>
+                  <a:pt x="6096002" y="4741056"/>
+                  <a:pt x="5656533" y="5928900"/>
+                  <a:pt x="4946007" y="6788730"/>
+                </a:cubicBezTo>
+                <a:lnTo>
+                  <a:pt x="4885967" y="6858000"/>
+                </a:lnTo>
+                <a:lnTo>
+                  <a:pt x="0" y="6858000"/>
+                </a:lnTo>
+                <a:close/>
+              </a:path>
+            </a:pathLst>
+          </a:custGeom>
+          <a:ln w="9525">
+            <a:solidFill>
+              <a:srgbClr val="EFEFEF"/>
+            </a:solidFill>
+          </a:ln>
+          <a:effectLst>
+            <a:outerShdw blurRad="88900" dist="38100" algn="l" rotWithShape="0">
+              <a:schemeClr val="bg1">
+                <a:lumMod val="85000"/>
+                <a:alpha val="50000"/>
+              </a:schemeClr>
+            </a:outerShdw>
+          </a:effectLst>
+        </p:spPr>
+        <p:style>
+          <a:lnRef idx="2">
+            <a:schemeClr val="accent1">
+              <a:shade val="50000"/>
+            </a:schemeClr>
+          </a:lnRef>
+          <a:fillRef idx="1">
+            <a:schemeClr val="accent1"/>
+          </a:fillRef>
+          <a:effectRef idx="0">
+            <a:schemeClr val="accent1"/>
+          </a:effectRef>
+          <a:fontRef idx="minor">
+            <a:schemeClr val="lt1"/>
+          </a:fontRef>
+        </p:style>
+        <p:txBody>
+          <a:bodyPr wrap="square" rtlCol="0" anchor="ctr">
+            <a:noAutofit/>
+          </a:bodyPr>
+          <a:lstStyle/>
+          <a:p>
+            <a:pPr marL="0" marR="0" lvl="0" indent="0" algn="ctr" defTabSz="914400" rtl="0" eaLnBrk="1" fontAlgn="auto" latinLnBrk="0" hangingPunct="1">
+              <a:lnSpc>
+                <a:spcPct val="100000"/>
+              </a:lnSpc>
+              <a:spcBef>
+                <a:spcPts val="0"/>
+              </a:spcBef>
+              <a:spcAft>
+                <a:spcPts val="0"/>
+              </a:spcAft>
+              <a:buClrTx/>
+              <a:buSzTx/>
+              <a:buFontTx/>
+              <a:buNone/>
+              <a:tabLst/>
+              <a:defRPr/>
+            </a:pPr>
+            <a:endParaRPr kumimoji="0" lang="en-US" sz="1800" b="0" i="0" u="none" strike="noStrike" kern="1200" cap="none" spc="0" normalizeH="0" baseline="0" noProof="0">
+              <a:ln>
+                <a:noFill/>
+              </a:ln>
+              <a:solidFill>
+                <a:prstClr val="white"/>
+              </a:solidFill>
+              <a:effectLst/>
+              <a:uLnTx/>
+              <a:uFillTx/>
+              <a:latin typeface="Calibri" panose="020F0502020204030204"/>
+              <a:ea typeface="+mn-ea"/>
+              <a:cs typeface="+mn-cs"/>
+            </a:endParaRPr>
+          </a:p>
+        </p:txBody>
+      </p:sp>
+      <p:sp useBgFill="1">
+        <p:nvSpPr>
+          <p:cNvPr id="18" name="Freeform: Shape 17">
+            <a:extLst>
+              <a:ext uri="{FF2B5EF4-FFF2-40B4-BE49-F238E27FC236}">
+                <a16:creationId xmlns:a16="http://schemas.microsoft.com/office/drawing/2014/main" id="{A9682493-588A-4D52-98F6-FBBD80C07ECB}"/>
+              </a:ext>
+              <a:ext uri="{C183D7F6-B498-43B3-948B-1728B52AA6E4}">
+                <adec:decorative xmlns:adec="http://schemas.microsoft.com/office/drawing/2017/decorative" val="1"/>
+              </a:ext>
+            </a:extLst>
+          </p:cNvPr>
+          <p:cNvSpPr>
+            <a:spLocks noGrp="1" noRot="1" noChangeAspect="1" noMove="1" noResize="1" noEditPoints="1" noAdjustHandles="1" noChangeArrowheads="1" noChangeShapeType="1" noTextEdit="1"/>
+          </p:cNvSpPr>
+          <p:nvPr>
+            <p:extLst>
+              <p:ext uri="{386F3935-93C4-4BCD-93E2-E3B085C9AB24}">
+                <p16:designElem xmlns:p16="http://schemas.microsoft.com/office/powerpoint/2015/main" val="1"/>
+              </p:ext>
+            </p:extLst>
+          </p:nvPr>
+        </p:nvSpPr>
+        <p:spPr>
+          <a:xfrm>
+            <a:off x="0" y="0"/>
+            <a:ext cx="6085370" cy="6858000"/>
+          </a:xfrm>
+          <a:custGeom>
+            <a:avLst/>
+            <a:gdLst>
+              <a:gd name="connsiteX0" fmla="*/ 0 w 6085370"/>
+              <a:gd name="connsiteY0" fmla="*/ 0 h 6858000"/>
+              <a:gd name="connsiteX1" fmla="*/ 4875335 w 6085370"/>
+              <a:gd name="connsiteY1" fmla="*/ 0 h 6858000"/>
+              <a:gd name="connsiteX2" fmla="*/ 4935375 w 6085370"/>
+              <a:gd name="connsiteY2" fmla="*/ 69271 h 6858000"/>
+              <a:gd name="connsiteX3" fmla="*/ 6085370 w 6085370"/>
+              <a:gd name="connsiteY3" fmla="*/ 3429000 h 6858000"/>
+              <a:gd name="connsiteX4" fmla="*/ 4935375 w 6085370"/>
+              <a:gd name="connsiteY4" fmla="*/ 6788730 h 6858000"/>
+              <a:gd name="connsiteX5" fmla="*/ 4875335 w 6085370"/>
+              <a:gd name="connsiteY5" fmla="*/ 6858000 h 6858000"/>
+              <a:gd name="connsiteX6" fmla="*/ 0 w 6085370"/>
+              <a:gd name="connsiteY6" fmla="*/ 6858000 h 6858000"/>
+            </a:gdLst>
+            <a:ahLst/>
+            <a:cxnLst>
+              <a:cxn ang="0">
+                <a:pos x="connsiteX0" y="connsiteY0"/>
+              </a:cxn>
+              <a:cxn ang="0">
+                <a:pos x="connsiteX1" y="connsiteY1"/>
+              </a:cxn>
+              <a:cxn ang="0">
+                <a:pos x="connsiteX2" y="connsiteY2"/>
+              </a:cxn>
+              <a:cxn ang="0">
+                <a:pos x="connsiteX3" y="connsiteY3"/>
+              </a:cxn>
+              <a:cxn ang="0">
+                <a:pos x="connsiteX4" y="connsiteY4"/>
+              </a:cxn>
+              <a:cxn ang="0">
+                <a:pos x="connsiteX5" y="connsiteY5"/>
+              </a:cxn>
+              <a:cxn ang="0">
+                <a:pos x="connsiteX6" y="connsiteY6"/>
+              </a:cxn>
+            </a:cxnLst>
+            <a:rect l="l" t="t" r="r" b="b"/>
+            <a:pathLst>
+              <a:path w="6085370" h="6858000">
+                <a:moveTo>
+                  <a:pt x="0" y="0"/>
+                </a:moveTo>
+                <a:lnTo>
+                  <a:pt x="4875335" y="0"/>
+                </a:lnTo>
+                <a:lnTo>
+                  <a:pt x="4935375" y="69271"/>
+                </a:lnTo>
+                <a:cubicBezTo>
+                  <a:pt x="5645901" y="929100"/>
+                  <a:pt x="6085370" y="2116944"/>
+                  <a:pt x="6085370" y="3429000"/>
+                </a:cubicBezTo>
+                <a:cubicBezTo>
+                  <a:pt x="6085370" y="4741056"/>
+                  <a:pt x="5645901" y="5928900"/>
+                  <a:pt x="4935375" y="6788730"/>
+                </a:cubicBezTo>
+                <a:lnTo>
+                  <a:pt x="4875335" y="6858000"/>
+                </a:lnTo>
+                <a:lnTo>
+                  <a:pt x="0" y="6858000"/>
+                </a:lnTo>
+                <a:close/>
+              </a:path>
+            </a:pathLst>
+          </a:custGeom>
+          <a:ln w="9525">
+            <a:noFill/>
+          </a:ln>
+          <a:effectLst/>
+        </p:spPr>
+        <p:style>
+          <a:lnRef idx="2">
+            <a:schemeClr val="accent1">
+              <a:shade val="50000"/>
+            </a:schemeClr>
+          </a:lnRef>
+          <a:fillRef idx="1">
+            <a:schemeClr val="accent1"/>
+          </a:fillRef>
+          <a:effectRef idx="0">
+            <a:schemeClr val="accent1"/>
+          </a:effectRef>
+          <a:fontRef idx="minor">
+            <a:schemeClr val="lt1"/>
+          </a:fontRef>
+        </p:style>
+        <p:txBody>
+          <a:bodyPr wrap="square" rtlCol="0" anchor="ctr">
+            <a:noAutofit/>
+          </a:bodyPr>
+          <a:lstStyle/>
+          <a:p>
+            <a:pPr marL="0" marR="0" lvl="0" indent="0" algn="ctr" defTabSz="914400" rtl="0" eaLnBrk="1" fontAlgn="auto" latinLnBrk="0" hangingPunct="1">
+              <a:lnSpc>
+                <a:spcPct val="100000"/>
+              </a:lnSpc>
+              <a:spcBef>
+                <a:spcPts val="0"/>
+              </a:spcBef>
+              <a:spcAft>
+                <a:spcPts val="0"/>
+              </a:spcAft>
+              <a:buClrTx/>
+              <a:buSzTx/>
+              <a:buFontTx/>
+              <a:buNone/>
+              <a:tabLst/>
+              <a:defRPr/>
+            </a:pPr>
+            <a:endParaRPr kumimoji="0" lang="en-US" sz="1800" b="0" i="0" u="none" strike="noStrike" kern="1200" cap="none" spc="0" normalizeH="0" baseline="0" noProof="0">
+              <a:ln>
+                <a:noFill/>
+              </a:ln>
+              <a:solidFill>
+                <a:prstClr val="white"/>
+              </a:solidFill>
+              <a:effectLst/>
+              <a:uLnTx/>
+              <a:uFillTx/>
+              <a:latin typeface="Calibri" panose="020F0502020204030204"/>
+              <a:ea typeface="+mn-ea"/>
+              <a:cs typeface="+mn-cs"/>
+            </a:endParaRPr>
+          </a:p>
+        </p:txBody>
+      </p:sp>
+      <p:sp>
+        <p:nvSpPr>
+          <p:cNvPr id="2" name="Title 1">
+            <a:extLst>
+              <a:ext uri="{FF2B5EF4-FFF2-40B4-BE49-F238E27FC236}">
+                <a16:creationId xmlns:a16="http://schemas.microsoft.com/office/drawing/2014/main" id="{AA8476FD-ED7D-33A4-13B0-0560C0D3B77B}"/>
+              </a:ext>
+            </a:extLst>
+          </p:cNvPr>
+          <p:cNvSpPr>
+            <a:spLocks noGrp="1"/>
+          </p:cNvSpPr>
+          <p:nvPr>
+            <p:ph type="title"/>
+          </p:nvPr>
+        </p:nvSpPr>
+        <p:spPr>
+          <a:xfrm>
+            <a:off x="438913" y="859536"/>
+            <a:ext cx="4832802" cy="1170432"/>
+          </a:xfrm>
+        </p:spPr>
+        <p:txBody>
+          <a:bodyPr anchor="b">
+            <a:normAutofit/>
+          </a:bodyPr>
+          <a:lstStyle/>
+          <a:p>
+            <a:r>
+              <a:rPr lang="en-US" sz="3400" dirty="0"/>
+              <a:t>Mountain Data</a:t>
+            </a:r>
+          </a:p>
+        </p:txBody>
+      </p:sp>
+      <p:sp>
+        <p:nvSpPr>
+          <p:cNvPr id="20" name="Rectangle 19">
+            <a:extLst>
+              <a:ext uri="{FF2B5EF4-FFF2-40B4-BE49-F238E27FC236}">
+                <a16:creationId xmlns:a16="http://schemas.microsoft.com/office/drawing/2014/main" id="{FBEC5A7A-ADE4-48D9-B89C-2BA1C9110632}"/>
+              </a:ext>
+              <a:ext uri="{C183D7F6-B498-43B3-948B-1728B52AA6E4}">
+                <adec:decorative xmlns:adec="http://schemas.microsoft.com/office/drawing/2017/decorative" val="1"/>
+              </a:ext>
+            </a:extLst>
+          </p:cNvPr>
+          <p:cNvSpPr>
+            <a:spLocks noGrp="1" noRot="1" noChangeAspect="1" noMove="1" noResize="1" noEditPoints="1" noAdjustHandles="1" noChangeArrowheads="1" noChangeShapeType="1" noTextEdit="1"/>
+          </p:cNvSpPr>
+          <p:nvPr>
+            <p:extLst>
+              <p:ext uri="{386F3935-93C4-4BCD-93E2-E3B085C9AB24}">
+                <p16:designElem xmlns:p16="http://schemas.microsoft.com/office/powerpoint/2015/main" val="1"/>
+              </p:ext>
+            </p:extLst>
+          </p:nvPr>
+        </p:nvSpPr>
+        <p:spPr>
+          <a:xfrm rot="5400000">
+            <a:off x="703236" y="363389"/>
+            <a:ext cx="73152" cy="548640"/>
+          </a:xfrm>
+          <a:prstGeom prst="rect">
+            <a:avLst/>
+          </a:prstGeom>
+          <a:solidFill>
+            <a:schemeClr val="accent2"/>
+          </a:solidFill>
+          <a:ln>
+            <a:noFill/>
+          </a:ln>
+        </p:spPr>
+        <p:style>
+          <a:lnRef idx="2">
+            <a:schemeClr val="accent1">
+              <a:shade val="50000"/>
+            </a:schemeClr>
+          </a:lnRef>
+          <a:fillRef idx="1">
+            <a:schemeClr val="accent1"/>
+          </a:fillRef>
+          <a:effectRef idx="0">
+            <a:schemeClr val="accent1"/>
+          </a:effectRef>
+          <a:fontRef idx="minor">
+            <a:schemeClr val="lt1"/>
+          </a:fontRef>
+        </p:style>
+        <p:txBody>
+          <a:bodyPr rtlCol="0" anchor="ctr"/>
+          <a:lstStyle/>
+          <a:p>
+            <a:pPr algn="ctr"/>
+            <a:endParaRPr lang="en-US">
+              <a:solidFill>
+                <a:prstClr val="white"/>
+              </a:solidFill>
+              <a:latin typeface="Calibri" panose="020F0502020204030204"/>
+            </a:endParaRPr>
+          </a:p>
+        </p:txBody>
+      </p:sp>
+      <p:sp>
+        <p:nvSpPr>
+          <p:cNvPr id="22" name="Rectangle 21">
+            <a:extLst>
+              <a:ext uri="{FF2B5EF4-FFF2-40B4-BE49-F238E27FC236}">
+                <a16:creationId xmlns:a16="http://schemas.microsoft.com/office/drawing/2014/main" id="{82095FCE-EF05-4443-B97A-85DEE3A5CA17}"/>
+              </a:ext>
+              <a:ext uri="{C183D7F6-B498-43B3-948B-1728B52AA6E4}">
+                <adec:decorative xmlns:adec="http://schemas.microsoft.com/office/drawing/2017/decorative" val="1"/>
+              </a:ext>
+            </a:extLst>
+          </p:cNvPr>
+          <p:cNvSpPr>
+            <a:spLocks noGrp="1" noRot="1" noChangeAspect="1" noMove="1" noResize="1" noEditPoints="1" noAdjustHandles="1" noChangeArrowheads="1" noChangeShapeType="1" noTextEdit="1"/>
+          </p:cNvSpPr>
+          <p:nvPr>
+            <p:extLst>
+              <p:ext uri="{386F3935-93C4-4BCD-93E2-E3B085C9AB24}">
+                <p16:designElem xmlns:p16="http://schemas.microsoft.com/office/powerpoint/2015/main" val="1"/>
+              </p:ext>
+            </p:extLst>
+          </p:nvPr>
+        </p:nvSpPr>
+        <p:spPr>
+          <a:xfrm>
+            <a:off x="465492" y="2185062"/>
+            <a:ext cx="4937760" cy="18288"/>
+          </a:xfrm>
+          <a:prstGeom prst="rect">
+            <a:avLst/>
+          </a:prstGeom>
+          <a:solidFill>
+            <a:srgbClr val="D5D5D5"/>
+          </a:solidFill>
+          <a:ln w="3175">
+            <a:noFill/>
+          </a:ln>
+          <a:effectLst/>
+        </p:spPr>
+        <p:style>
+          <a:lnRef idx="2">
+            <a:schemeClr val="accent1">
+              <a:shade val="50000"/>
+            </a:schemeClr>
+          </a:lnRef>
+          <a:fillRef idx="1">
+            <a:schemeClr val="accent1"/>
+          </a:fillRef>
+          <a:effectRef idx="0">
+            <a:schemeClr val="accent1"/>
+          </a:effectRef>
+          <a:fontRef idx="minor">
+            <a:schemeClr val="lt1"/>
+          </a:fontRef>
+        </p:style>
+        <p:txBody>
+          <a:bodyPr rtlCol="0" anchor="ctr"/>
+          <a:lstStyle/>
+          <a:p>
+            <a:pPr marL="0" marR="0" lvl="0" indent="0" algn="ctr" defTabSz="914400" rtl="0" eaLnBrk="1" fontAlgn="auto" latinLnBrk="0" hangingPunct="1">
+              <a:lnSpc>
+                <a:spcPct val="100000"/>
+              </a:lnSpc>
+              <a:spcBef>
+                <a:spcPts val="0"/>
+              </a:spcBef>
+              <a:spcAft>
+                <a:spcPts val="0"/>
+              </a:spcAft>
+              <a:buClrTx/>
+              <a:buSzTx/>
+              <a:buFontTx/>
+              <a:buNone/>
+              <a:tabLst/>
+              <a:defRPr/>
+            </a:pPr>
+            <a:endParaRPr kumimoji="0" lang="en-US" sz="1800" b="0" i="0" u="none" strike="noStrike" kern="1200" cap="none" spc="0" normalizeH="0" baseline="0" noProof="0">
+              <a:ln>
+                <a:noFill/>
+              </a:ln>
+              <a:solidFill>
+                <a:prstClr val="white"/>
+              </a:solidFill>
+              <a:effectLst/>
+              <a:uLnTx/>
+              <a:uFillTx/>
+              <a:latin typeface="Calibri" panose="020F0502020204030204"/>
+              <a:ea typeface="+mn-ea"/>
+              <a:cs typeface="+mn-cs"/>
+            </a:endParaRPr>
+          </a:p>
+        </p:txBody>
+      </p:sp>
+      <p:sp>
+        <p:nvSpPr>
+          <p:cNvPr id="11" name="Content Placeholder 10">
+            <a:extLst>
+              <a:ext uri="{FF2B5EF4-FFF2-40B4-BE49-F238E27FC236}">
+                <a16:creationId xmlns:a16="http://schemas.microsoft.com/office/drawing/2014/main" id="{D676152A-A8FD-283A-8776-E919A481B5D6}"/>
+              </a:ext>
+            </a:extLst>
+          </p:cNvPr>
+          <p:cNvSpPr>
+            <a:spLocks noGrp="1"/>
+          </p:cNvSpPr>
+          <p:nvPr>
+            <p:ph idx="1"/>
+          </p:nvPr>
+        </p:nvSpPr>
+        <p:spPr>
+          <a:xfrm>
+            <a:off x="438912" y="2512611"/>
+            <a:ext cx="4832803" cy="3664351"/>
+          </a:xfrm>
+        </p:spPr>
+        <p:txBody>
+          <a:bodyPr>
+            <a:normAutofit lnSpcReduction="10000"/>
+          </a:bodyPr>
+          <a:lstStyle/>
+          <a:p>
+            <a:r>
+              <a:rPr lang="en-US" sz="1200" dirty="0"/>
+              <a:t>Wanted to see if having more mountains in a city meant more expensive homes in the city.</a:t>
+            </a:r>
+          </a:p>
+          <a:p>
+            <a:endParaRPr lang="en-US" sz="1200" dirty="0"/>
+          </a:p>
+          <a:p>
+            <a:r>
+              <a:rPr lang="en-US" sz="1200" dirty="0"/>
+              <a:t>Figured out how many mountains are in each city and typical home prices in each city. (Bar Graph)</a:t>
+            </a:r>
+          </a:p>
+          <a:p>
+            <a:endParaRPr lang="en-US" sz="1200" dirty="0"/>
+          </a:p>
+          <a:p>
+            <a:r>
+              <a:rPr lang="en-US" sz="1200" dirty="0"/>
+              <a:t>Compared typical home prices to number of mountains in the city . (Scatter Plot)</a:t>
+            </a:r>
+          </a:p>
+          <a:p>
+            <a:endParaRPr lang="en-US" sz="1200" dirty="0"/>
+          </a:p>
+          <a:p>
+            <a:r>
+              <a:rPr lang="en-US" sz="1200" dirty="0"/>
+              <a:t>Had a radius of 10 km because mountains wouldn’t be right in a city, they would be surrounding the city.</a:t>
+            </a:r>
+          </a:p>
+          <a:p>
+            <a:endParaRPr lang="en-US" sz="1200" dirty="0"/>
+          </a:p>
+          <a:p>
+            <a:r>
+              <a:rPr lang="en-US" sz="1200" dirty="0"/>
+              <a:t>Found that there is a very strong correlation between the number of mountains and the home price. The R value was .76 which means there is a 76% chance that the value of homes increases based on the number of mountains. </a:t>
+            </a:r>
+          </a:p>
+        </p:txBody>
+      </p:sp>
+      <p:pic>
+        <p:nvPicPr>
+          <p:cNvPr id="3" name="Picture 4">
+            <a:extLst>
+              <a:ext uri="{FF2B5EF4-FFF2-40B4-BE49-F238E27FC236}">
+                <a16:creationId xmlns:a16="http://schemas.microsoft.com/office/drawing/2014/main" id="{F58D920D-5514-F3C0-2D70-06D35085C75B}"/>
+              </a:ext>
+            </a:extLst>
+          </p:cNvPr>
+          <p:cNvPicPr>
+            <a:picLocks noChangeAspect="1" noChangeArrowheads="1"/>
+          </p:cNvPicPr>
+          <p:nvPr/>
+        </p:nvPicPr>
+        <p:blipFill>
+          <a:blip r:embed="rId2">
+            <a:extLst>
+              <a:ext uri="{28A0092B-C50C-407E-A947-70E740481C1C}">
+                <a14:useLocalDpi xmlns:a14="http://schemas.microsoft.com/office/drawing/2010/main" val="0"/>
+              </a:ext>
+            </a:extLst>
+          </a:blip>
+          <a:stretch>
+            <a:fillRect/>
+          </a:stretch>
+        </p:blipFill>
+        <p:spPr bwMode="auto">
+          <a:xfrm>
+            <a:off x="6536882" y="0"/>
+            <a:ext cx="5215569" cy="3885598"/>
+          </a:xfrm>
+          <a:prstGeom prst="rect">
+            <a:avLst/>
+          </a:prstGeom>
+          <a:noFill/>
+          <a:extLst>
+            <a:ext uri="{909E8E84-426E-40DD-AFC4-6F175D3DCCD1}">
+              <a14:hiddenFill xmlns:a14="http://schemas.microsoft.com/office/drawing/2010/main">
+                <a:solidFill>
+                  <a:srgbClr val="FFFFFF"/>
+                </a:solidFill>
+              </a14:hiddenFill>
+            </a:ext>
+          </a:extLst>
+        </p:spPr>
+      </p:pic>
+      <p:pic>
+        <p:nvPicPr>
+          <p:cNvPr id="4" name="Picture 2">
+            <a:extLst>
+              <a:ext uri="{FF2B5EF4-FFF2-40B4-BE49-F238E27FC236}">
+                <a16:creationId xmlns:a16="http://schemas.microsoft.com/office/drawing/2014/main" id="{7C2261C6-A506-1627-0F3A-0455B8CB858B}"/>
+              </a:ext>
+            </a:extLst>
+          </p:cNvPr>
+          <p:cNvPicPr>
+            <a:picLocks noChangeAspect="1" noChangeArrowheads="1"/>
+          </p:cNvPicPr>
+          <p:nvPr/>
+        </p:nvPicPr>
+        <p:blipFill>
+          <a:blip r:embed="rId3">
+            <a:extLst>
+              <a:ext uri="{28A0092B-C50C-407E-A947-70E740481C1C}">
+                <a14:useLocalDpi xmlns:a14="http://schemas.microsoft.com/office/drawing/2010/main" val="0"/>
+              </a:ext>
+            </a:extLst>
+          </a:blip>
+          <a:stretch>
+            <a:fillRect/>
+          </a:stretch>
+        </p:blipFill>
+        <p:spPr bwMode="auto">
+          <a:xfrm>
+            <a:off x="7084011" y="3359426"/>
+            <a:ext cx="4400722" cy="3498574"/>
+          </a:xfrm>
+          <a:prstGeom prst="rect">
+            <a:avLst/>
+          </a:prstGeom>
+          <a:noFill/>
+          <a:extLst>
+            <a:ext uri="{909E8E84-426E-40DD-AFC4-6F175D3DCCD1}">
+              <a14:hiddenFill xmlns:a14="http://schemas.microsoft.com/office/drawing/2010/main">
+                <a:solidFill>
+                  <a:srgbClr val="FFFFFF"/>
+                </a:solidFill>
+              </a14:hiddenFill>
+            </a:ext>
+          </a:extLst>
+        </p:spPr>
+      </p:pic>
+    </p:spTree>
+    <p:extLst>
+      <p:ext uri="{BB962C8B-B14F-4D97-AF65-F5344CB8AC3E}">
+        <p14:creationId xmlns:p14="http://schemas.microsoft.com/office/powerpoint/2010/main" val="1785084496"/>
+      </p:ext>
+    </p:extLst>
+  </p:cSld>
+  <p:clrMapOvr>
+    <a:masterClrMapping/>
+  </p:clrMapOvr>
+</p:sld>
+</file>
+
+<file path=ppt/slides/slide13.xml><?xml version="1.0" encoding="utf-8"?>
+<p:sld xmlns:a="http://schemas.openxmlformats.org/drawingml/2006/main" xmlns:r="http://schemas.openxmlformats.org/officeDocument/2006/relationships" xmlns:p="http://schemas.openxmlformats.org/presentationml/2006/main" show="0">
   <p:cSld>
     <p:spTree>
       <p:nvGrpSpPr>
@@ -12877,8 +13671,8 @@
 </p:sld>
 </file>
 
-<file path=ppt/slides/slide13.xml><?xml version="1.0" encoding="utf-8"?>
-<p:sld xmlns:a="http://schemas.openxmlformats.org/drawingml/2006/main" xmlns:r="http://schemas.openxmlformats.org/officeDocument/2006/relationships" xmlns:p="http://schemas.openxmlformats.org/presentationml/2006/main">
+<file path=ppt/slides/slide14.xml><?xml version="1.0" encoding="utf-8"?>
+<p:sld xmlns:a="http://schemas.openxmlformats.org/drawingml/2006/main" xmlns:r="http://schemas.openxmlformats.org/officeDocument/2006/relationships" xmlns:p="http://schemas.openxmlformats.org/presentationml/2006/main" show="0">
   <p:cSld>
     <p:spTree>
       <p:nvGrpSpPr>
@@ -12963,8 +13757,766 @@
 </p:sld>
 </file>
 
-<file path=ppt/slides/slide14.xml><?xml version="1.0" encoding="utf-8"?>
+<file path=ppt/slides/slide15.xml><?xml version="1.0" encoding="utf-8"?>
 <p:sld xmlns:a="http://schemas.openxmlformats.org/drawingml/2006/main" xmlns:r="http://schemas.openxmlformats.org/officeDocument/2006/relationships" xmlns:p="http://schemas.openxmlformats.org/presentationml/2006/main">
+  <p:cSld>
+    <p:bg>
+      <p:bgPr>
+        <a:solidFill>
+          <a:schemeClr val="bg1"/>
+        </a:solidFill>
+        <a:effectLst/>
+      </p:bgPr>
+    </p:bg>
+    <p:spTree>
+      <p:nvGrpSpPr>
+        <p:cNvPr id="1" name=""/>
+        <p:cNvGrpSpPr/>
+        <p:nvPr/>
+      </p:nvGrpSpPr>
+      <p:grpSpPr>
+        <a:xfrm>
+          <a:off x="0" y="0"/>
+          <a:ext cx="0" cy="0"/>
+          <a:chOff x="0" y="0"/>
+          <a:chExt cx="0" cy="0"/>
+        </a:xfrm>
+      </p:grpSpPr>
+      <p:sp useBgFill="1">
+        <p:nvSpPr>
+          <p:cNvPr id="14" name="Rectangle 13">
+            <a:extLst>
+              <a:ext uri="{FF2B5EF4-FFF2-40B4-BE49-F238E27FC236}">
+                <a16:creationId xmlns:a16="http://schemas.microsoft.com/office/drawing/2014/main" id="{115719BB-48A7-4AF4-BB91-DC82E0DF727D}"/>
+              </a:ext>
+              <a:ext uri="{C183D7F6-B498-43B3-948B-1728B52AA6E4}">
+                <adec:decorative xmlns:adec="http://schemas.microsoft.com/office/drawing/2017/decorative" val="1"/>
+              </a:ext>
+            </a:extLst>
+          </p:cNvPr>
+          <p:cNvSpPr>
+            <a:spLocks noGrp="1" noRot="1" noChangeAspect="1" noMove="1" noResize="1" noEditPoints="1" noAdjustHandles="1" noChangeArrowheads="1" noChangeShapeType="1" noTextEdit="1"/>
+          </p:cNvSpPr>
+          <p:nvPr>
+            <p:extLst>
+              <p:ext uri="{386F3935-93C4-4BCD-93E2-E3B085C9AB24}">
+                <p16:designElem xmlns:p16="http://schemas.microsoft.com/office/powerpoint/2015/main" val="1"/>
+              </p:ext>
+            </p:extLst>
+          </p:nvPr>
+        </p:nvSpPr>
+        <p:spPr>
+          <a:xfrm>
+            <a:off x="0" y="0"/>
+            <a:ext cx="12192000" cy="6858000"/>
+          </a:xfrm>
+          <a:prstGeom prst="rect">
+            <a:avLst/>
+          </a:prstGeom>
+          <a:ln>
+            <a:noFill/>
+          </a:ln>
+        </p:spPr>
+        <p:style>
+          <a:lnRef idx="2">
+            <a:schemeClr val="accent1">
+              <a:shade val="50000"/>
+            </a:schemeClr>
+          </a:lnRef>
+          <a:fillRef idx="1">
+            <a:schemeClr val="accent1"/>
+          </a:fillRef>
+          <a:effectRef idx="0">
+            <a:schemeClr val="accent1"/>
+          </a:effectRef>
+          <a:fontRef idx="minor">
+            <a:schemeClr val="lt1"/>
+          </a:fontRef>
+        </p:style>
+        <p:txBody>
+          <a:bodyPr rtlCol="0" anchor="ctr"/>
+          <a:lstStyle/>
+          <a:p>
+            <a:pPr algn="ctr"/>
+            <a:endParaRPr lang="en-US"/>
+          </a:p>
+        </p:txBody>
+      </p:sp>
+      <p:sp useBgFill="1">
+        <p:nvSpPr>
+          <p:cNvPr id="16" name="Freeform: Shape 15">
+            <a:extLst>
+              <a:ext uri="{FF2B5EF4-FFF2-40B4-BE49-F238E27FC236}">
+                <a16:creationId xmlns:a16="http://schemas.microsoft.com/office/drawing/2014/main" id="{10973A55-5440-4A99-B526-B5812E46271E}"/>
+              </a:ext>
+              <a:ext uri="{C183D7F6-B498-43B3-948B-1728B52AA6E4}">
+                <adec:decorative xmlns:adec="http://schemas.microsoft.com/office/drawing/2017/decorative" val="1"/>
+              </a:ext>
+            </a:extLst>
+          </p:cNvPr>
+          <p:cNvSpPr>
+            <a:spLocks noGrp="1" noRot="1" noChangeAspect="1" noMove="1" noResize="1" noEditPoints="1" noAdjustHandles="1" noChangeArrowheads="1" noChangeShapeType="1" noTextEdit="1"/>
+          </p:cNvSpPr>
+          <p:nvPr>
+            <p:extLst>
+              <p:ext uri="{386F3935-93C4-4BCD-93E2-E3B085C9AB24}">
+                <p16:designElem xmlns:p16="http://schemas.microsoft.com/office/powerpoint/2015/main" val="1"/>
+              </p:ext>
+            </p:extLst>
+          </p:nvPr>
+        </p:nvSpPr>
+        <p:spPr>
+          <a:xfrm>
+            <a:off x="-1" y="0"/>
+            <a:ext cx="6096002" cy="6858000"/>
+          </a:xfrm>
+          <a:custGeom>
+            <a:avLst/>
+            <a:gdLst>
+              <a:gd name="connsiteX0" fmla="*/ 0 w 6096002"/>
+              <a:gd name="connsiteY0" fmla="*/ 0 h 6858000"/>
+              <a:gd name="connsiteX1" fmla="*/ 4885967 w 6096002"/>
+              <a:gd name="connsiteY1" fmla="*/ 0 h 6858000"/>
+              <a:gd name="connsiteX2" fmla="*/ 4946007 w 6096002"/>
+              <a:gd name="connsiteY2" fmla="*/ 69271 h 6858000"/>
+              <a:gd name="connsiteX3" fmla="*/ 6096002 w 6096002"/>
+              <a:gd name="connsiteY3" fmla="*/ 3429000 h 6858000"/>
+              <a:gd name="connsiteX4" fmla="*/ 4946007 w 6096002"/>
+              <a:gd name="connsiteY4" fmla="*/ 6788730 h 6858000"/>
+              <a:gd name="connsiteX5" fmla="*/ 4885967 w 6096002"/>
+              <a:gd name="connsiteY5" fmla="*/ 6858000 h 6858000"/>
+              <a:gd name="connsiteX6" fmla="*/ 0 w 6096002"/>
+              <a:gd name="connsiteY6" fmla="*/ 6858000 h 6858000"/>
+            </a:gdLst>
+            <a:ahLst/>
+            <a:cxnLst>
+              <a:cxn ang="0">
+                <a:pos x="connsiteX0" y="connsiteY0"/>
+              </a:cxn>
+              <a:cxn ang="0">
+                <a:pos x="connsiteX1" y="connsiteY1"/>
+              </a:cxn>
+              <a:cxn ang="0">
+                <a:pos x="connsiteX2" y="connsiteY2"/>
+              </a:cxn>
+              <a:cxn ang="0">
+                <a:pos x="connsiteX3" y="connsiteY3"/>
+              </a:cxn>
+              <a:cxn ang="0">
+                <a:pos x="connsiteX4" y="connsiteY4"/>
+              </a:cxn>
+              <a:cxn ang="0">
+                <a:pos x="connsiteX5" y="connsiteY5"/>
+              </a:cxn>
+              <a:cxn ang="0">
+                <a:pos x="connsiteX6" y="connsiteY6"/>
+              </a:cxn>
+            </a:cxnLst>
+            <a:rect l="l" t="t" r="r" b="b"/>
+            <a:pathLst>
+              <a:path w="6096002" h="6858000">
+                <a:moveTo>
+                  <a:pt x="0" y="0"/>
+                </a:moveTo>
+                <a:lnTo>
+                  <a:pt x="4885967" y="0"/>
+                </a:lnTo>
+                <a:lnTo>
+                  <a:pt x="4946007" y="69271"/>
+                </a:lnTo>
+                <a:cubicBezTo>
+                  <a:pt x="5656533" y="929100"/>
+                  <a:pt x="6096002" y="2116944"/>
+                  <a:pt x="6096002" y="3429000"/>
+                </a:cubicBezTo>
+                <a:cubicBezTo>
+                  <a:pt x="6096002" y="4741056"/>
+                  <a:pt x="5656533" y="5928900"/>
+                  <a:pt x="4946007" y="6788730"/>
+                </a:cubicBezTo>
+                <a:lnTo>
+                  <a:pt x="4885967" y="6858000"/>
+                </a:lnTo>
+                <a:lnTo>
+                  <a:pt x="0" y="6858000"/>
+                </a:lnTo>
+                <a:close/>
+              </a:path>
+            </a:pathLst>
+          </a:custGeom>
+          <a:ln w="9525">
+            <a:solidFill>
+              <a:srgbClr val="EFEFEF"/>
+            </a:solidFill>
+          </a:ln>
+          <a:effectLst>
+            <a:outerShdw blurRad="88900" dist="38100" algn="l" rotWithShape="0">
+              <a:schemeClr val="bg1">
+                <a:lumMod val="85000"/>
+                <a:alpha val="50000"/>
+              </a:schemeClr>
+            </a:outerShdw>
+          </a:effectLst>
+        </p:spPr>
+        <p:style>
+          <a:lnRef idx="2">
+            <a:schemeClr val="accent1">
+              <a:shade val="50000"/>
+            </a:schemeClr>
+          </a:lnRef>
+          <a:fillRef idx="1">
+            <a:schemeClr val="accent1"/>
+          </a:fillRef>
+          <a:effectRef idx="0">
+            <a:schemeClr val="accent1"/>
+          </a:effectRef>
+          <a:fontRef idx="minor">
+            <a:schemeClr val="lt1"/>
+          </a:fontRef>
+        </p:style>
+        <p:txBody>
+          <a:bodyPr wrap="square" rtlCol="0" anchor="ctr">
+            <a:noAutofit/>
+          </a:bodyPr>
+          <a:lstStyle/>
+          <a:p>
+            <a:pPr marL="0" marR="0" lvl="0" indent="0" algn="ctr" defTabSz="914400" rtl="0" eaLnBrk="1" fontAlgn="auto" latinLnBrk="0" hangingPunct="1">
+              <a:lnSpc>
+                <a:spcPct val="100000"/>
+              </a:lnSpc>
+              <a:spcBef>
+                <a:spcPts val="0"/>
+              </a:spcBef>
+              <a:spcAft>
+                <a:spcPts val="0"/>
+              </a:spcAft>
+              <a:buClrTx/>
+              <a:buSzTx/>
+              <a:buFontTx/>
+              <a:buNone/>
+              <a:tabLst/>
+              <a:defRPr/>
+            </a:pPr>
+            <a:endParaRPr kumimoji="0" lang="en-US" sz="1800" b="0" i="0" u="none" strike="noStrike" kern="1200" cap="none" spc="0" normalizeH="0" baseline="0" noProof="0">
+              <a:ln>
+                <a:noFill/>
+              </a:ln>
+              <a:solidFill>
+                <a:prstClr val="white"/>
+              </a:solidFill>
+              <a:effectLst/>
+              <a:uLnTx/>
+              <a:uFillTx/>
+              <a:latin typeface="Calibri" panose="020F0502020204030204"/>
+              <a:ea typeface="+mn-ea"/>
+              <a:cs typeface="+mn-cs"/>
+            </a:endParaRPr>
+          </a:p>
+        </p:txBody>
+      </p:sp>
+      <p:sp useBgFill="1">
+        <p:nvSpPr>
+          <p:cNvPr id="18" name="Freeform: Shape 17">
+            <a:extLst>
+              <a:ext uri="{FF2B5EF4-FFF2-40B4-BE49-F238E27FC236}">
+                <a16:creationId xmlns:a16="http://schemas.microsoft.com/office/drawing/2014/main" id="{A9682493-588A-4D52-98F6-FBBD80C07ECB}"/>
+              </a:ext>
+              <a:ext uri="{C183D7F6-B498-43B3-948B-1728B52AA6E4}">
+                <adec:decorative xmlns:adec="http://schemas.microsoft.com/office/drawing/2017/decorative" val="1"/>
+              </a:ext>
+            </a:extLst>
+          </p:cNvPr>
+          <p:cNvSpPr>
+            <a:spLocks noGrp="1" noRot="1" noChangeAspect="1" noMove="1" noResize="1" noEditPoints="1" noAdjustHandles="1" noChangeArrowheads="1" noChangeShapeType="1" noTextEdit="1"/>
+          </p:cNvSpPr>
+          <p:nvPr>
+            <p:extLst>
+              <p:ext uri="{386F3935-93C4-4BCD-93E2-E3B085C9AB24}">
+                <p16:designElem xmlns:p16="http://schemas.microsoft.com/office/powerpoint/2015/main" val="1"/>
+              </p:ext>
+            </p:extLst>
+          </p:nvPr>
+        </p:nvSpPr>
+        <p:spPr>
+          <a:xfrm>
+            <a:off x="0" y="0"/>
+            <a:ext cx="6085370" cy="6858000"/>
+          </a:xfrm>
+          <a:custGeom>
+            <a:avLst/>
+            <a:gdLst>
+              <a:gd name="connsiteX0" fmla="*/ 0 w 6085370"/>
+              <a:gd name="connsiteY0" fmla="*/ 0 h 6858000"/>
+              <a:gd name="connsiteX1" fmla="*/ 4875335 w 6085370"/>
+              <a:gd name="connsiteY1" fmla="*/ 0 h 6858000"/>
+              <a:gd name="connsiteX2" fmla="*/ 4935375 w 6085370"/>
+              <a:gd name="connsiteY2" fmla="*/ 69271 h 6858000"/>
+              <a:gd name="connsiteX3" fmla="*/ 6085370 w 6085370"/>
+              <a:gd name="connsiteY3" fmla="*/ 3429000 h 6858000"/>
+              <a:gd name="connsiteX4" fmla="*/ 4935375 w 6085370"/>
+              <a:gd name="connsiteY4" fmla="*/ 6788730 h 6858000"/>
+              <a:gd name="connsiteX5" fmla="*/ 4875335 w 6085370"/>
+              <a:gd name="connsiteY5" fmla="*/ 6858000 h 6858000"/>
+              <a:gd name="connsiteX6" fmla="*/ 0 w 6085370"/>
+              <a:gd name="connsiteY6" fmla="*/ 6858000 h 6858000"/>
+            </a:gdLst>
+            <a:ahLst/>
+            <a:cxnLst>
+              <a:cxn ang="0">
+                <a:pos x="connsiteX0" y="connsiteY0"/>
+              </a:cxn>
+              <a:cxn ang="0">
+                <a:pos x="connsiteX1" y="connsiteY1"/>
+              </a:cxn>
+              <a:cxn ang="0">
+                <a:pos x="connsiteX2" y="connsiteY2"/>
+              </a:cxn>
+              <a:cxn ang="0">
+                <a:pos x="connsiteX3" y="connsiteY3"/>
+              </a:cxn>
+              <a:cxn ang="0">
+                <a:pos x="connsiteX4" y="connsiteY4"/>
+              </a:cxn>
+              <a:cxn ang="0">
+                <a:pos x="connsiteX5" y="connsiteY5"/>
+              </a:cxn>
+              <a:cxn ang="0">
+                <a:pos x="connsiteX6" y="connsiteY6"/>
+              </a:cxn>
+            </a:cxnLst>
+            <a:rect l="l" t="t" r="r" b="b"/>
+            <a:pathLst>
+              <a:path w="6085370" h="6858000">
+                <a:moveTo>
+                  <a:pt x="0" y="0"/>
+                </a:moveTo>
+                <a:lnTo>
+                  <a:pt x="4875335" y="0"/>
+                </a:lnTo>
+                <a:lnTo>
+                  <a:pt x="4935375" y="69271"/>
+                </a:lnTo>
+                <a:cubicBezTo>
+                  <a:pt x="5645901" y="929100"/>
+                  <a:pt x="6085370" y="2116944"/>
+                  <a:pt x="6085370" y="3429000"/>
+                </a:cubicBezTo>
+                <a:cubicBezTo>
+                  <a:pt x="6085370" y="4741056"/>
+                  <a:pt x="5645901" y="5928900"/>
+                  <a:pt x="4935375" y="6788730"/>
+                </a:cubicBezTo>
+                <a:lnTo>
+                  <a:pt x="4875335" y="6858000"/>
+                </a:lnTo>
+                <a:lnTo>
+                  <a:pt x="0" y="6858000"/>
+                </a:lnTo>
+                <a:close/>
+              </a:path>
+            </a:pathLst>
+          </a:custGeom>
+          <a:ln w="9525">
+            <a:noFill/>
+          </a:ln>
+          <a:effectLst/>
+        </p:spPr>
+        <p:style>
+          <a:lnRef idx="2">
+            <a:schemeClr val="accent1">
+              <a:shade val="50000"/>
+            </a:schemeClr>
+          </a:lnRef>
+          <a:fillRef idx="1">
+            <a:schemeClr val="accent1"/>
+          </a:fillRef>
+          <a:effectRef idx="0">
+            <a:schemeClr val="accent1"/>
+          </a:effectRef>
+          <a:fontRef idx="minor">
+            <a:schemeClr val="lt1"/>
+          </a:fontRef>
+        </p:style>
+        <p:txBody>
+          <a:bodyPr wrap="square" rtlCol="0" anchor="ctr">
+            <a:noAutofit/>
+          </a:bodyPr>
+          <a:lstStyle/>
+          <a:p>
+            <a:pPr marL="0" marR="0" lvl="0" indent="0" algn="ctr" defTabSz="914400" rtl="0" eaLnBrk="1" fontAlgn="auto" latinLnBrk="0" hangingPunct="1">
+              <a:lnSpc>
+                <a:spcPct val="100000"/>
+              </a:lnSpc>
+              <a:spcBef>
+                <a:spcPts val="0"/>
+              </a:spcBef>
+              <a:spcAft>
+                <a:spcPts val="0"/>
+              </a:spcAft>
+              <a:buClrTx/>
+              <a:buSzTx/>
+              <a:buFontTx/>
+              <a:buNone/>
+              <a:tabLst/>
+              <a:defRPr/>
+            </a:pPr>
+            <a:endParaRPr kumimoji="0" lang="en-US" sz="1800" b="0" i="0" u="none" strike="noStrike" kern="1200" cap="none" spc="0" normalizeH="0" baseline="0" noProof="0">
+              <a:ln>
+                <a:noFill/>
+              </a:ln>
+              <a:solidFill>
+                <a:prstClr val="white"/>
+              </a:solidFill>
+              <a:effectLst/>
+              <a:uLnTx/>
+              <a:uFillTx/>
+              <a:latin typeface="Calibri" panose="020F0502020204030204"/>
+              <a:ea typeface="+mn-ea"/>
+              <a:cs typeface="+mn-cs"/>
+            </a:endParaRPr>
+          </a:p>
+        </p:txBody>
+      </p:sp>
+      <p:sp>
+        <p:nvSpPr>
+          <p:cNvPr id="2" name="Title 1">
+            <a:extLst>
+              <a:ext uri="{FF2B5EF4-FFF2-40B4-BE49-F238E27FC236}">
+                <a16:creationId xmlns:a16="http://schemas.microsoft.com/office/drawing/2014/main" id="{AA8476FD-ED7D-33A4-13B0-0560C0D3B77B}"/>
+              </a:ext>
+            </a:extLst>
+          </p:cNvPr>
+          <p:cNvSpPr>
+            <a:spLocks noGrp="1"/>
+          </p:cNvSpPr>
+          <p:nvPr>
+            <p:ph type="title"/>
+          </p:nvPr>
+        </p:nvSpPr>
+        <p:spPr>
+          <a:xfrm>
+            <a:off x="438913" y="859536"/>
+            <a:ext cx="4832802" cy="1170432"/>
+          </a:xfrm>
+        </p:spPr>
+        <p:txBody>
+          <a:bodyPr anchor="b">
+            <a:normAutofit/>
+          </a:bodyPr>
+          <a:lstStyle/>
+          <a:p>
+            <a:r>
+              <a:rPr lang="en-US" sz="3400" dirty="0"/>
+              <a:t>Healthcare Data</a:t>
+            </a:r>
+          </a:p>
+        </p:txBody>
+      </p:sp>
+      <p:sp>
+        <p:nvSpPr>
+          <p:cNvPr id="20" name="Rectangle 19">
+            <a:extLst>
+              <a:ext uri="{FF2B5EF4-FFF2-40B4-BE49-F238E27FC236}">
+                <a16:creationId xmlns:a16="http://schemas.microsoft.com/office/drawing/2014/main" id="{FBEC5A7A-ADE4-48D9-B89C-2BA1C9110632}"/>
+              </a:ext>
+              <a:ext uri="{C183D7F6-B498-43B3-948B-1728B52AA6E4}">
+                <adec:decorative xmlns:adec="http://schemas.microsoft.com/office/drawing/2017/decorative" val="1"/>
+              </a:ext>
+            </a:extLst>
+          </p:cNvPr>
+          <p:cNvSpPr>
+            <a:spLocks noGrp="1" noRot="1" noChangeAspect="1" noMove="1" noResize="1" noEditPoints="1" noAdjustHandles="1" noChangeArrowheads="1" noChangeShapeType="1" noTextEdit="1"/>
+          </p:cNvSpPr>
+          <p:nvPr>
+            <p:extLst>
+              <p:ext uri="{386F3935-93C4-4BCD-93E2-E3B085C9AB24}">
+                <p16:designElem xmlns:p16="http://schemas.microsoft.com/office/powerpoint/2015/main" val="1"/>
+              </p:ext>
+            </p:extLst>
+          </p:nvPr>
+        </p:nvSpPr>
+        <p:spPr>
+          <a:xfrm rot="5400000">
+            <a:off x="703236" y="363389"/>
+            <a:ext cx="73152" cy="548640"/>
+          </a:xfrm>
+          <a:prstGeom prst="rect">
+            <a:avLst/>
+          </a:prstGeom>
+          <a:solidFill>
+            <a:schemeClr val="accent2"/>
+          </a:solidFill>
+          <a:ln>
+            <a:noFill/>
+          </a:ln>
+        </p:spPr>
+        <p:style>
+          <a:lnRef idx="2">
+            <a:schemeClr val="accent1">
+              <a:shade val="50000"/>
+            </a:schemeClr>
+          </a:lnRef>
+          <a:fillRef idx="1">
+            <a:schemeClr val="accent1"/>
+          </a:fillRef>
+          <a:effectRef idx="0">
+            <a:schemeClr val="accent1"/>
+          </a:effectRef>
+          <a:fontRef idx="minor">
+            <a:schemeClr val="lt1"/>
+          </a:fontRef>
+        </p:style>
+        <p:txBody>
+          <a:bodyPr rtlCol="0" anchor="ctr"/>
+          <a:lstStyle/>
+          <a:p>
+            <a:pPr algn="ctr"/>
+            <a:endParaRPr lang="en-US">
+              <a:solidFill>
+                <a:prstClr val="white"/>
+              </a:solidFill>
+              <a:latin typeface="Calibri" panose="020F0502020204030204"/>
+            </a:endParaRPr>
+          </a:p>
+        </p:txBody>
+      </p:sp>
+      <p:sp>
+        <p:nvSpPr>
+          <p:cNvPr id="22" name="Rectangle 21">
+            <a:extLst>
+              <a:ext uri="{FF2B5EF4-FFF2-40B4-BE49-F238E27FC236}">
+                <a16:creationId xmlns:a16="http://schemas.microsoft.com/office/drawing/2014/main" id="{82095FCE-EF05-4443-B97A-85DEE3A5CA17}"/>
+              </a:ext>
+              <a:ext uri="{C183D7F6-B498-43B3-948B-1728B52AA6E4}">
+                <adec:decorative xmlns:adec="http://schemas.microsoft.com/office/drawing/2017/decorative" val="1"/>
+              </a:ext>
+            </a:extLst>
+          </p:cNvPr>
+          <p:cNvSpPr>
+            <a:spLocks noGrp="1" noRot="1" noChangeAspect="1" noMove="1" noResize="1" noEditPoints="1" noAdjustHandles="1" noChangeArrowheads="1" noChangeShapeType="1" noTextEdit="1"/>
+          </p:cNvSpPr>
+          <p:nvPr>
+            <p:extLst>
+              <p:ext uri="{386F3935-93C4-4BCD-93E2-E3B085C9AB24}">
+                <p16:designElem xmlns:p16="http://schemas.microsoft.com/office/powerpoint/2015/main" val="1"/>
+              </p:ext>
+            </p:extLst>
+          </p:nvPr>
+        </p:nvSpPr>
+        <p:spPr>
+          <a:xfrm>
+            <a:off x="465492" y="2185062"/>
+            <a:ext cx="4937760" cy="18288"/>
+          </a:xfrm>
+          <a:prstGeom prst="rect">
+            <a:avLst/>
+          </a:prstGeom>
+          <a:solidFill>
+            <a:srgbClr val="D5D5D5"/>
+          </a:solidFill>
+          <a:ln w="3175">
+            <a:noFill/>
+          </a:ln>
+          <a:effectLst/>
+        </p:spPr>
+        <p:style>
+          <a:lnRef idx="2">
+            <a:schemeClr val="accent1">
+              <a:shade val="50000"/>
+            </a:schemeClr>
+          </a:lnRef>
+          <a:fillRef idx="1">
+            <a:schemeClr val="accent1"/>
+          </a:fillRef>
+          <a:effectRef idx="0">
+            <a:schemeClr val="accent1"/>
+          </a:effectRef>
+          <a:fontRef idx="minor">
+            <a:schemeClr val="lt1"/>
+          </a:fontRef>
+        </p:style>
+        <p:txBody>
+          <a:bodyPr rtlCol="0" anchor="ctr"/>
+          <a:lstStyle/>
+          <a:p>
+            <a:pPr marL="0" marR="0" lvl="0" indent="0" algn="ctr" defTabSz="914400" rtl="0" eaLnBrk="1" fontAlgn="auto" latinLnBrk="0" hangingPunct="1">
+              <a:lnSpc>
+                <a:spcPct val="100000"/>
+              </a:lnSpc>
+              <a:spcBef>
+                <a:spcPts val="0"/>
+              </a:spcBef>
+              <a:spcAft>
+                <a:spcPts val="0"/>
+              </a:spcAft>
+              <a:buClrTx/>
+              <a:buSzTx/>
+              <a:buFontTx/>
+              <a:buNone/>
+              <a:tabLst/>
+              <a:defRPr/>
+            </a:pPr>
+            <a:endParaRPr kumimoji="0" lang="en-US" sz="1800" b="0" i="0" u="none" strike="noStrike" kern="1200" cap="none" spc="0" normalizeH="0" baseline="0" noProof="0">
+              <a:ln>
+                <a:noFill/>
+              </a:ln>
+              <a:solidFill>
+                <a:prstClr val="white"/>
+              </a:solidFill>
+              <a:effectLst/>
+              <a:uLnTx/>
+              <a:uFillTx/>
+              <a:latin typeface="Calibri" panose="020F0502020204030204"/>
+              <a:ea typeface="+mn-ea"/>
+              <a:cs typeface="+mn-cs"/>
+            </a:endParaRPr>
+          </a:p>
+        </p:txBody>
+      </p:sp>
+      <p:sp>
+        <p:nvSpPr>
+          <p:cNvPr id="11" name="Content Placeholder 10">
+            <a:extLst>
+              <a:ext uri="{FF2B5EF4-FFF2-40B4-BE49-F238E27FC236}">
+                <a16:creationId xmlns:a16="http://schemas.microsoft.com/office/drawing/2014/main" id="{D676152A-A8FD-283A-8776-E919A481B5D6}"/>
+              </a:ext>
+            </a:extLst>
+          </p:cNvPr>
+          <p:cNvSpPr>
+            <a:spLocks noGrp="1"/>
+          </p:cNvSpPr>
+          <p:nvPr>
+            <p:ph idx="1"/>
+          </p:nvPr>
+        </p:nvSpPr>
+        <p:spPr>
+          <a:xfrm>
+            <a:off x="438912" y="2512611"/>
+            <a:ext cx="4832803" cy="3664351"/>
+          </a:xfrm>
+        </p:spPr>
+        <p:txBody>
+          <a:bodyPr>
+            <a:normAutofit/>
+          </a:bodyPr>
+          <a:lstStyle/>
+          <a:p>
+            <a:pPr marL="285750" indent="-285750">
+              <a:buFont typeface="Arial" panose="020B0604020202020204" pitchFamily="34" charset="0"/>
+              <a:buChar char="•"/>
+            </a:pPr>
+            <a:r>
+              <a:rPr lang="en-US" sz="1800" dirty="0"/>
+              <a:t>Definition of Healthcare </a:t>
+            </a:r>
+          </a:p>
+          <a:p>
+            <a:pPr marL="285750" indent="-285750">
+              <a:buFont typeface="Arial" panose="020B0604020202020204" pitchFamily="34" charset="0"/>
+              <a:buChar char="•"/>
+            </a:pPr>
+            <a:r>
+              <a:rPr lang="en-US" sz="1800" dirty="0"/>
+              <a:t>Radius</a:t>
+            </a:r>
+          </a:p>
+          <a:p>
+            <a:pPr marL="285750" indent="-285750">
+              <a:buFont typeface="Arial" panose="020B0604020202020204" pitchFamily="34" charset="0"/>
+              <a:buChar char="•"/>
+            </a:pPr>
+            <a:r>
+              <a:rPr lang="en-US" sz="1800" dirty="0"/>
+              <a:t>R value</a:t>
+            </a:r>
+          </a:p>
+        </p:txBody>
+      </p:sp>
+      <p:pic>
+        <p:nvPicPr>
+          <p:cNvPr id="5" name="Picture 4" descr="Chart, scatter chart&#10;&#10;Description automatically generated">
+            <a:extLst>
+              <a:ext uri="{FF2B5EF4-FFF2-40B4-BE49-F238E27FC236}">
+                <a16:creationId xmlns:a16="http://schemas.microsoft.com/office/drawing/2014/main" id="{44840709-885D-8701-2D27-7678B7F7D203}"/>
+              </a:ext>
+            </a:extLst>
+          </p:cNvPr>
+          <p:cNvPicPr>
+            <a:picLocks noChangeAspect="1"/>
+          </p:cNvPicPr>
+          <p:nvPr/>
+        </p:nvPicPr>
+        <p:blipFill rotWithShape="1">
+          <a:blip r:embed="rId2">
+            <a:extLst>
+              <a:ext uri="{28A0092B-C50C-407E-A947-70E740481C1C}">
+                <a14:useLocalDpi xmlns:a14="http://schemas.microsoft.com/office/drawing/2010/main" val="0"/>
+              </a:ext>
+            </a:extLst>
+          </a:blip>
+          <a:srcRect l="6741" t="3219" r="29932" b="2590"/>
+          <a:stretch/>
+        </p:blipFill>
+        <p:spPr>
+          <a:xfrm>
+            <a:off x="6812689" y="3207350"/>
+            <a:ext cx="4537795" cy="3650650"/>
+          </a:xfrm>
+          <a:prstGeom prst="rect">
+            <a:avLst/>
+          </a:prstGeom>
+        </p:spPr>
+      </p:pic>
+      <p:pic>
+        <p:nvPicPr>
+          <p:cNvPr id="6" name="Content Placeholder 4" descr="Chart, bar chart, histogram&#10;&#10;Description automatically generated">
+            <a:extLst>
+              <a:ext uri="{FF2B5EF4-FFF2-40B4-BE49-F238E27FC236}">
+                <a16:creationId xmlns:a16="http://schemas.microsoft.com/office/drawing/2014/main" id="{01F40FD7-B97D-D688-7AFF-CEE8980E7B65}"/>
+              </a:ext>
+            </a:extLst>
+          </p:cNvPr>
+          <p:cNvPicPr>
+            <a:picLocks noChangeAspect="1"/>
+          </p:cNvPicPr>
+          <p:nvPr/>
+        </p:nvPicPr>
+        <p:blipFill rotWithShape="1">
+          <a:blip r:embed="rId3">
+            <a:extLst>
+              <a:ext uri="{28A0092B-C50C-407E-A947-70E740481C1C}">
+                <a14:useLocalDpi xmlns:a14="http://schemas.microsoft.com/office/drawing/2010/main" val="0"/>
+              </a:ext>
+            </a:extLst>
+          </a:blip>
+          <a:srcRect l="6589" t="4740" r="36972"/>
+          <a:stretch/>
+        </p:blipFill>
+        <p:spPr>
+          <a:xfrm>
+            <a:off x="6947452" y="1"/>
+            <a:ext cx="4078000" cy="3211198"/>
+          </a:xfrm>
+          <a:prstGeom prst="rect">
+            <a:avLst/>
+          </a:prstGeom>
+        </p:spPr>
+      </p:pic>
+    </p:spTree>
+    <p:extLst>
+      <p:ext uri="{BB962C8B-B14F-4D97-AF65-F5344CB8AC3E}">
+        <p14:creationId xmlns:p14="http://schemas.microsoft.com/office/powerpoint/2010/main" val="1887973118"/>
+      </p:ext>
+    </p:extLst>
+  </p:cSld>
+  <p:clrMapOvr>
+    <a:masterClrMapping/>
+  </p:clrMapOvr>
+</p:sld>
+</file>
+
+<file path=ppt/slides/slide16.xml><?xml version="1.0" encoding="utf-8"?>
+<p:sld xmlns:a="http://schemas.openxmlformats.org/drawingml/2006/main" xmlns:r="http://schemas.openxmlformats.org/officeDocument/2006/relationships" xmlns:p="http://schemas.openxmlformats.org/presentationml/2006/main" show="0">
   <p:cSld>
     <p:spTree>
       <p:nvGrpSpPr>
@@ -13149,8 +14701,8 @@
 </p:sld>
 </file>
 
-<file path=ppt/slides/slide15.xml><?xml version="1.0" encoding="utf-8"?>
-<p:sld xmlns:a="http://schemas.openxmlformats.org/drawingml/2006/main" xmlns:r="http://schemas.openxmlformats.org/officeDocument/2006/relationships" xmlns:p="http://schemas.openxmlformats.org/presentationml/2006/main">
+<file path=ppt/slides/slide17.xml><?xml version="1.0" encoding="utf-8"?>
+<p:sld xmlns:a="http://schemas.openxmlformats.org/drawingml/2006/main" xmlns:r="http://schemas.openxmlformats.org/officeDocument/2006/relationships" xmlns:p="http://schemas.openxmlformats.org/presentationml/2006/main" show="0">
   <p:cSld>
     <p:spTree>
       <p:nvGrpSpPr>
@@ -13251,8 +14803,838 @@
 </p:sld>
 </file>
 
-<file path=ppt/slides/slide16.xml><?xml version="1.0" encoding="utf-8"?>
+<file path=ppt/slides/slide18.xml><?xml version="1.0" encoding="utf-8"?>
 <p:sld xmlns:a="http://schemas.openxmlformats.org/drawingml/2006/main" xmlns:r="http://schemas.openxmlformats.org/officeDocument/2006/relationships" xmlns:p="http://schemas.openxmlformats.org/presentationml/2006/main">
+  <p:cSld>
+    <p:bg>
+      <p:bgPr>
+        <a:solidFill>
+          <a:schemeClr val="bg1"/>
+        </a:solidFill>
+        <a:effectLst/>
+      </p:bgPr>
+    </p:bg>
+    <p:spTree>
+      <p:nvGrpSpPr>
+        <p:cNvPr id="1" name=""/>
+        <p:cNvGrpSpPr/>
+        <p:nvPr/>
+      </p:nvGrpSpPr>
+      <p:grpSpPr>
+        <a:xfrm>
+          <a:off x="0" y="0"/>
+          <a:ext cx="0" cy="0"/>
+          <a:chOff x="0" y="0"/>
+          <a:chExt cx="0" cy="0"/>
+        </a:xfrm>
+      </p:grpSpPr>
+      <p:sp useBgFill="1">
+        <p:nvSpPr>
+          <p:cNvPr id="14" name="Rectangle 13">
+            <a:extLst>
+              <a:ext uri="{FF2B5EF4-FFF2-40B4-BE49-F238E27FC236}">
+                <a16:creationId xmlns:a16="http://schemas.microsoft.com/office/drawing/2014/main" id="{115719BB-48A7-4AF4-BB91-DC82E0DF727D}"/>
+              </a:ext>
+              <a:ext uri="{C183D7F6-B498-43B3-948B-1728B52AA6E4}">
+                <adec:decorative xmlns:adec="http://schemas.microsoft.com/office/drawing/2017/decorative" val="1"/>
+              </a:ext>
+            </a:extLst>
+          </p:cNvPr>
+          <p:cNvSpPr>
+            <a:spLocks noGrp="1" noRot="1" noChangeAspect="1" noMove="1" noResize="1" noEditPoints="1" noAdjustHandles="1" noChangeArrowheads="1" noChangeShapeType="1" noTextEdit="1"/>
+          </p:cNvSpPr>
+          <p:nvPr>
+            <p:extLst>
+              <p:ext uri="{386F3935-93C4-4BCD-93E2-E3B085C9AB24}">
+                <p16:designElem xmlns:p16="http://schemas.microsoft.com/office/powerpoint/2015/main" val="1"/>
+              </p:ext>
+            </p:extLst>
+          </p:nvPr>
+        </p:nvSpPr>
+        <p:spPr>
+          <a:xfrm>
+            <a:off x="0" y="0"/>
+            <a:ext cx="12192000" cy="6858000"/>
+          </a:xfrm>
+          <a:prstGeom prst="rect">
+            <a:avLst/>
+          </a:prstGeom>
+          <a:ln>
+            <a:noFill/>
+          </a:ln>
+        </p:spPr>
+        <p:style>
+          <a:lnRef idx="2">
+            <a:schemeClr val="accent1">
+              <a:shade val="50000"/>
+            </a:schemeClr>
+          </a:lnRef>
+          <a:fillRef idx="1">
+            <a:schemeClr val="accent1"/>
+          </a:fillRef>
+          <a:effectRef idx="0">
+            <a:schemeClr val="accent1"/>
+          </a:effectRef>
+          <a:fontRef idx="minor">
+            <a:schemeClr val="lt1"/>
+          </a:fontRef>
+        </p:style>
+        <p:txBody>
+          <a:bodyPr rtlCol="0" anchor="ctr"/>
+          <a:lstStyle/>
+          <a:p>
+            <a:pPr algn="ctr"/>
+            <a:endParaRPr lang="en-US"/>
+          </a:p>
+        </p:txBody>
+      </p:sp>
+      <p:sp useBgFill="1">
+        <p:nvSpPr>
+          <p:cNvPr id="16" name="Freeform: Shape 15">
+            <a:extLst>
+              <a:ext uri="{FF2B5EF4-FFF2-40B4-BE49-F238E27FC236}">
+                <a16:creationId xmlns:a16="http://schemas.microsoft.com/office/drawing/2014/main" id="{10973A55-5440-4A99-B526-B5812E46271E}"/>
+              </a:ext>
+              <a:ext uri="{C183D7F6-B498-43B3-948B-1728B52AA6E4}">
+                <adec:decorative xmlns:adec="http://schemas.microsoft.com/office/drawing/2017/decorative" val="1"/>
+              </a:ext>
+            </a:extLst>
+          </p:cNvPr>
+          <p:cNvSpPr>
+            <a:spLocks noGrp="1" noRot="1" noChangeAspect="1" noMove="1" noResize="1" noEditPoints="1" noAdjustHandles="1" noChangeArrowheads="1" noChangeShapeType="1" noTextEdit="1"/>
+          </p:cNvSpPr>
+          <p:nvPr>
+            <p:extLst>
+              <p:ext uri="{386F3935-93C4-4BCD-93E2-E3B085C9AB24}">
+                <p16:designElem xmlns:p16="http://schemas.microsoft.com/office/powerpoint/2015/main" val="1"/>
+              </p:ext>
+            </p:extLst>
+          </p:nvPr>
+        </p:nvSpPr>
+        <p:spPr>
+          <a:xfrm>
+            <a:off x="-1" y="0"/>
+            <a:ext cx="6096002" cy="6858000"/>
+          </a:xfrm>
+          <a:custGeom>
+            <a:avLst/>
+            <a:gdLst>
+              <a:gd name="connsiteX0" fmla="*/ 0 w 6096002"/>
+              <a:gd name="connsiteY0" fmla="*/ 0 h 6858000"/>
+              <a:gd name="connsiteX1" fmla="*/ 4885967 w 6096002"/>
+              <a:gd name="connsiteY1" fmla="*/ 0 h 6858000"/>
+              <a:gd name="connsiteX2" fmla="*/ 4946007 w 6096002"/>
+              <a:gd name="connsiteY2" fmla="*/ 69271 h 6858000"/>
+              <a:gd name="connsiteX3" fmla="*/ 6096002 w 6096002"/>
+              <a:gd name="connsiteY3" fmla="*/ 3429000 h 6858000"/>
+              <a:gd name="connsiteX4" fmla="*/ 4946007 w 6096002"/>
+              <a:gd name="connsiteY4" fmla="*/ 6788730 h 6858000"/>
+              <a:gd name="connsiteX5" fmla="*/ 4885967 w 6096002"/>
+              <a:gd name="connsiteY5" fmla="*/ 6858000 h 6858000"/>
+              <a:gd name="connsiteX6" fmla="*/ 0 w 6096002"/>
+              <a:gd name="connsiteY6" fmla="*/ 6858000 h 6858000"/>
+            </a:gdLst>
+            <a:ahLst/>
+            <a:cxnLst>
+              <a:cxn ang="0">
+                <a:pos x="connsiteX0" y="connsiteY0"/>
+              </a:cxn>
+              <a:cxn ang="0">
+                <a:pos x="connsiteX1" y="connsiteY1"/>
+              </a:cxn>
+              <a:cxn ang="0">
+                <a:pos x="connsiteX2" y="connsiteY2"/>
+              </a:cxn>
+              <a:cxn ang="0">
+                <a:pos x="connsiteX3" y="connsiteY3"/>
+              </a:cxn>
+              <a:cxn ang="0">
+                <a:pos x="connsiteX4" y="connsiteY4"/>
+              </a:cxn>
+              <a:cxn ang="0">
+                <a:pos x="connsiteX5" y="connsiteY5"/>
+              </a:cxn>
+              <a:cxn ang="0">
+                <a:pos x="connsiteX6" y="connsiteY6"/>
+              </a:cxn>
+            </a:cxnLst>
+            <a:rect l="l" t="t" r="r" b="b"/>
+            <a:pathLst>
+              <a:path w="6096002" h="6858000">
+                <a:moveTo>
+                  <a:pt x="0" y="0"/>
+                </a:moveTo>
+                <a:lnTo>
+                  <a:pt x="4885967" y="0"/>
+                </a:lnTo>
+                <a:lnTo>
+                  <a:pt x="4946007" y="69271"/>
+                </a:lnTo>
+                <a:cubicBezTo>
+                  <a:pt x="5656533" y="929100"/>
+                  <a:pt x="6096002" y="2116944"/>
+                  <a:pt x="6096002" y="3429000"/>
+                </a:cubicBezTo>
+                <a:cubicBezTo>
+                  <a:pt x="6096002" y="4741056"/>
+                  <a:pt x="5656533" y="5928900"/>
+                  <a:pt x="4946007" y="6788730"/>
+                </a:cubicBezTo>
+                <a:lnTo>
+                  <a:pt x="4885967" y="6858000"/>
+                </a:lnTo>
+                <a:lnTo>
+                  <a:pt x="0" y="6858000"/>
+                </a:lnTo>
+                <a:close/>
+              </a:path>
+            </a:pathLst>
+          </a:custGeom>
+          <a:ln w="9525">
+            <a:solidFill>
+              <a:srgbClr val="EFEFEF"/>
+            </a:solidFill>
+          </a:ln>
+          <a:effectLst>
+            <a:outerShdw blurRad="88900" dist="38100" algn="l" rotWithShape="0">
+              <a:schemeClr val="bg1">
+                <a:lumMod val="85000"/>
+                <a:alpha val="50000"/>
+              </a:schemeClr>
+            </a:outerShdw>
+          </a:effectLst>
+        </p:spPr>
+        <p:style>
+          <a:lnRef idx="2">
+            <a:schemeClr val="accent1">
+              <a:shade val="50000"/>
+            </a:schemeClr>
+          </a:lnRef>
+          <a:fillRef idx="1">
+            <a:schemeClr val="accent1"/>
+          </a:fillRef>
+          <a:effectRef idx="0">
+            <a:schemeClr val="accent1"/>
+          </a:effectRef>
+          <a:fontRef idx="minor">
+            <a:schemeClr val="lt1"/>
+          </a:fontRef>
+        </p:style>
+        <p:txBody>
+          <a:bodyPr wrap="square" rtlCol="0" anchor="ctr">
+            <a:noAutofit/>
+          </a:bodyPr>
+          <a:lstStyle/>
+          <a:p>
+            <a:pPr marL="0" marR="0" lvl="0" indent="0" algn="ctr" defTabSz="914400" rtl="0" eaLnBrk="1" fontAlgn="auto" latinLnBrk="0" hangingPunct="1">
+              <a:lnSpc>
+                <a:spcPct val="100000"/>
+              </a:lnSpc>
+              <a:spcBef>
+                <a:spcPts val="0"/>
+              </a:spcBef>
+              <a:spcAft>
+                <a:spcPts val="0"/>
+              </a:spcAft>
+              <a:buClrTx/>
+              <a:buSzTx/>
+              <a:buFontTx/>
+              <a:buNone/>
+              <a:tabLst/>
+              <a:defRPr/>
+            </a:pPr>
+            <a:endParaRPr kumimoji="0" lang="en-US" sz="1800" b="0" i="0" u="none" strike="noStrike" kern="1200" cap="none" spc="0" normalizeH="0" baseline="0" noProof="0">
+              <a:ln>
+                <a:noFill/>
+              </a:ln>
+              <a:solidFill>
+                <a:prstClr val="white"/>
+              </a:solidFill>
+              <a:effectLst/>
+              <a:uLnTx/>
+              <a:uFillTx/>
+              <a:latin typeface="Calibri" panose="020F0502020204030204"/>
+              <a:ea typeface="+mn-ea"/>
+              <a:cs typeface="+mn-cs"/>
+            </a:endParaRPr>
+          </a:p>
+        </p:txBody>
+      </p:sp>
+      <p:sp useBgFill="1">
+        <p:nvSpPr>
+          <p:cNvPr id="18" name="Freeform: Shape 17">
+            <a:extLst>
+              <a:ext uri="{FF2B5EF4-FFF2-40B4-BE49-F238E27FC236}">
+                <a16:creationId xmlns:a16="http://schemas.microsoft.com/office/drawing/2014/main" id="{A9682493-588A-4D52-98F6-FBBD80C07ECB}"/>
+              </a:ext>
+              <a:ext uri="{C183D7F6-B498-43B3-948B-1728B52AA6E4}">
+                <adec:decorative xmlns:adec="http://schemas.microsoft.com/office/drawing/2017/decorative" val="1"/>
+              </a:ext>
+            </a:extLst>
+          </p:cNvPr>
+          <p:cNvSpPr>
+            <a:spLocks noGrp="1" noRot="1" noChangeAspect="1" noMove="1" noResize="1" noEditPoints="1" noAdjustHandles="1" noChangeArrowheads="1" noChangeShapeType="1" noTextEdit="1"/>
+          </p:cNvSpPr>
+          <p:nvPr>
+            <p:extLst>
+              <p:ext uri="{386F3935-93C4-4BCD-93E2-E3B085C9AB24}">
+                <p16:designElem xmlns:p16="http://schemas.microsoft.com/office/powerpoint/2015/main" val="1"/>
+              </p:ext>
+            </p:extLst>
+          </p:nvPr>
+        </p:nvSpPr>
+        <p:spPr>
+          <a:xfrm>
+            <a:off x="0" y="0"/>
+            <a:ext cx="6085370" cy="6858000"/>
+          </a:xfrm>
+          <a:custGeom>
+            <a:avLst/>
+            <a:gdLst>
+              <a:gd name="connsiteX0" fmla="*/ 0 w 6085370"/>
+              <a:gd name="connsiteY0" fmla="*/ 0 h 6858000"/>
+              <a:gd name="connsiteX1" fmla="*/ 4875335 w 6085370"/>
+              <a:gd name="connsiteY1" fmla="*/ 0 h 6858000"/>
+              <a:gd name="connsiteX2" fmla="*/ 4935375 w 6085370"/>
+              <a:gd name="connsiteY2" fmla="*/ 69271 h 6858000"/>
+              <a:gd name="connsiteX3" fmla="*/ 6085370 w 6085370"/>
+              <a:gd name="connsiteY3" fmla="*/ 3429000 h 6858000"/>
+              <a:gd name="connsiteX4" fmla="*/ 4935375 w 6085370"/>
+              <a:gd name="connsiteY4" fmla="*/ 6788730 h 6858000"/>
+              <a:gd name="connsiteX5" fmla="*/ 4875335 w 6085370"/>
+              <a:gd name="connsiteY5" fmla="*/ 6858000 h 6858000"/>
+              <a:gd name="connsiteX6" fmla="*/ 0 w 6085370"/>
+              <a:gd name="connsiteY6" fmla="*/ 6858000 h 6858000"/>
+            </a:gdLst>
+            <a:ahLst/>
+            <a:cxnLst>
+              <a:cxn ang="0">
+                <a:pos x="connsiteX0" y="connsiteY0"/>
+              </a:cxn>
+              <a:cxn ang="0">
+                <a:pos x="connsiteX1" y="connsiteY1"/>
+              </a:cxn>
+              <a:cxn ang="0">
+                <a:pos x="connsiteX2" y="connsiteY2"/>
+              </a:cxn>
+              <a:cxn ang="0">
+                <a:pos x="connsiteX3" y="connsiteY3"/>
+              </a:cxn>
+              <a:cxn ang="0">
+                <a:pos x="connsiteX4" y="connsiteY4"/>
+              </a:cxn>
+              <a:cxn ang="0">
+                <a:pos x="connsiteX5" y="connsiteY5"/>
+              </a:cxn>
+              <a:cxn ang="0">
+                <a:pos x="connsiteX6" y="connsiteY6"/>
+              </a:cxn>
+            </a:cxnLst>
+            <a:rect l="l" t="t" r="r" b="b"/>
+            <a:pathLst>
+              <a:path w="6085370" h="6858000">
+                <a:moveTo>
+                  <a:pt x="0" y="0"/>
+                </a:moveTo>
+                <a:lnTo>
+                  <a:pt x="4875335" y="0"/>
+                </a:lnTo>
+                <a:lnTo>
+                  <a:pt x="4935375" y="69271"/>
+                </a:lnTo>
+                <a:cubicBezTo>
+                  <a:pt x="5645901" y="929100"/>
+                  <a:pt x="6085370" y="2116944"/>
+                  <a:pt x="6085370" y="3429000"/>
+                </a:cubicBezTo>
+                <a:cubicBezTo>
+                  <a:pt x="6085370" y="4741056"/>
+                  <a:pt x="5645901" y="5928900"/>
+                  <a:pt x="4935375" y="6788730"/>
+                </a:cubicBezTo>
+                <a:lnTo>
+                  <a:pt x="4875335" y="6858000"/>
+                </a:lnTo>
+                <a:lnTo>
+                  <a:pt x="0" y="6858000"/>
+                </a:lnTo>
+                <a:close/>
+              </a:path>
+            </a:pathLst>
+          </a:custGeom>
+          <a:ln w="9525">
+            <a:noFill/>
+          </a:ln>
+          <a:effectLst/>
+        </p:spPr>
+        <p:style>
+          <a:lnRef idx="2">
+            <a:schemeClr val="accent1">
+              <a:shade val="50000"/>
+            </a:schemeClr>
+          </a:lnRef>
+          <a:fillRef idx="1">
+            <a:schemeClr val="accent1"/>
+          </a:fillRef>
+          <a:effectRef idx="0">
+            <a:schemeClr val="accent1"/>
+          </a:effectRef>
+          <a:fontRef idx="minor">
+            <a:schemeClr val="lt1"/>
+          </a:fontRef>
+        </p:style>
+        <p:txBody>
+          <a:bodyPr wrap="square" rtlCol="0" anchor="ctr">
+            <a:noAutofit/>
+          </a:bodyPr>
+          <a:lstStyle/>
+          <a:p>
+            <a:pPr marL="0" marR="0" lvl="0" indent="0" algn="ctr" defTabSz="914400" rtl="0" eaLnBrk="1" fontAlgn="auto" latinLnBrk="0" hangingPunct="1">
+              <a:lnSpc>
+                <a:spcPct val="100000"/>
+              </a:lnSpc>
+              <a:spcBef>
+                <a:spcPts val="0"/>
+              </a:spcBef>
+              <a:spcAft>
+                <a:spcPts val="0"/>
+              </a:spcAft>
+              <a:buClrTx/>
+              <a:buSzTx/>
+              <a:buFontTx/>
+              <a:buNone/>
+              <a:tabLst/>
+              <a:defRPr/>
+            </a:pPr>
+            <a:endParaRPr kumimoji="0" lang="en-US" sz="1800" b="0" i="0" u="none" strike="noStrike" kern="1200" cap="none" spc="0" normalizeH="0" baseline="0" noProof="0">
+              <a:ln>
+                <a:noFill/>
+              </a:ln>
+              <a:solidFill>
+                <a:prstClr val="white"/>
+              </a:solidFill>
+              <a:effectLst/>
+              <a:uLnTx/>
+              <a:uFillTx/>
+              <a:latin typeface="Calibri" panose="020F0502020204030204"/>
+              <a:ea typeface="+mn-ea"/>
+              <a:cs typeface="+mn-cs"/>
+            </a:endParaRPr>
+          </a:p>
+        </p:txBody>
+      </p:sp>
+      <p:sp>
+        <p:nvSpPr>
+          <p:cNvPr id="2" name="Title 1">
+            <a:extLst>
+              <a:ext uri="{FF2B5EF4-FFF2-40B4-BE49-F238E27FC236}">
+                <a16:creationId xmlns:a16="http://schemas.microsoft.com/office/drawing/2014/main" id="{AA8476FD-ED7D-33A4-13B0-0560C0D3B77B}"/>
+              </a:ext>
+            </a:extLst>
+          </p:cNvPr>
+          <p:cNvSpPr>
+            <a:spLocks noGrp="1"/>
+          </p:cNvSpPr>
+          <p:nvPr>
+            <p:ph type="title"/>
+          </p:nvPr>
+        </p:nvSpPr>
+        <p:spPr>
+          <a:xfrm>
+            <a:off x="438913" y="859536"/>
+            <a:ext cx="4832802" cy="1170432"/>
+          </a:xfrm>
+        </p:spPr>
+        <p:txBody>
+          <a:bodyPr anchor="b">
+            <a:normAutofit/>
+          </a:bodyPr>
+          <a:lstStyle/>
+          <a:p>
+            <a:r>
+              <a:rPr lang="en-US" sz="3400" dirty="0"/>
+              <a:t>University Data</a:t>
+            </a:r>
+          </a:p>
+        </p:txBody>
+      </p:sp>
+      <p:sp>
+        <p:nvSpPr>
+          <p:cNvPr id="20" name="Rectangle 19">
+            <a:extLst>
+              <a:ext uri="{FF2B5EF4-FFF2-40B4-BE49-F238E27FC236}">
+                <a16:creationId xmlns:a16="http://schemas.microsoft.com/office/drawing/2014/main" id="{FBEC5A7A-ADE4-48D9-B89C-2BA1C9110632}"/>
+              </a:ext>
+              <a:ext uri="{C183D7F6-B498-43B3-948B-1728B52AA6E4}">
+                <adec:decorative xmlns:adec="http://schemas.microsoft.com/office/drawing/2017/decorative" val="1"/>
+              </a:ext>
+            </a:extLst>
+          </p:cNvPr>
+          <p:cNvSpPr>
+            <a:spLocks noGrp="1" noRot="1" noChangeAspect="1" noMove="1" noResize="1" noEditPoints="1" noAdjustHandles="1" noChangeArrowheads="1" noChangeShapeType="1" noTextEdit="1"/>
+          </p:cNvSpPr>
+          <p:nvPr>
+            <p:extLst>
+              <p:ext uri="{386F3935-93C4-4BCD-93E2-E3B085C9AB24}">
+                <p16:designElem xmlns:p16="http://schemas.microsoft.com/office/powerpoint/2015/main" val="1"/>
+              </p:ext>
+            </p:extLst>
+          </p:nvPr>
+        </p:nvSpPr>
+        <p:spPr>
+          <a:xfrm rot="5400000">
+            <a:off x="703236" y="363389"/>
+            <a:ext cx="73152" cy="548640"/>
+          </a:xfrm>
+          <a:prstGeom prst="rect">
+            <a:avLst/>
+          </a:prstGeom>
+          <a:solidFill>
+            <a:schemeClr val="accent2"/>
+          </a:solidFill>
+          <a:ln>
+            <a:noFill/>
+          </a:ln>
+        </p:spPr>
+        <p:style>
+          <a:lnRef idx="2">
+            <a:schemeClr val="accent1">
+              <a:shade val="50000"/>
+            </a:schemeClr>
+          </a:lnRef>
+          <a:fillRef idx="1">
+            <a:schemeClr val="accent1"/>
+          </a:fillRef>
+          <a:effectRef idx="0">
+            <a:schemeClr val="accent1"/>
+          </a:effectRef>
+          <a:fontRef idx="minor">
+            <a:schemeClr val="lt1"/>
+          </a:fontRef>
+        </p:style>
+        <p:txBody>
+          <a:bodyPr rtlCol="0" anchor="ctr"/>
+          <a:lstStyle/>
+          <a:p>
+            <a:pPr algn="ctr"/>
+            <a:endParaRPr lang="en-US">
+              <a:solidFill>
+                <a:prstClr val="white"/>
+              </a:solidFill>
+              <a:latin typeface="Calibri" panose="020F0502020204030204"/>
+            </a:endParaRPr>
+          </a:p>
+        </p:txBody>
+      </p:sp>
+      <p:sp>
+        <p:nvSpPr>
+          <p:cNvPr id="22" name="Rectangle 21">
+            <a:extLst>
+              <a:ext uri="{FF2B5EF4-FFF2-40B4-BE49-F238E27FC236}">
+                <a16:creationId xmlns:a16="http://schemas.microsoft.com/office/drawing/2014/main" id="{82095FCE-EF05-4443-B97A-85DEE3A5CA17}"/>
+              </a:ext>
+              <a:ext uri="{C183D7F6-B498-43B3-948B-1728B52AA6E4}">
+                <adec:decorative xmlns:adec="http://schemas.microsoft.com/office/drawing/2017/decorative" val="1"/>
+              </a:ext>
+            </a:extLst>
+          </p:cNvPr>
+          <p:cNvSpPr>
+            <a:spLocks noGrp="1" noRot="1" noChangeAspect="1" noMove="1" noResize="1" noEditPoints="1" noAdjustHandles="1" noChangeArrowheads="1" noChangeShapeType="1" noTextEdit="1"/>
+          </p:cNvSpPr>
+          <p:nvPr>
+            <p:extLst>
+              <p:ext uri="{386F3935-93C4-4BCD-93E2-E3B085C9AB24}">
+                <p16:designElem xmlns:p16="http://schemas.microsoft.com/office/powerpoint/2015/main" val="1"/>
+              </p:ext>
+            </p:extLst>
+          </p:nvPr>
+        </p:nvSpPr>
+        <p:spPr>
+          <a:xfrm>
+            <a:off x="465492" y="2185062"/>
+            <a:ext cx="4937760" cy="18288"/>
+          </a:xfrm>
+          <a:prstGeom prst="rect">
+            <a:avLst/>
+          </a:prstGeom>
+          <a:solidFill>
+            <a:srgbClr val="D5D5D5"/>
+          </a:solidFill>
+          <a:ln w="3175">
+            <a:noFill/>
+          </a:ln>
+          <a:effectLst/>
+        </p:spPr>
+        <p:style>
+          <a:lnRef idx="2">
+            <a:schemeClr val="accent1">
+              <a:shade val="50000"/>
+            </a:schemeClr>
+          </a:lnRef>
+          <a:fillRef idx="1">
+            <a:schemeClr val="accent1"/>
+          </a:fillRef>
+          <a:effectRef idx="0">
+            <a:schemeClr val="accent1"/>
+          </a:effectRef>
+          <a:fontRef idx="minor">
+            <a:schemeClr val="lt1"/>
+          </a:fontRef>
+        </p:style>
+        <p:txBody>
+          <a:bodyPr rtlCol="0" anchor="ctr"/>
+          <a:lstStyle/>
+          <a:p>
+            <a:pPr marL="0" marR="0" lvl="0" indent="0" algn="ctr" defTabSz="914400" rtl="0" eaLnBrk="1" fontAlgn="auto" latinLnBrk="0" hangingPunct="1">
+              <a:lnSpc>
+                <a:spcPct val="100000"/>
+              </a:lnSpc>
+              <a:spcBef>
+                <a:spcPts val="0"/>
+              </a:spcBef>
+              <a:spcAft>
+                <a:spcPts val="0"/>
+              </a:spcAft>
+              <a:buClrTx/>
+              <a:buSzTx/>
+              <a:buFontTx/>
+              <a:buNone/>
+              <a:tabLst/>
+              <a:defRPr/>
+            </a:pPr>
+            <a:endParaRPr kumimoji="0" lang="en-US" sz="1800" b="0" i="0" u="none" strike="noStrike" kern="1200" cap="none" spc="0" normalizeH="0" baseline="0" noProof="0">
+              <a:ln>
+                <a:noFill/>
+              </a:ln>
+              <a:solidFill>
+                <a:prstClr val="white"/>
+              </a:solidFill>
+              <a:effectLst/>
+              <a:uLnTx/>
+              <a:uFillTx/>
+              <a:latin typeface="Calibri" panose="020F0502020204030204"/>
+              <a:ea typeface="+mn-ea"/>
+              <a:cs typeface="+mn-cs"/>
+            </a:endParaRPr>
+          </a:p>
+        </p:txBody>
+      </p:sp>
+      <p:sp>
+        <p:nvSpPr>
+          <p:cNvPr id="11" name="Content Placeholder 10">
+            <a:extLst>
+              <a:ext uri="{FF2B5EF4-FFF2-40B4-BE49-F238E27FC236}">
+                <a16:creationId xmlns:a16="http://schemas.microsoft.com/office/drawing/2014/main" id="{D676152A-A8FD-283A-8776-E919A481B5D6}"/>
+              </a:ext>
+            </a:extLst>
+          </p:cNvPr>
+          <p:cNvSpPr>
+            <a:spLocks noGrp="1"/>
+          </p:cNvSpPr>
+          <p:nvPr>
+            <p:ph idx="1"/>
+          </p:nvPr>
+        </p:nvSpPr>
+        <p:spPr>
+          <a:xfrm>
+            <a:off x="438912" y="2512611"/>
+            <a:ext cx="4832803" cy="3664351"/>
+          </a:xfrm>
+        </p:spPr>
+        <p:txBody>
+          <a:bodyPr>
+            <a:normAutofit fontScale="77500" lnSpcReduction="20000"/>
+          </a:bodyPr>
+          <a:lstStyle/>
+          <a:p>
+            <a:r>
+              <a:rPr lang="en-US" sz="1800" dirty="0">
+                <a:latin typeface="New time"/>
+              </a:rPr>
+              <a:t>For my part of this group project, I used </a:t>
+            </a:r>
+            <a:r>
+              <a:rPr lang="en-US" sz="1800" dirty="0" err="1">
+                <a:latin typeface="New time"/>
+              </a:rPr>
+              <a:t>Geoapify</a:t>
+            </a:r>
+            <a:r>
+              <a:rPr lang="en-US" sz="1800" dirty="0">
+                <a:latin typeface="New time"/>
+              </a:rPr>
+              <a:t> to see if the presence of University increase home price  in the state of Colorado.</a:t>
+            </a:r>
+          </a:p>
+          <a:p>
+            <a:endParaRPr lang="en-US" sz="1800" dirty="0">
+              <a:latin typeface="New time"/>
+            </a:endParaRPr>
+          </a:p>
+          <a:p>
+            <a:r>
+              <a:rPr lang="en-US" sz="1800" dirty="0">
+                <a:latin typeface="New time"/>
+              </a:rPr>
+              <a:t>Per the bar chart, Colorado Spring has 31 University vs Breckenridge and Frisco with zero.</a:t>
+            </a:r>
+          </a:p>
+          <a:p>
+            <a:endParaRPr lang="en-US" sz="1800" dirty="0">
+              <a:latin typeface="New time"/>
+            </a:endParaRPr>
+          </a:p>
+          <a:p>
+            <a:r>
+              <a:rPr lang="en-US" sz="1800" dirty="0">
+                <a:latin typeface="New time"/>
+              </a:rPr>
+              <a:t>Based on my finding, a strong demand for a good University nearby can drive property values higher.</a:t>
+            </a:r>
+          </a:p>
+          <a:p>
+            <a:endParaRPr lang="en-US" sz="1800" dirty="0">
+              <a:latin typeface="New time"/>
+            </a:endParaRPr>
+          </a:p>
+          <a:p>
+            <a:r>
+              <a:rPr lang="en-US" sz="1800" dirty="0">
+                <a:latin typeface="New time"/>
+              </a:rPr>
+              <a:t>I believe there are limitation to this dataset. In future project, I would expand my supported categories to “</a:t>
+            </a:r>
+            <a:r>
+              <a:rPr lang="en-US" sz="1800" b="0" i="0" dirty="0" err="1">
+                <a:effectLst/>
+                <a:latin typeface="New time"/>
+              </a:rPr>
+              <a:t>education.school</a:t>
+            </a:r>
+            <a:r>
+              <a:rPr lang="en-US" sz="1800" b="0" i="0" dirty="0">
+                <a:effectLst/>
+                <a:latin typeface="New time"/>
+              </a:rPr>
+              <a:t>” instead of limiting it to “</a:t>
+            </a:r>
+            <a:r>
+              <a:rPr lang="en-US" sz="1800" b="0" i="0" dirty="0" err="1">
+                <a:effectLst/>
+                <a:latin typeface="New time"/>
+              </a:rPr>
+              <a:t>education.university</a:t>
+            </a:r>
+            <a:r>
+              <a:rPr lang="en-US" sz="1800" b="0" i="0" dirty="0">
+                <a:effectLst/>
+                <a:latin typeface="New time"/>
+              </a:rPr>
+              <a:t>”</a:t>
+            </a:r>
+          </a:p>
+          <a:p>
+            <a:endParaRPr lang="en-US" sz="1800" dirty="0">
+              <a:latin typeface="New time"/>
+            </a:endParaRPr>
+          </a:p>
+          <a:p>
+            <a:r>
+              <a:rPr lang="en-US" sz="1800" dirty="0">
+                <a:latin typeface="New time"/>
+              </a:rPr>
+              <a:t>Also, it would be helpful to identify the homebuyers age, race/ethnicity, marital status and/or education.</a:t>
+            </a:r>
+          </a:p>
+        </p:txBody>
+      </p:sp>
+      <p:pic>
+        <p:nvPicPr>
+          <p:cNvPr id="3" name="Picture 2">
+            <a:extLst>
+              <a:ext uri="{FF2B5EF4-FFF2-40B4-BE49-F238E27FC236}">
+                <a16:creationId xmlns:a16="http://schemas.microsoft.com/office/drawing/2014/main" id="{F351754F-F8CE-1FD0-F9F5-C04F4A5A395F}"/>
+              </a:ext>
+            </a:extLst>
+          </p:cNvPr>
+          <p:cNvPicPr>
+            <a:picLocks noChangeAspect="1"/>
+          </p:cNvPicPr>
+          <p:nvPr/>
+        </p:nvPicPr>
+        <p:blipFill>
+          <a:blip r:embed="rId2">
+            <a:extLst>
+              <a:ext uri="{28A0092B-C50C-407E-A947-70E740481C1C}">
+                <a14:useLocalDpi xmlns:a14="http://schemas.microsoft.com/office/drawing/2010/main" val="0"/>
+              </a:ext>
+            </a:extLst>
+          </a:blip>
+          <a:stretch>
+            <a:fillRect/>
+          </a:stretch>
+        </p:blipFill>
+        <p:spPr>
+          <a:xfrm>
+            <a:off x="6649282" y="43646"/>
+            <a:ext cx="4700127" cy="3506445"/>
+          </a:xfrm>
+          <a:prstGeom prst="rect">
+            <a:avLst/>
+          </a:prstGeom>
+        </p:spPr>
+      </p:pic>
+      <p:pic>
+        <p:nvPicPr>
+          <p:cNvPr id="4" name="Picture 3">
+            <a:extLst>
+              <a:ext uri="{FF2B5EF4-FFF2-40B4-BE49-F238E27FC236}">
+                <a16:creationId xmlns:a16="http://schemas.microsoft.com/office/drawing/2014/main" id="{91153885-3A2C-9F15-D235-409A680E1A21}"/>
+              </a:ext>
+            </a:extLst>
+          </p:cNvPr>
+          <p:cNvPicPr>
+            <a:picLocks noChangeAspect="1"/>
+          </p:cNvPicPr>
+          <p:nvPr/>
+        </p:nvPicPr>
+        <p:blipFill>
+          <a:blip r:embed="rId3">
+            <a:extLst>
+              <a:ext uri="{28A0092B-C50C-407E-A947-70E740481C1C}">
+                <a14:useLocalDpi xmlns:a14="http://schemas.microsoft.com/office/drawing/2010/main" val="0"/>
+              </a:ext>
+            </a:extLst>
+          </a:blip>
+          <a:stretch>
+            <a:fillRect/>
+          </a:stretch>
+        </p:blipFill>
+        <p:spPr>
+          <a:xfrm>
+            <a:off x="6361044" y="3498573"/>
+            <a:ext cx="5194724" cy="3315781"/>
+          </a:xfrm>
+          <a:prstGeom prst="rect">
+            <a:avLst/>
+          </a:prstGeom>
+        </p:spPr>
+      </p:pic>
+    </p:spTree>
+    <p:extLst>
+      <p:ext uri="{BB962C8B-B14F-4D97-AF65-F5344CB8AC3E}">
+        <p14:creationId xmlns:p14="http://schemas.microsoft.com/office/powerpoint/2010/main" val="3758379911"/>
+      </p:ext>
+    </p:extLst>
+  </p:cSld>
+  <p:clrMapOvr>
+    <a:masterClrMapping/>
+  </p:clrMapOvr>
+</p:sld>
+</file>
+
+<file path=ppt/slides/slide19.xml><?xml version="1.0" encoding="utf-8"?>
+<p:sld xmlns:a="http://schemas.openxmlformats.org/drawingml/2006/main" xmlns:r="http://schemas.openxmlformats.org/officeDocument/2006/relationships" xmlns:p="http://schemas.openxmlformats.org/presentationml/2006/main" show="0">
   <p:cSld>
     <p:spTree>
       <p:nvGrpSpPr>
@@ -13286,7 +15668,7 @@
         </p:nvSpPr>
         <p:spPr>
           <a:xfrm>
-            <a:off x="838200" y="1972733"/>
+            <a:off x="842591" y="1982672"/>
             <a:ext cx="3090333" cy="4204230"/>
           </a:xfrm>
         </p:spPr>
@@ -13428,8 +15810,8 @@
         </p:blipFill>
         <p:spPr>
           <a:xfrm>
-            <a:off x="7030431" y="95881"/>
-            <a:ext cx="4597270" cy="3429710"/>
+            <a:off x="6649282" y="43646"/>
+            <a:ext cx="4700127" cy="3506445"/>
           </a:xfrm>
           <a:prstGeom prst="rect">
             <a:avLst/>
@@ -13464,8 +15846,8 @@
         </p:blipFill>
         <p:spPr>
           <a:xfrm>
-            <a:off x="7030430" y="3873606"/>
-            <a:ext cx="4525337" cy="2888513"/>
+            <a:off x="6361044" y="3498573"/>
+            <a:ext cx="5194724" cy="3315781"/>
           </a:xfrm>
           <a:prstGeom prst="rect">
             <a:avLst/>
@@ -13476,154 +15858,6 @@
     <p:extLst>
       <p:ext uri="{BB962C8B-B14F-4D97-AF65-F5344CB8AC3E}">
         <p14:creationId xmlns:p14="http://schemas.microsoft.com/office/powerpoint/2010/main" val="3088322973"/>
-      </p:ext>
-    </p:extLst>
-  </p:cSld>
-  <p:clrMapOvr>
-    <a:masterClrMapping/>
-  </p:clrMapOvr>
-</p:sld>
-</file>
-
-<file path=ppt/slides/slide17.xml><?xml version="1.0" encoding="utf-8"?>
-<p:sld xmlns:a="http://schemas.openxmlformats.org/drawingml/2006/main" xmlns:r="http://schemas.openxmlformats.org/officeDocument/2006/relationships" xmlns:p="http://schemas.openxmlformats.org/presentationml/2006/main">
-  <p:cSld>
-    <p:spTree>
-      <p:nvGrpSpPr>
-        <p:cNvPr id="1" name=""/>
-        <p:cNvGrpSpPr/>
-        <p:nvPr/>
-      </p:nvGrpSpPr>
-      <p:grpSpPr>
-        <a:xfrm>
-          <a:off x="0" y="0"/>
-          <a:ext cx="0" cy="0"/>
-          <a:chOff x="0" y="0"/>
-          <a:chExt cx="0" cy="0"/>
-        </a:xfrm>
-      </p:grpSpPr>
-      <p:sp>
-        <p:nvSpPr>
-          <p:cNvPr id="3" name="Subtitle 2">
-            <a:extLst>
-              <a:ext uri="{FF2B5EF4-FFF2-40B4-BE49-F238E27FC236}">
-                <a16:creationId xmlns:a16="http://schemas.microsoft.com/office/drawing/2014/main" id="{64E58ADE-DE15-3AA7-F468-6C74AFCE2BCA}"/>
-              </a:ext>
-            </a:extLst>
-          </p:cNvPr>
-          <p:cNvSpPr>
-            <a:spLocks noGrp="1"/>
-          </p:cNvSpPr>
-          <p:nvPr>
-            <p:ph type="subTitle" idx="1"/>
-          </p:nvPr>
-        </p:nvSpPr>
-        <p:spPr>
-          <a:xfrm>
-            <a:off x="563596" y="4731026"/>
-            <a:ext cx="11064807" cy="1749286"/>
-          </a:xfrm>
-        </p:spPr>
-        <p:txBody>
-          <a:bodyPr>
-            <a:normAutofit/>
-          </a:bodyPr>
-          <a:lstStyle/>
-          <a:p>
-            <a:pPr algn="l"/>
-            <a:r>
-              <a:rPr lang="en-US" dirty="0"/>
-              <a:t>- Radius = 10 km</a:t>
-            </a:r>
-          </a:p>
-          <a:p>
-            <a:pPr algn="l"/>
-            <a:r>
-              <a:rPr lang="en-US" dirty="0"/>
-              <a:t>- Using </a:t>
-            </a:r>
-            <a:r>
-              <a:rPr lang="en-US" dirty="0" err="1"/>
-              <a:t>plot_linear_regression</a:t>
-            </a:r>
-            <a:r>
-              <a:rPr lang="en-US" dirty="0"/>
-              <a:t>, it was found that the </a:t>
-            </a:r>
-            <a:r>
-              <a:rPr lang="en-US" dirty="0" err="1"/>
-              <a:t>r-value</a:t>
-            </a:r>
-            <a:r>
-              <a:rPr lang="en-US" dirty="0"/>
-              <a:t> is -0.25763.  This would indicate that coffee shops are not very strongly correlated to typical single-family home price.</a:t>
-            </a:r>
-          </a:p>
-        </p:txBody>
-      </p:sp>
-      <p:pic>
-        <p:nvPicPr>
-          <p:cNvPr id="5" name="Picture 4" descr="Chart, bar chart&#10;&#10;Description automatically generated">
-            <a:extLst>
-              <a:ext uri="{FF2B5EF4-FFF2-40B4-BE49-F238E27FC236}">
-                <a16:creationId xmlns:a16="http://schemas.microsoft.com/office/drawing/2014/main" id="{52A79CB0-DA3C-2AA7-E53B-893E0D0A2071}"/>
-              </a:ext>
-            </a:extLst>
-          </p:cNvPr>
-          <p:cNvPicPr>
-            <a:picLocks noChangeAspect="1"/>
-          </p:cNvPicPr>
-          <p:nvPr/>
-        </p:nvPicPr>
-        <p:blipFill rotWithShape="1">
-          <a:blip r:embed="rId3"/>
-          <a:srcRect l="5926" r="5002"/>
-          <a:stretch/>
-        </p:blipFill>
-        <p:spPr>
-          <a:xfrm>
-            <a:off x="129211" y="128688"/>
-            <a:ext cx="5506275" cy="3955773"/>
-          </a:xfrm>
-          <a:prstGeom prst="rect">
-            <a:avLst/>
-          </a:prstGeom>
-        </p:spPr>
-      </p:pic>
-      <p:pic>
-        <p:nvPicPr>
-          <p:cNvPr id="9" name="Picture 8">
-            <a:extLst>
-              <a:ext uri="{FF2B5EF4-FFF2-40B4-BE49-F238E27FC236}">
-                <a16:creationId xmlns:a16="http://schemas.microsoft.com/office/drawing/2014/main" id="{34558095-D121-0AA9-5447-08D04CA3F1F3}"/>
-              </a:ext>
-            </a:extLst>
-          </p:cNvPr>
-          <p:cNvPicPr>
-            <a:picLocks noChangeAspect="1"/>
-          </p:cNvPicPr>
-          <p:nvPr/>
-        </p:nvPicPr>
-        <p:blipFill>
-          <a:blip r:embed="rId4"/>
-          <a:stretch>
-            <a:fillRect/>
-          </a:stretch>
-        </p:blipFill>
-        <p:spPr>
-          <a:xfrm>
-            <a:off x="5970513" y="128689"/>
-            <a:ext cx="6221487" cy="3955773"/>
-          </a:xfrm>
-          <a:prstGeom prst="rect">
-            <a:avLst/>
-          </a:prstGeom>
-        </p:spPr>
-      </p:pic>
-    </p:spTree>
-    <p:extLst>
-      <p:ext uri="{BB962C8B-B14F-4D97-AF65-F5344CB8AC3E}">
-        <p14:creationId xmlns:p14="http://schemas.microsoft.com/office/powerpoint/2010/main" val="4126349660"/>
       </p:ext>
     </p:extLst>
   </p:cSld>
@@ -14122,6 +16356,919 @@
     <p:extLst>
       <p:ext uri="{BB962C8B-B14F-4D97-AF65-F5344CB8AC3E}">
         <p14:creationId xmlns:p14="http://schemas.microsoft.com/office/powerpoint/2010/main" val="4224886598"/>
+      </p:ext>
+    </p:extLst>
+  </p:cSld>
+  <p:clrMapOvr>
+    <a:masterClrMapping/>
+  </p:clrMapOvr>
+</p:sld>
+</file>
+
+<file path=ppt/slides/slide20.xml><?xml version="1.0" encoding="utf-8"?>
+<p:sld xmlns:a="http://schemas.openxmlformats.org/drawingml/2006/main" xmlns:r="http://schemas.openxmlformats.org/officeDocument/2006/relationships" xmlns:p="http://schemas.openxmlformats.org/presentationml/2006/main">
+  <p:cSld>
+    <p:bg>
+      <p:bgPr>
+        <a:solidFill>
+          <a:schemeClr val="bg1"/>
+        </a:solidFill>
+        <a:effectLst/>
+      </p:bgPr>
+    </p:bg>
+    <p:spTree>
+      <p:nvGrpSpPr>
+        <p:cNvPr id="1" name=""/>
+        <p:cNvGrpSpPr/>
+        <p:nvPr/>
+      </p:nvGrpSpPr>
+      <p:grpSpPr>
+        <a:xfrm>
+          <a:off x="0" y="0"/>
+          <a:ext cx="0" cy="0"/>
+          <a:chOff x="0" y="0"/>
+          <a:chExt cx="0" cy="0"/>
+        </a:xfrm>
+      </p:grpSpPr>
+      <p:sp useBgFill="1">
+        <p:nvSpPr>
+          <p:cNvPr id="14" name="Rectangle 13">
+            <a:extLst>
+              <a:ext uri="{FF2B5EF4-FFF2-40B4-BE49-F238E27FC236}">
+                <a16:creationId xmlns:a16="http://schemas.microsoft.com/office/drawing/2014/main" id="{115719BB-48A7-4AF4-BB91-DC82E0DF727D}"/>
+              </a:ext>
+              <a:ext uri="{C183D7F6-B498-43B3-948B-1728B52AA6E4}">
+                <adec:decorative xmlns:adec="http://schemas.microsoft.com/office/drawing/2017/decorative" val="1"/>
+              </a:ext>
+            </a:extLst>
+          </p:cNvPr>
+          <p:cNvSpPr>
+            <a:spLocks noGrp="1" noRot="1" noChangeAspect="1" noMove="1" noResize="1" noEditPoints="1" noAdjustHandles="1" noChangeArrowheads="1" noChangeShapeType="1" noTextEdit="1"/>
+          </p:cNvSpPr>
+          <p:nvPr>
+            <p:extLst>
+              <p:ext uri="{386F3935-93C4-4BCD-93E2-E3B085C9AB24}">
+                <p16:designElem xmlns:p16="http://schemas.microsoft.com/office/powerpoint/2015/main" val="1"/>
+              </p:ext>
+            </p:extLst>
+          </p:nvPr>
+        </p:nvSpPr>
+        <p:spPr>
+          <a:xfrm>
+            <a:off x="0" y="0"/>
+            <a:ext cx="12192000" cy="6858000"/>
+          </a:xfrm>
+          <a:prstGeom prst="rect">
+            <a:avLst/>
+          </a:prstGeom>
+          <a:ln>
+            <a:noFill/>
+          </a:ln>
+        </p:spPr>
+        <p:style>
+          <a:lnRef idx="2">
+            <a:schemeClr val="accent1">
+              <a:shade val="50000"/>
+            </a:schemeClr>
+          </a:lnRef>
+          <a:fillRef idx="1">
+            <a:schemeClr val="accent1"/>
+          </a:fillRef>
+          <a:effectRef idx="0">
+            <a:schemeClr val="accent1"/>
+          </a:effectRef>
+          <a:fontRef idx="minor">
+            <a:schemeClr val="lt1"/>
+          </a:fontRef>
+        </p:style>
+        <p:txBody>
+          <a:bodyPr rtlCol="0" anchor="ctr"/>
+          <a:lstStyle/>
+          <a:p>
+            <a:pPr algn="ctr"/>
+            <a:endParaRPr lang="en-US"/>
+          </a:p>
+        </p:txBody>
+      </p:sp>
+      <p:sp useBgFill="1">
+        <p:nvSpPr>
+          <p:cNvPr id="16" name="Freeform: Shape 15">
+            <a:extLst>
+              <a:ext uri="{FF2B5EF4-FFF2-40B4-BE49-F238E27FC236}">
+                <a16:creationId xmlns:a16="http://schemas.microsoft.com/office/drawing/2014/main" id="{10973A55-5440-4A99-B526-B5812E46271E}"/>
+              </a:ext>
+              <a:ext uri="{C183D7F6-B498-43B3-948B-1728B52AA6E4}">
+                <adec:decorative xmlns:adec="http://schemas.microsoft.com/office/drawing/2017/decorative" val="1"/>
+              </a:ext>
+            </a:extLst>
+          </p:cNvPr>
+          <p:cNvSpPr>
+            <a:spLocks noGrp="1" noRot="1" noChangeAspect="1" noMove="1" noResize="1" noEditPoints="1" noAdjustHandles="1" noChangeArrowheads="1" noChangeShapeType="1" noTextEdit="1"/>
+          </p:cNvSpPr>
+          <p:nvPr>
+            <p:extLst>
+              <p:ext uri="{386F3935-93C4-4BCD-93E2-E3B085C9AB24}">
+                <p16:designElem xmlns:p16="http://schemas.microsoft.com/office/powerpoint/2015/main" val="1"/>
+              </p:ext>
+            </p:extLst>
+          </p:nvPr>
+        </p:nvSpPr>
+        <p:spPr>
+          <a:xfrm>
+            <a:off x="-1" y="0"/>
+            <a:ext cx="6096002" cy="6858000"/>
+          </a:xfrm>
+          <a:custGeom>
+            <a:avLst/>
+            <a:gdLst>
+              <a:gd name="connsiteX0" fmla="*/ 0 w 6096002"/>
+              <a:gd name="connsiteY0" fmla="*/ 0 h 6858000"/>
+              <a:gd name="connsiteX1" fmla="*/ 4885967 w 6096002"/>
+              <a:gd name="connsiteY1" fmla="*/ 0 h 6858000"/>
+              <a:gd name="connsiteX2" fmla="*/ 4946007 w 6096002"/>
+              <a:gd name="connsiteY2" fmla="*/ 69271 h 6858000"/>
+              <a:gd name="connsiteX3" fmla="*/ 6096002 w 6096002"/>
+              <a:gd name="connsiteY3" fmla="*/ 3429000 h 6858000"/>
+              <a:gd name="connsiteX4" fmla="*/ 4946007 w 6096002"/>
+              <a:gd name="connsiteY4" fmla="*/ 6788730 h 6858000"/>
+              <a:gd name="connsiteX5" fmla="*/ 4885967 w 6096002"/>
+              <a:gd name="connsiteY5" fmla="*/ 6858000 h 6858000"/>
+              <a:gd name="connsiteX6" fmla="*/ 0 w 6096002"/>
+              <a:gd name="connsiteY6" fmla="*/ 6858000 h 6858000"/>
+            </a:gdLst>
+            <a:ahLst/>
+            <a:cxnLst>
+              <a:cxn ang="0">
+                <a:pos x="connsiteX0" y="connsiteY0"/>
+              </a:cxn>
+              <a:cxn ang="0">
+                <a:pos x="connsiteX1" y="connsiteY1"/>
+              </a:cxn>
+              <a:cxn ang="0">
+                <a:pos x="connsiteX2" y="connsiteY2"/>
+              </a:cxn>
+              <a:cxn ang="0">
+                <a:pos x="connsiteX3" y="connsiteY3"/>
+              </a:cxn>
+              <a:cxn ang="0">
+                <a:pos x="connsiteX4" y="connsiteY4"/>
+              </a:cxn>
+              <a:cxn ang="0">
+                <a:pos x="connsiteX5" y="connsiteY5"/>
+              </a:cxn>
+              <a:cxn ang="0">
+                <a:pos x="connsiteX6" y="connsiteY6"/>
+              </a:cxn>
+            </a:cxnLst>
+            <a:rect l="l" t="t" r="r" b="b"/>
+            <a:pathLst>
+              <a:path w="6096002" h="6858000">
+                <a:moveTo>
+                  <a:pt x="0" y="0"/>
+                </a:moveTo>
+                <a:lnTo>
+                  <a:pt x="4885967" y="0"/>
+                </a:lnTo>
+                <a:lnTo>
+                  <a:pt x="4946007" y="69271"/>
+                </a:lnTo>
+                <a:cubicBezTo>
+                  <a:pt x="5656533" y="929100"/>
+                  <a:pt x="6096002" y="2116944"/>
+                  <a:pt x="6096002" y="3429000"/>
+                </a:cubicBezTo>
+                <a:cubicBezTo>
+                  <a:pt x="6096002" y="4741056"/>
+                  <a:pt x="5656533" y="5928900"/>
+                  <a:pt x="4946007" y="6788730"/>
+                </a:cubicBezTo>
+                <a:lnTo>
+                  <a:pt x="4885967" y="6858000"/>
+                </a:lnTo>
+                <a:lnTo>
+                  <a:pt x="0" y="6858000"/>
+                </a:lnTo>
+                <a:close/>
+              </a:path>
+            </a:pathLst>
+          </a:custGeom>
+          <a:ln w="9525">
+            <a:solidFill>
+              <a:srgbClr val="EFEFEF"/>
+            </a:solidFill>
+          </a:ln>
+          <a:effectLst>
+            <a:outerShdw blurRad="88900" dist="38100" algn="l" rotWithShape="0">
+              <a:schemeClr val="bg1">
+                <a:lumMod val="85000"/>
+                <a:alpha val="50000"/>
+              </a:schemeClr>
+            </a:outerShdw>
+          </a:effectLst>
+        </p:spPr>
+        <p:style>
+          <a:lnRef idx="2">
+            <a:schemeClr val="accent1">
+              <a:shade val="50000"/>
+            </a:schemeClr>
+          </a:lnRef>
+          <a:fillRef idx="1">
+            <a:schemeClr val="accent1"/>
+          </a:fillRef>
+          <a:effectRef idx="0">
+            <a:schemeClr val="accent1"/>
+          </a:effectRef>
+          <a:fontRef idx="minor">
+            <a:schemeClr val="lt1"/>
+          </a:fontRef>
+        </p:style>
+        <p:txBody>
+          <a:bodyPr wrap="square" rtlCol="0" anchor="ctr">
+            <a:noAutofit/>
+          </a:bodyPr>
+          <a:lstStyle/>
+          <a:p>
+            <a:pPr marL="0" marR="0" lvl="0" indent="0" algn="ctr" defTabSz="914400" rtl="0" eaLnBrk="1" fontAlgn="auto" latinLnBrk="0" hangingPunct="1">
+              <a:lnSpc>
+                <a:spcPct val="100000"/>
+              </a:lnSpc>
+              <a:spcBef>
+                <a:spcPts val="0"/>
+              </a:spcBef>
+              <a:spcAft>
+                <a:spcPts val="0"/>
+              </a:spcAft>
+              <a:buClrTx/>
+              <a:buSzTx/>
+              <a:buFontTx/>
+              <a:buNone/>
+              <a:tabLst/>
+              <a:defRPr/>
+            </a:pPr>
+            <a:endParaRPr kumimoji="0" lang="en-US" sz="1800" b="0" i="0" u="none" strike="noStrike" kern="1200" cap="none" spc="0" normalizeH="0" baseline="0" noProof="0">
+              <a:ln>
+                <a:noFill/>
+              </a:ln>
+              <a:solidFill>
+                <a:prstClr val="white"/>
+              </a:solidFill>
+              <a:effectLst/>
+              <a:uLnTx/>
+              <a:uFillTx/>
+              <a:latin typeface="Calibri" panose="020F0502020204030204"/>
+              <a:ea typeface="+mn-ea"/>
+              <a:cs typeface="+mn-cs"/>
+            </a:endParaRPr>
+          </a:p>
+        </p:txBody>
+      </p:sp>
+      <p:sp useBgFill="1">
+        <p:nvSpPr>
+          <p:cNvPr id="18" name="Freeform: Shape 17">
+            <a:extLst>
+              <a:ext uri="{FF2B5EF4-FFF2-40B4-BE49-F238E27FC236}">
+                <a16:creationId xmlns:a16="http://schemas.microsoft.com/office/drawing/2014/main" id="{A9682493-588A-4D52-98F6-FBBD80C07ECB}"/>
+              </a:ext>
+              <a:ext uri="{C183D7F6-B498-43B3-948B-1728B52AA6E4}">
+                <adec:decorative xmlns:adec="http://schemas.microsoft.com/office/drawing/2017/decorative" val="1"/>
+              </a:ext>
+            </a:extLst>
+          </p:cNvPr>
+          <p:cNvSpPr>
+            <a:spLocks noGrp="1" noRot="1" noChangeAspect="1" noMove="1" noResize="1" noEditPoints="1" noAdjustHandles="1" noChangeArrowheads="1" noChangeShapeType="1" noTextEdit="1"/>
+          </p:cNvSpPr>
+          <p:nvPr>
+            <p:extLst>
+              <p:ext uri="{386F3935-93C4-4BCD-93E2-E3B085C9AB24}">
+                <p16:designElem xmlns:p16="http://schemas.microsoft.com/office/powerpoint/2015/main" val="1"/>
+              </p:ext>
+            </p:extLst>
+          </p:nvPr>
+        </p:nvSpPr>
+        <p:spPr>
+          <a:xfrm>
+            <a:off x="0" y="0"/>
+            <a:ext cx="6085370" cy="6858000"/>
+          </a:xfrm>
+          <a:custGeom>
+            <a:avLst/>
+            <a:gdLst>
+              <a:gd name="connsiteX0" fmla="*/ 0 w 6085370"/>
+              <a:gd name="connsiteY0" fmla="*/ 0 h 6858000"/>
+              <a:gd name="connsiteX1" fmla="*/ 4875335 w 6085370"/>
+              <a:gd name="connsiteY1" fmla="*/ 0 h 6858000"/>
+              <a:gd name="connsiteX2" fmla="*/ 4935375 w 6085370"/>
+              <a:gd name="connsiteY2" fmla="*/ 69271 h 6858000"/>
+              <a:gd name="connsiteX3" fmla="*/ 6085370 w 6085370"/>
+              <a:gd name="connsiteY3" fmla="*/ 3429000 h 6858000"/>
+              <a:gd name="connsiteX4" fmla="*/ 4935375 w 6085370"/>
+              <a:gd name="connsiteY4" fmla="*/ 6788730 h 6858000"/>
+              <a:gd name="connsiteX5" fmla="*/ 4875335 w 6085370"/>
+              <a:gd name="connsiteY5" fmla="*/ 6858000 h 6858000"/>
+              <a:gd name="connsiteX6" fmla="*/ 0 w 6085370"/>
+              <a:gd name="connsiteY6" fmla="*/ 6858000 h 6858000"/>
+            </a:gdLst>
+            <a:ahLst/>
+            <a:cxnLst>
+              <a:cxn ang="0">
+                <a:pos x="connsiteX0" y="connsiteY0"/>
+              </a:cxn>
+              <a:cxn ang="0">
+                <a:pos x="connsiteX1" y="connsiteY1"/>
+              </a:cxn>
+              <a:cxn ang="0">
+                <a:pos x="connsiteX2" y="connsiteY2"/>
+              </a:cxn>
+              <a:cxn ang="0">
+                <a:pos x="connsiteX3" y="connsiteY3"/>
+              </a:cxn>
+              <a:cxn ang="0">
+                <a:pos x="connsiteX4" y="connsiteY4"/>
+              </a:cxn>
+              <a:cxn ang="0">
+                <a:pos x="connsiteX5" y="connsiteY5"/>
+              </a:cxn>
+              <a:cxn ang="0">
+                <a:pos x="connsiteX6" y="connsiteY6"/>
+              </a:cxn>
+            </a:cxnLst>
+            <a:rect l="l" t="t" r="r" b="b"/>
+            <a:pathLst>
+              <a:path w="6085370" h="6858000">
+                <a:moveTo>
+                  <a:pt x="0" y="0"/>
+                </a:moveTo>
+                <a:lnTo>
+                  <a:pt x="4875335" y="0"/>
+                </a:lnTo>
+                <a:lnTo>
+                  <a:pt x="4935375" y="69271"/>
+                </a:lnTo>
+                <a:cubicBezTo>
+                  <a:pt x="5645901" y="929100"/>
+                  <a:pt x="6085370" y="2116944"/>
+                  <a:pt x="6085370" y="3429000"/>
+                </a:cubicBezTo>
+                <a:cubicBezTo>
+                  <a:pt x="6085370" y="4741056"/>
+                  <a:pt x="5645901" y="5928900"/>
+                  <a:pt x="4935375" y="6788730"/>
+                </a:cubicBezTo>
+                <a:lnTo>
+                  <a:pt x="4875335" y="6858000"/>
+                </a:lnTo>
+                <a:lnTo>
+                  <a:pt x="0" y="6858000"/>
+                </a:lnTo>
+                <a:close/>
+              </a:path>
+            </a:pathLst>
+          </a:custGeom>
+          <a:ln w="9525">
+            <a:noFill/>
+          </a:ln>
+          <a:effectLst/>
+        </p:spPr>
+        <p:style>
+          <a:lnRef idx="2">
+            <a:schemeClr val="accent1">
+              <a:shade val="50000"/>
+            </a:schemeClr>
+          </a:lnRef>
+          <a:fillRef idx="1">
+            <a:schemeClr val="accent1"/>
+          </a:fillRef>
+          <a:effectRef idx="0">
+            <a:schemeClr val="accent1"/>
+          </a:effectRef>
+          <a:fontRef idx="minor">
+            <a:schemeClr val="lt1"/>
+          </a:fontRef>
+        </p:style>
+        <p:txBody>
+          <a:bodyPr wrap="square" rtlCol="0" anchor="ctr">
+            <a:noAutofit/>
+          </a:bodyPr>
+          <a:lstStyle/>
+          <a:p>
+            <a:pPr marL="0" marR="0" lvl="0" indent="0" algn="ctr" defTabSz="914400" rtl="0" eaLnBrk="1" fontAlgn="auto" latinLnBrk="0" hangingPunct="1">
+              <a:lnSpc>
+                <a:spcPct val="100000"/>
+              </a:lnSpc>
+              <a:spcBef>
+                <a:spcPts val="0"/>
+              </a:spcBef>
+              <a:spcAft>
+                <a:spcPts val="0"/>
+              </a:spcAft>
+              <a:buClrTx/>
+              <a:buSzTx/>
+              <a:buFontTx/>
+              <a:buNone/>
+              <a:tabLst/>
+              <a:defRPr/>
+            </a:pPr>
+            <a:endParaRPr kumimoji="0" lang="en-US" sz="1800" b="0" i="0" u="none" strike="noStrike" kern="1200" cap="none" spc="0" normalizeH="0" baseline="0" noProof="0">
+              <a:ln>
+                <a:noFill/>
+              </a:ln>
+              <a:solidFill>
+                <a:prstClr val="white"/>
+              </a:solidFill>
+              <a:effectLst/>
+              <a:uLnTx/>
+              <a:uFillTx/>
+              <a:latin typeface="Calibri" panose="020F0502020204030204"/>
+              <a:ea typeface="+mn-ea"/>
+              <a:cs typeface="+mn-cs"/>
+            </a:endParaRPr>
+          </a:p>
+        </p:txBody>
+      </p:sp>
+      <p:sp>
+        <p:nvSpPr>
+          <p:cNvPr id="2" name="Title 1">
+            <a:extLst>
+              <a:ext uri="{FF2B5EF4-FFF2-40B4-BE49-F238E27FC236}">
+                <a16:creationId xmlns:a16="http://schemas.microsoft.com/office/drawing/2014/main" id="{AA8476FD-ED7D-33A4-13B0-0560C0D3B77B}"/>
+              </a:ext>
+            </a:extLst>
+          </p:cNvPr>
+          <p:cNvSpPr>
+            <a:spLocks noGrp="1"/>
+          </p:cNvSpPr>
+          <p:nvPr>
+            <p:ph type="title"/>
+          </p:nvPr>
+        </p:nvSpPr>
+        <p:spPr>
+          <a:xfrm>
+            <a:off x="438913" y="859536"/>
+            <a:ext cx="4832802" cy="1170432"/>
+          </a:xfrm>
+        </p:spPr>
+        <p:txBody>
+          <a:bodyPr anchor="b">
+            <a:normAutofit/>
+          </a:bodyPr>
+          <a:lstStyle/>
+          <a:p>
+            <a:r>
+              <a:rPr lang="en-US" sz="3400" dirty="0"/>
+              <a:t>Coffee Shop Data</a:t>
+            </a:r>
+          </a:p>
+        </p:txBody>
+      </p:sp>
+      <p:sp>
+        <p:nvSpPr>
+          <p:cNvPr id="20" name="Rectangle 19">
+            <a:extLst>
+              <a:ext uri="{FF2B5EF4-FFF2-40B4-BE49-F238E27FC236}">
+                <a16:creationId xmlns:a16="http://schemas.microsoft.com/office/drawing/2014/main" id="{FBEC5A7A-ADE4-48D9-B89C-2BA1C9110632}"/>
+              </a:ext>
+              <a:ext uri="{C183D7F6-B498-43B3-948B-1728B52AA6E4}">
+                <adec:decorative xmlns:adec="http://schemas.microsoft.com/office/drawing/2017/decorative" val="1"/>
+              </a:ext>
+            </a:extLst>
+          </p:cNvPr>
+          <p:cNvSpPr>
+            <a:spLocks noGrp="1" noRot="1" noChangeAspect="1" noMove="1" noResize="1" noEditPoints="1" noAdjustHandles="1" noChangeArrowheads="1" noChangeShapeType="1" noTextEdit="1"/>
+          </p:cNvSpPr>
+          <p:nvPr>
+            <p:extLst>
+              <p:ext uri="{386F3935-93C4-4BCD-93E2-E3B085C9AB24}">
+                <p16:designElem xmlns:p16="http://schemas.microsoft.com/office/powerpoint/2015/main" val="1"/>
+              </p:ext>
+            </p:extLst>
+          </p:nvPr>
+        </p:nvSpPr>
+        <p:spPr>
+          <a:xfrm rot="5400000">
+            <a:off x="703236" y="363389"/>
+            <a:ext cx="73152" cy="548640"/>
+          </a:xfrm>
+          <a:prstGeom prst="rect">
+            <a:avLst/>
+          </a:prstGeom>
+          <a:solidFill>
+            <a:schemeClr val="accent2"/>
+          </a:solidFill>
+          <a:ln>
+            <a:noFill/>
+          </a:ln>
+        </p:spPr>
+        <p:style>
+          <a:lnRef idx="2">
+            <a:schemeClr val="accent1">
+              <a:shade val="50000"/>
+            </a:schemeClr>
+          </a:lnRef>
+          <a:fillRef idx="1">
+            <a:schemeClr val="accent1"/>
+          </a:fillRef>
+          <a:effectRef idx="0">
+            <a:schemeClr val="accent1"/>
+          </a:effectRef>
+          <a:fontRef idx="minor">
+            <a:schemeClr val="lt1"/>
+          </a:fontRef>
+        </p:style>
+        <p:txBody>
+          <a:bodyPr rtlCol="0" anchor="ctr"/>
+          <a:lstStyle/>
+          <a:p>
+            <a:pPr algn="ctr"/>
+            <a:endParaRPr lang="en-US">
+              <a:solidFill>
+                <a:prstClr val="white"/>
+              </a:solidFill>
+              <a:latin typeface="Calibri" panose="020F0502020204030204"/>
+            </a:endParaRPr>
+          </a:p>
+        </p:txBody>
+      </p:sp>
+      <p:sp>
+        <p:nvSpPr>
+          <p:cNvPr id="22" name="Rectangle 21">
+            <a:extLst>
+              <a:ext uri="{FF2B5EF4-FFF2-40B4-BE49-F238E27FC236}">
+                <a16:creationId xmlns:a16="http://schemas.microsoft.com/office/drawing/2014/main" id="{82095FCE-EF05-4443-B97A-85DEE3A5CA17}"/>
+              </a:ext>
+              <a:ext uri="{C183D7F6-B498-43B3-948B-1728B52AA6E4}">
+                <adec:decorative xmlns:adec="http://schemas.microsoft.com/office/drawing/2017/decorative" val="1"/>
+              </a:ext>
+            </a:extLst>
+          </p:cNvPr>
+          <p:cNvSpPr>
+            <a:spLocks noGrp="1" noRot="1" noChangeAspect="1" noMove="1" noResize="1" noEditPoints="1" noAdjustHandles="1" noChangeArrowheads="1" noChangeShapeType="1" noTextEdit="1"/>
+          </p:cNvSpPr>
+          <p:nvPr>
+            <p:extLst>
+              <p:ext uri="{386F3935-93C4-4BCD-93E2-E3B085C9AB24}">
+                <p16:designElem xmlns:p16="http://schemas.microsoft.com/office/powerpoint/2015/main" val="1"/>
+              </p:ext>
+            </p:extLst>
+          </p:nvPr>
+        </p:nvSpPr>
+        <p:spPr>
+          <a:xfrm>
+            <a:off x="465492" y="2185062"/>
+            <a:ext cx="4937760" cy="18288"/>
+          </a:xfrm>
+          <a:prstGeom prst="rect">
+            <a:avLst/>
+          </a:prstGeom>
+          <a:solidFill>
+            <a:srgbClr val="D5D5D5"/>
+          </a:solidFill>
+          <a:ln w="3175">
+            <a:noFill/>
+          </a:ln>
+          <a:effectLst/>
+        </p:spPr>
+        <p:style>
+          <a:lnRef idx="2">
+            <a:schemeClr val="accent1">
+              <a:shade val="50000"/>
+            </a:schemeClr>
+          </a:lnRef>
+          <a:fillRef idx="1">
+            <a:schemeClr val="accent1"/>
+          </a:fillRef>
+          <a:effectRef idx="0">
+            <a:schemeClr val="accent1"/>
+          </a:effectRef>
+          <a:fontRef idx="minor">
+            <a:schemeClr val="lt1"/>
+          </a:fontRef>
+        </p:style>
+        <p:txBody>
+          <a:bodyPr rtlCol="0" anchor="ctr"/>
+          <a:lstStyle/>
+          <a:p>
+            <a:pPr marL="0" marR="0" lvl="0" indent="0" algn="ctr" defTabSz="914400" rtl="0" eaLnBrk="1" fontAlgn="auto" latinLnBrk="0" hangingPunct="1">
+              <a:lnSpc>
+                <a:spcPct val="100000"/>
+              </a:lnSpc>
+              <a:spcBef>
+                <a:spcPts val="0"/>
+              </a:spcBef>
+              <a:spcAft>
+                <a:spcPts val="0"/>
+              </a:spcAft>
+              <a:buClrTx/>
+              <a:buSzTx/>
+              <a:buFontTx/>
+              <a:buNone/>
+              <a:tabLst/>
+              <a:defRPr/>
+            </a:pPr>
+            <a:endParaRPr kumimoji="0" lang="en-US" sz="1800" b="0" i="0" u="none" strike="noStrike" kern="1200" cap="none" spc="0" normalizeH="0" baseline="0" noProof="0">
+              <a:ln>
+                <a:noFill/>
+              </a:ln>
+              <a:solidFill>
+                <a:prstClr val="white"/>
+              </a:solidFill>
+              <a:effectLst/>
+              <a:uLnTx/>
+              <a:uFillTx/>
+              <a:latin typeface="Calibri" panose="020F0502020204030204"/>
+              <a:ea typeface="+mn-ea"/>
+              <a:cs typeface="+mn-cs"/>
+            </a:endParaRPr>
+          </a:p>
+        </p:txBody>
+      </p:sp>
+      <p:sp>
+        <p:nvSpPr>
+          <p:cNvPr id="11" name="Content Placeholder 10">
+            <a:extLst>
+              <a:ext uri="{FF2B5EF4-FFF2-40B4-BE49-F238E27FC236}">
+                <a16:creationId xmlns:a16="http://schemas.microsoft.com/office/drawing/2014/main" id="{D676152A-A8FD-283A-8776-E919A481B5D6}"/>
+              </a:ext>
+            </a:extLst>
+          </p:cNvPr>
+          <p:cNvSpPr>
+            <a:spLocks noGrp="1"/>
+          </p:cNvSpPr>
+          <p:nvPr>
+            <p:ph idx="1"/>
+          </p:nvPr>
+        </p:nvSpPr>
+        <p:spPr>
+          <a:xfrm>
+            <a:off x="438912" y="2512611"/>
+            <a:ext cx="4832803" cy="3664351"/>
+          </a:xfrm>
+        </p:spPr>
+        <p:txBody>
+          <a:bodyPr>
+            <a:normAutofit/>
+          </a:bodyPr>
+          <a:lstStyle/>
+          <a:p>
+            <a:pPr algn="l"/>
+            <a:r>
+              <a:rPr lang="en-US" sz="1400" dirty="0">
+                <a:latin typeface="+mj-lt"/>
+                <a:cs typeface="Nordique Inline" panose="020F0502020204030204" pitchFamily="34" charset="0"/>
+              </a:rPr>
+              <a:t>- Radius = 10 km</a:t>
+            </a:r>
+          </a:p>
+          <a:p>
+            <a:pPr algn="l"/>
+            <a:r>
+              <a:rPr lang="en-US" sz="1400" dirty="0">
+                <a:latin typeface="+mj-lt"/>
+                <a:cs typeface="Nordique Inline" panose="020F0502020204030204" pitchFamily="34" charset="0"/>
+              </a:rPr>
+              <a:t>- Using </a:t>
+            </a:r>
+            <a:r>
+              <a:rPr lang="en-US" sz="1400" dirty="0" err="1">
+                <a:latin typeface="+mj-lt"/>
+                <a:cs typeface="Nordique Inline" panose="020F0502020204030204" pitchFamily="34" charset="0"/>
+              </a:rPr>
+              <a:t>plot_linear_regression</a:t>
+            </a:r>
+            <a:r>
+              <a:rPr lang="en-US" sz="1400" dirty="0">
+                <a:latin typeface="+mj-lt"/>
+                <a:cs typeface="Nordique Inline" panose="020F0502020204030204" pitchFamily="34" charset="0"/>
+              </a:rPr>
+              <a:t>, it was found that the </a:t>
+            </a:r>
+            <a:r>
+              <a:rPr lang="en-US" sz="1400" dirty="0" err="1">
+                <a:latin typeface="+mj-lt"/>
+                <a:cs typeface="Nordique Inline" panose="020F0502020204030204" pitchFamily="34" charset="0"/>
+              </a:rPr>
+              <a:t>r-value</a:t>
+            </a:r>
+            <a:r>
+              <a:rPr lang="en-US" sz="1400" dirty="0">
+                <a:latin typeface="+mj-lt"/>
+                <a:cs typeface="Nordique Inline" panose="020F0502020204030204" pitchFamily="34" charset="0"/>
+              </a:rPr>
+              <a:t> is -0.25763.  This would indicate that coffee shops are not very strongly correlated to typical single-family home price.</a:t>
+            </a:r>
+          </a:p>
+        </p:txBody>
+      </p:sp>
+      <p:pic>
+        <p:nvPicPr>
+          <p:cNvPr id="5" name="Picture 4" descr="Chart, bar chart&#10;&#10;Description automatically generated">
+            <a:extLst>
+              <a:ext uri="{FF2B5EF4-FFF2-40B4-BE49-F238E27FC236}">
+                <a16:creationId xmlns:a16="http://schemas.microsoft.com/office/drawing/2014/main" id="{D362B25B-8C3B-153C-E724-5EF83758E1F3}"/>
+              </a:ext>
+            </a:extLst>
+          </p:cNvPr>
+          <p:cNvPicPr>
+            <a:picLocks noChangeAspect="1"/>
+          </p:cNvPicPr>
+          <p:nvPr/>
+        </p:nvPicPr>
+        <p:blipFill rotWithShape="1">
+          <a:blip r:embed="rId2"/>
+          <a:srcRect l="5926" r="5002"/>
+          <a:stretch/>
+        </p:blipFill>
+        <p:spPr>
+          <a:xfrm>
+            <a:off x="6402469" y="-1986"/>
+            <a:ext cx="4994275" cy="3587946"/>
+          </a:xfrm>
+          <a:prstGeom prst="rect">
+            <a:avLst/>
+          </a:prstGeom>
+        </p:spPr>
+      </p:pic>
+      <p:pic>
+        <p:nvPicPr>
+          <p:cNvPr id="6" name="Picture 5">
+            <a:extLst>
+              <a:ext uri="{FF2B5EF4-FFF2-40B4-BE49-F238E27FC236}">
+                <a16:creationId xmlns:a16="http://schemas.microsoft.com/office/drawing/2014/main" id="{4785DF16-B228-5B34-DDD9-B9FAF75132D3}"/>
+              </a:ext>
+            </a:extLst>
+          </p:cNvPr>
+          <p:cNvPicPr>
+            <a:picLocks noChangeAspect="1"/>
+          </p:cNvPicPr>
+          <p:nvPr/>
+        </p:nvPicPr>
+        <p:blipFill>
+          <a:blip r:embed="rId3"/>
+          <a:stretch>
+            <a:fillRect/>
+          </a:stretch>
+        </p:blipFill>
+        <p:spPr>
+          <a:xfrm>
+            <a:off x="6361823" y="3536265"/>
+            <a:ext cx="5194834" cy="3303002"/>
+          </a:xfrm>
+          <a:prstGeom prst="rect">
+            <a:avLst/>
+          </a:prstGeom>
+        </p:spPr>
+      </p:pic>
+    </p:spTree>
+    <p:extLst>
+      <p:ext uri="{BB962C8B-B14F-4D97-AF65-F5344CB8AC3E}">
+        <p14:creationId xmlns:p14="http://schemas.microsoft.com/office/powerpoint/2010/main" val="759800575"/>
+      </p:ext>
+    </p:extLst>
+  </p:cSld>
+  <p:clrMapOvr>
+    <a:masterClrMapping/>
+  </p:clrMapOvr>
+</p:sld>
+</file>
+
+<file path=ppt/slides/slide21.xml><?xml version="1.0" encoding="utf-8"?>
+<p:sld xmlns:a="http://schemas.openxmlformats.org/drawingml/2006/main" xmlns:r="http://schemas.openxmlformats.org/officeDocument/2006/relationships" xmlns:p="http://schemas.openxmlformats.org/presentationml/2006/main" show="0">
+  <p:cSld>
+    <p:spTree>
+      <p:nvGrpSpPr>
+        <p:cNvPr id="1" name=""/>
+        <p:cNvGrpSpPr/>
+        <p:nvPr/>
+      </p:nvGrpSpPr>
+      <p:grpSpPr>
+        <a:xfrm>
+          <a:off x="0" y="0"/>
+          <a:ext cx="0" cy="0"/>
+          <a:chOff x="0" y="0"/>
+          <a:chExt cx="0" cy="0"/>
+        </a:xfrm>
+      </p:grpSpPr>
+      <p:sp>
+        <p:nvSpPr>
+          <p:cNvPr id="3" name="Subtitle 2">
+            <a:extLst>
+              <a:ext uri="{FF2B5EF4-FFF2-40B4-BE49-F238E27FC236}">
+                <a16:creationId xmlns:a16="http://schemas.microsoft.com/office/drawing/2014/main" id="{64E58ADE-DE15-3AA7-F468-6C74AFCE2BCA}"/>
+              </a:ext>
+            </a:extLst>
+          </p:cNvPr>
+          <p:cNvSpPr>
+            <a:spLocks noGrp="1"/>
+          </p:cNvSpPr>
+          <p:nvPr>
+            <p:ph type="subTitle" idx="1"/>
+          </p:nvPr>
+        </p:nvSpPr>
+        <p:spPr>
+          <a:xfrm>
+            <a:off x="563596" y="4731026"/>
+            <a:ext cx="11064807" cy="1749286"/>
+          </a:xfrm>
+        </p:spPr>
+        <p:txBody>
+          <a:bodyPr>
+            <a:normAutofit/>
+          </a:bodyPr>
+          <a:lstStyle/>
+          <a:p>
+            <a:pPr algn="l"/>
+            <a:r>
+              <a:rPr lang="en-US" dirty="0"/>
+              <a:t>- Radius = 10 km</a:t>
+            </a:r>
+          </a:p>
+          <a:p>
+            <a:pPr algn="l"/>
+            <a:r>
+              <a:rPr lang="en-US" dirty="0"/>
+              <a:t>- Using </a:t>
+            </a:r>
+            <a:r>
+              <a:rPr lang="en-US" dirty="0" err="1"/>
+              <a:t>plot_linear_regression</a:t>
+            </a:r>
+            <a:r>
+              <a:rPr lang="en-US" dirty="0"/>
+              <a:t>, it was found that the </a:t>
+            </a:r>
+            <a:r>
+              <a:rPr lang="en-US" dirty="0" err="1"/>
+              <a:t>r-value</a:t>
+            </a:r>
+            <a:r>
+              <a:rPr lang="en-US" dirty="0"/>
+              <a:t> is -0.25763.  This would indicate that coffee shops are not very strongly correlated to typical single-family home price.</a:t>
+            </a:r>
+          </a:p>
+        </p:txBody>
+      </p:sp>
+      <p:pic>
+        <p:nvPicPr>
+          <p:cNvPr id="5" name="Picture 4" descr="Chart, bar chart&#10;&#10;Description automatically generated">
+            <a:extLst>
+              <a:ext uri="{FF2B5EF4-FFF2-40B4-BE49-F238E27FC236}">
+                <a16:creationId xmlns:a16="http://schemas.microsoft.com/office/drawing/2014/main" id="{52A79CB0-DA3C-2AA7-E53B-893E0D0A2071}"/>
+              </a:ext>
+            </a:extLst>
+          </p:cNvPr>
+          <p:cNvPicPr>
+            <a:picLocks noChangeAspect="1"/>
+          </p:cNvPicPr>
+          <p:nvPr/>
+        </p:nvPicPr>
+        <p:blipFill rotWithShape="1">
+          <a:blip r:embed="rId3"/>
+          <a:srcRect l="5926" r="5002"/>
+          <a:stretch/>
+        </p:blipFill>
+        <p:spPr>
+          <a:xfrm>
+            <a:off x="129211" y="128688"/>
+            <a:ext cx="5506275" cy="3955773"/>
+          </a:xfrm>
+          <a:prstGeom prst="rect">
+            <a:avLst/>
+          </a:prstGeom>
+        </p:spPr>
+      </p:pic>
+      <p:pic>
+        <p:nvPicPr>
+          <p:cNvPr id="9" name="Picture 8">
+            <a:extLst>
+              <a:ext uri="{FF2B5EF4-FFF2-40B4-BE49-F238E27FC236}">
+                <a16:creationId xmlns:a16="http://schemas.microsoft.com/office/drawing/2014/main" id="{34558095-D121-0AA9-5447-08D04CA3F1F3}"/>
+              </a:ext>
+            </a:extLst>
+          </p:cNvPr>
+          <p:cNvPicPr>
+            <a:picLocks noChangeAspect="1"/>
+          </p:cNvPicPr>
+          <p:nvPr/>
+        </p:nvPicPr>
+        <p:blipFill>
+          <a:blip r:embed="rId4"/>
+          <a:stretch>
+            <a:fillRect/>
+          </a:stretch>
+        </p:blipFill>
+        <p:spPr>
+          <a:xfrm>
+            <a:off x="5970513" y="128689"/>
+            <a:ext cx="6221487" cy="3955773"/>
+          </a:xfrm>
+          <a:prstGeom prst="rect">
+            <a:avLst/>
+          </a:prstGeom>
+        </p:spPr>
+      </p:pic>
+    </p:spTree>
+    <p:extLst>
+      <p:ext uri="{BB962C8B-B14F-4D97-AF65-F5344CB8AC3E}">
+        <p14:creationId xmlns:p14="http://schemas.microsoft.com/office/powerpoint/2010/main" val="4126349660"/>
       </p:ext>
     </p:extLst>
   </p:cSld>

</xml_diff>

<commit_message>
updated readme, personal presentation script, and made small visual updates to slide deck
</commit_message>
<xml_diff>
--- a/Slide_Deck.pptx
+++ b/Slide_Deck.pptx
@@ -17011,11 +17011,18 @@
           <a:p>
             <a:pPr algn="l"/>
             <a:r>
+              <a:rPr lang="en-US" sz="1400">
+                <a:latin typeface="+mj-lt"/>
+                <a:cs typeface="Nordique Inline" panose="020F0502020204030204" pitchFamily="34" charset="0"/>
+              </a:rPr>
+              <a:t>Radius </a:t>
+            </a:r>
+            <a:r>
               <a:rPr lang="en-US" sz="1400" dirty="0">
                 <a:latin typeface="+mj-lt"/>
                 <a:cs typeface="Nordique Inline" panose="020F0502020204030204" pitchFamily="34" charset="0"/>
               </a:rPr>
-              <a:t>- Radius = 10 km</a:t>
+              <a:t>= 10 km</a:t>
             </a:r>
           </a:p>
           <a:p>
@@ -17025,7 +17032,7 @@
                 <a:latin typeface="+mj-lt"/>
                 <a:cs typeface="Nordique Inline" panose="020F0502020204030204" pitchFamily="34" charset="0"/>
               </a:rPr>
-              <a:t>- Using </a:t>
+              <a:t>Using </a:t>
             </a:r>
             <a:r>
               <a:rPr lang="en-US" sz="1400" dirty="0" err="1">

</xml_diff>

<commit_message>
updated slide deck/removed old files
</commit_message>
<xml_diff>
--- a/Slide_Deck.pptx
+++ b/Slide_Deck.pptx
@@ -2062,7 +2062,7 @@
   <dgm:whole/>
   <dgm:extLst>
     <a:ext uri="http://schemas.microsoft.com/office/drawing/2008/diagram">
-      <dsp:dataModelExt xmlns:dsp="http://schemas.microsoft.com/office/drawing/2008/diagram" relId="rId6" minVer="http://schemas.openxmlformats.org/drawingml/2006/diagram"/>
+      <dsp:dataModelExt xmlns:dsp="http://schemas.microsoft.com/office/drawing/2008/diagram" relId="rId7" minVer="http://schemas.openxmlformats.org/drawingml/2006/diagram"/>
     </a:ext>
   </dgm:extLst>
 </dgm:dataModel>
@@ -5453,7 +5453,7 @@
           <a:p>
             <a:fld id="{FFFBAEDC-AF75-4BDD-978D-5D83F3B4ECCC}" type="datetimeFigureOut">
               <a:rPr lang="en-US" smtClean="0"/>
-              <a:t>4/6/23</a:t>
+              <a:t>4/9/2023</a:t>
             </a:fld>
             <a:endParaRPr lang="en-US"/>
           </a:p>
@@ -5764,7 +5764,18 @@
           <a:bodyPr/>
           <a:lstStyle/>
           <a:p>
-            <a:endParaRPr lang="en-US" dirty="0"/>
+            <a:r>
+              <a:rPr lang="en-US" dirty="0"/>
+              <a:t>This is the </a:t>
+            </a:r>
+            <a:r>
+              <a:rPr lang="en-US" dirty="0" err="1"/>
+              <a:t>df</a:t>
+            </a:r>
+            <a:r>
+              <a:rPr lang="en-US" dirty="0"/>
+              <a:t> after reading in the raw data (csv). Has data for every state at different geographic levels</a:t>
+            </a:r>
           </a:p>
         </p:txBody>
       </p:sp>
@@ -5783,6 +5794,657 @@
           <a:bodyPr/>
           <a:lstStyle/>
           <a:p>
+            <a:fld id="{A5852CD4-E4D6-4640-BF52-AD4B3041F0E7}" type="slidenum">
+              <a:rPr lang="en-US" smtClean="0"/>
+              <a:t>4</a:t>
+            </a:fld>
+            <a:endParaRPr lang="en-US"/>
+          </a:p>
+        </p:txBody>
+      </p:sp>
+    </p:spTree>
+    <p:extLst>
+      <p:ext uri="{BB962C8B-B14F-4D97-AF65-F5344CB8AC3E}">
+        <p14:creationId xmlns:p14="http://schemas.microsoft.com/office/powerpoint/2010/main" val="2196681292"/>
+      </p:ext>
+    </p:extLst>
+  </p:cSld>
+  <p:clrMapOvr>
+    <a:masterClrMapping/>
+  </p:clrMapOvr>
+</p:notes>
+</file>
+
+<file path=ppt/notesSlides/notesSlide2.xml><?xml version="1.0" encoding="utf-8"?>
+<p:notes xmlns:a="http://schemas.openxmlformats.org/drawingml/2006/main" xmlns:r="http://schemas.openxmlformats.org/officeDocument/2006/relationships" xmlns:p="http://schemas.openxmlformats.org/presentationml/2006/main">
+  <p:cSld>
+    <p:spTree>
+      <p:nvGrpSpPr>
+        <p:cNvPr id="1" name=""/>
+        <p:cNvGrpSpPr/>
+        <p:nvPr/>
+      </p:nvGrpSpPr>
+      <p:grpSpPr>
+        <a:xfrm>
+          <a:off x="0" y="0"/>
+          <a:ext cx="0" cy="0"/>
+          <a:chOff x="0" y="0"/>
+          <a:chExt cx="0" cy="0"/>
+        </a:xfrm>
+      </p:grpSpPr>
+      <p:sp>
+        <p:nvSpPr>
+          <p:cNvPr id="2" name="Slide Image Placeholder 1"/>
+          <p:cNvSpPr>
+            <a:spLocks noGrp="1" noRot="1" noChangeAspect="1"/>
+          </p:cNvSpPr>
+          <p:nvPr>
+            <p:ph type="sldImg"/>
+          </p:nvPr>
+        </p:nvSpPr>
+        <p:spPr/>
+      </p:sp>
+      <p:sp>
+        <p:nvSpPr>
+          <p:cNvPr id="3" name="Notes Placeholder 2"/>
+          <p:cNvSpPr>
+            <a:spLocks noGrp="1"/>
+          </p:cNvSpPr>
+          <p:nvPr>
+            <p:ph type="body" idx="1"/>
+          </p:nvPr>
+        </p:nvSpPr>
+        <p:spPr/>
+        <p:txBody>
+          <a:bodyPr/>
+          <a:lstStyle/>
+          <a:p>
+            <a:endParaRPr lang="en-US" dirty="0"/>
+          </a:p>
+        </p:txBody>
+      </p:sp>
+      <p:sp>
+        <p:nvSpPr>
+          <p:cNvPr id="4" name="Slide Number Placeholder 3"/>
+          <p:cNvSpPr>
+            <a:spLocks noGrp="1"/>
+          </p:cNvSpPr>
+          <p:nvPr>
+            <p:ph type="sldNum" sz="quarter" idx="5"/>
+          </p:nvPr>
+        </p:nvSpPr>
+        <p:spPr/>
+        <p:txBody>
+          <a:bodyPr/>
+          <a:lstStyle/>
+          <a:p>
+            <a:fld id="{A5852CD4-E4D6-4640-BF52-AD4B3041F0E7}" type="slidenum">
+              <a:rPr lang="en-US" smtClean="0"/>
+              <a:t>5</a:t>
+            </a:fld>
+            <a:endParaRPr lang="en-US"/>
+          </a:p>
+        </p:txBody>
+      </p:sp>
+    </p:spTree>
+    <p:extLst>
+      <p:ext uri="{BB962C8B-B14F-4D97-AF65-F5344CB8AC3E}">
+        <p14:creationId xmlns:p14="http://schemas.microsoft.com/office/powerpoint/2010/main" val="194049932"/>
+      </p:ext>
+    </p:extLst>
+  </p:cSld>
+  <p:clrMapOvr>
+    <a:masterClrMapping/>
+  </p:clrMapOvr>
+</p:notes>
+</file>
+
+<file path=ppt/notesSlides/notesSlide3.xml><?xml version="1.0" encoding="utf-8"?>
+<p:notes xmlns:a="http://schemas.openxmlformats.org/drawingml/2006/main" xmlns:r="http://schemas.openxmlformats.org/officeDocument/2006/relationships" xmlns:p="http://schemas.openxmlformats.org/presentationml/2006/main">
+  <p:cSld>
+    <p:spTree>
+      <p:nvGrpSpPr>
+        <p:cNvPr id="1" name=""/>
+        <p:cNvGrpSpPr/>
+        <p:nvPr/>
+      </p:nvGrpSpPr>
+      <p:grpSpPr>
+        <a:xfrm>
+          <a:off x="0" y="0"/>
+          <a:ext cx="0" cy="0"/>
+          <a:chOff x="0" y="0"/>
+          <a:chExt cx="0" cy="0"/>
+        </a:xfrm>
+      </p:grpSpPr>
+      <p:sp>
+        <p:nvSpPr>
+          <p:cNvPr id="2" name="Slide Image Placeholder 1"/>
+          <p:cNvSpPr>
+            <a:spLocks noGrp="1" noRot="1" noChangeAspect="1"/>
+          </p:cNvSpPr>
+          <p:nvPr>
+            <p:ph type="sldImg"/>
+          </p:nvPr>
+        </p:nvSpPr>
+        <p:spPr/>
+      </p:sp>
+      <p:sp>
+        <p:nvSpPr>
+          <p:cNvPr id="3" name="Notes Placeholder 2"/>
+          <p:cNvSpPr>
+            <a:spLocks noGrp="1"/>
+          </p:cNvSpPr>
+          <p:nvPr>
+            <p:ph type="body" idx="1"/>
+          </p:nvPr>
+        </p:nvSpPr>
+        <p:spPr/>
+        <p:txBody>
+          <a:bodyPr/>
+          <a:lstStyle/>
+          <a:p>
+            <a:r>
+              <a:rPr lang="en-US" dirty="0"/>
+              <a:t>This is our </a:t>
+            </a:r>
+            <a:r>
+              <a:rPr lang="en-US" dirty="0" err="1"/>
+              <a:t>df</a:t>
+            </a:r>
+            <a:r>
+              <a:rPr lang="en-US" dirty="0"/>
+              <a:t> after cleaning it up. We grabbed only the most recent entries for Home value for our comparisons. 02/31/23</a:t>
+            </a:r>
+          </a:p>
+        </p:txBody>
+      </p:sp>
+      <p:sp>
+        <p:nvSpPr>
+          <p:cNvPr id="4" name="Slide Number Placeholder 3"/>
+          <p:cNvSpPr>
+            <a:spLocks noGrp="1"/>
+          </p:cNvSpPr>
+          <p:nvPr>
+            <p:ph type="sldNum" sz="quarter" idx="5"/>
+          </p:nvPr>
+        </p:nvSpPr>
+        <p:spPr/>
+        <p:txBody>
+          <a:bodyPr/>
+          <a:lstStyle/>
+          <a:p>
+            <a:fld id="{A5852CD4-E4D6-4640-BF52-AD4B3041F0E7}" type="slidenum">
+              <a:rPr lang="en-US" smtClean="0"/>
+              <a:t>6</a:t>
+            </a:fld>
+            <a:endParaRPr lang="en-US"/>
+          </a:p>
+        </p:txBody>
+      </p:sp>
+    </p:spTree>
+    <p:extLst>
+      <p:ext uri="{BB962C8B-B14F-4D97-AF65-F5344CB8AC3E}">
+        <p14:creationId xmlns:p14="http://schemas.microsoft.com/office/powerpoint/2010/main" val="687158072"/>
+      </p:ext>
+    </p:extLst>
+  </p:cSld>
+  <p:clrMapOvr>
+    <a:masterClrMapping/>
+  </p:clrMapOvr>
+</p:notes>
+</file>
+
+<file path=ppt/notesSlides/notesSlide4.xml><?xml version="1.0" encoding="utf-8"?>
+<p:notes xmlns:a="http://schemas.openxmlformats.org/drawingml/2006/main" xmlns:r="http://schemas.openxmlformats.org/officeDocument/2006/relationships" xmlns:p="http://schemas.openxmlformats.org/presentationml/2006/main">
+  <p:cSld>
+    <p:spTree>
+      <p:nvGrpSpPr>
+        <p:cNvPr id="1" name=""/>
+        <p:cNvGrpSpPr/>
+        <p:nvPr/>
+      </p:nvGrpSpPr>
+      <p:grpSpPr>
+        <a:xfrm>
+          <a:off x="0" y="0"/>
+          <a:ext cx="0" cy="0"/>
+          <a:chOff x="0" y="0"/>
+          <a:chExt cx="0" cy="0"/>
+        </a:xfrm>
+      </p:grpSpPr>
+      <p:sp>
+        <p:nvSpPr>
+          <p:cNvPr id="2" name="Slide Image Placeholder 1"/>
+          <p:cNvSpPr>
+            <a:spLocks noGrp="1" noRot="1" noChangeAspect="1"/>
+          </p:cNvSpPr>
+          <p:nvPr>
+            <p:ph type="sldImg"/>
+          </p:nvPr>
+        </p:nvSpPr>
+        <p:spPr/>
+      </p:sp>
+      <p:sp>
+        <p:nvSpPr>
+          <p:cNvPr id="3" name="Notes Placeholder 2"/>
+          <p:cNvSpPr>
+            <a:spLocks noGrp="1"/>
+          </p:cNvSpPr>
+          <p:nvPr>
+            <p:ph type="body" idx="1"/>
+          </p:nvPr>
+        </p:nvSpPr>
+        <p:spPr/>
+        <p:txBody>
+          <a:bodyPr/>
+          <a:lstStyle/>
+          <a:p>
+            <a:r>
+              <a:rPr lang="en-US" dirty="0"/>
+              <a:t>Used for loop and </a:t>
+            </a:r>
+            <a:r>
+              <a:rPr lang="en-US" dirty="0" err="1"/>
+              <a:t>df</a:t>
+            </a:r>
+            <a:r>
+              <a:rPr lang="en-US" dirty="0"/>
+              <a:t> to get cords for each city</a:t>
+            </a:r>
+          </a:p>
+        </p:txBody>
+      </p:sp>
+      <p:sp>
+        <p:nvSpPr>
+          <p:cNvPr id="4" name="Slide Number Placeholder 3"/>
+          <p:cNvSpPr>
+            <a:spLocks noGrp="1"/>
+          </p:cNvSpPr>
+          <p:nvPr>
+            <p:ph type="sldNum" sz="quarter" idx="5"/>
+          </p:nvPr>
+        </p:nvSpPr>
+        <p:spPr/>
+        <p:txBody>
+          <a:bodyPr/>
+          <a:lstStyle/>
+          <a:p>
+            <a:fld id="{A5852CD4-E4D6-4640-BF52-AD4B3041F0E7}" type="slidenum">
+              <a:rPr lang="en-US" smtClean="0"/>
+              <a:t>7</a:t>
+            </a:fld>
+            <a:endParaRPr lang="en-US"/>
+          </a:p>
+        </p:txBody>
+      </p:sp>
+    </p:spTree>
+    <p:extLst>
+      <p:ext uri="{BB962C8B-B14F-4D97-AF65-F5344CB8AC3E}">
+        <p14:creationId xmlns:p14="http://schemas.microsoft.com/office/powerpoint/2010/main" val="1330553941"/>
+      </p:ext>
+    </p:extLst>
+  </p:cSld>
+  <p:clrMapOvr>
+    <a:masterClrMapping/>
+  </p:clrMapOvr>
+</p:notes>
+</file>
+
+<file path=ppt/notesSlides/notesSlide5.xml><?xml version="1.0" encoding="utf-8"?>
+<p:notes xmlns:a="http://schemas.openxmlformats.org/drawingml/2006/main" xmlns:r="http://schemas.openxmlformats.org/officeDocument/2006/relationships" xmlns:p="http://schemas.openxmlformats.org/presentationml/2006/main">
+  <p:cSld>
+    <p:spTree>
+      <p:nvGrpSpPr>
+        <p:cNvPr id="1" name=""/>
+        <p:cNvGrpSpPr/>
+        <p:nvPr/>
+      </p:nvGrpSpPr>
+      <p:grpSpPr>
+        <a:xfrm>
+          <a:off x="0" y="0"/>
+          <a:ext cx="0" cy="0"/>
+          <a:chOff x="0" y="0"/>
+          <a:chExt cx="0" cy="0"/>
+        </a:xfrm>
+      </p:grpSpPr>
+      <p:sp>
+        <p:nvSpPr>
+          <p:cNvPr id="2" name="Slide Image Placeholder 1"/>
+          <p:cNvSpPr>
+            <a:spLocks noGrp="1" noRot="1" noChangeAspect="1"/>
+          </p:cNvSpPr>
+          <p:nvPr>
+            <p:ph type="sldImg"/>
+          </p:nvPr>
+        </p:nvSpPr>
+        <p:spPr/>
+      </p:sp>
+      <p:sp>
+        <p:nvSpPr>
+          <p:cNvPr id="3" name="Notes Placeholder 2"/>
+          <p:cNvSpPr>
+            <a:spLocks noGrp="1"/>
+          </p:cNvSpPr>
+          <p:nvPr>
+            <p:ph type="body" idx="1"/>
+          </p:nvPr>
+        </p:nvSpPr>
+        <p:spPr/>
+        <p:txBody>
+          <a:bodyPr/>
+          <a:lstStyle/>
+          <a:p>
+            <a:r>
+              <a:rPr lang="en-US" dirty="0"/>
+              <a:t>-We should have bought houses 10 years ago. </a:t>
+            </a:r>
+          </a:p>
+          <a:p>
+            <a:r>
+              <a:rPr lang="en-US" dirty="0"/>
+              <a:t>-All of the CO cities kind of follow the same pattern</a:t>
+            </a:r>
+          </a:p>
+          <a:p>
+            <a:r>
+              <a:rPr lang="en-US" dirty="0"/>
+              <a:t>-Frisco + Breck are outliers</a:t>
+            </a:r>
+          </a:p>
+        </p:txBody>
+      </p:sp>
+      <p:sp>
+        <p:nvSpPr>
+          <p:cNvPr id="4" name="Slide Number Placeholder 3"/>
+          <p:cNvSpPr>
+            <a:spLocks noGrp="1"/>
+          </p:cNvSpPr>
+          <p:nvPr>
+            <p:ph type="sldNum" sz="quarter" idx="5"/>
+          </p:nvPr>
+        </p:nvSpPr>
+        <p:spPr/>
+        <p:txBody>
+          <a:bodyPr/>
+          <a:lstStyle/>
+          <a:p>
+            <a:fld id="{A5852CD4-E4D6-4640-BF52-AD4B3041F0E7}" type="slidenum">
+              <a:rPr lang="en-US" smtClean="0"/>
+              <a:t>8</a:t>
+            </a:fld>
+            <a:endParaRPr lang="en-US"/>
+          </a:p>
+        </p:txBody>
+      </p:sp>
+    </p:spTree>
+    <p:extLst>
+      <p:ext uri="{BB962C8B-B14F-4D97-AF65-F5344CB8AC3E}">
+        <p14:creationId xmlns:p14="http://schemas.microsoft.com/office/powerpoint/2010/main" val="1071277244"/>
+      </p:ext>
+    </p:extLst>
+  </p:cSld>
+  <p:clrMapOvr>
+    <a:masterClrMapping/>
+  </p:clrMapOvr>
+</p:notes>
+</file>
+
+<file path=ppt/notesSlides/notesSlide6.xml><?xml version="1.0" encoding="utf-8"?>
+<p:notes xmlns:a="http://schemas.openxmlformats.org/drawingml/2006/main" xmlns:r="http://schemas.openxmlformats.org/officeDocument/2006/relationships" xmlns:p="http://schemas.openxmlformats.org/presentationml/2006/main">
+  <p:cSld>
+    <p:spTree>
+      <p:nvGrpSpPr>
+        <p:cNvPr id="1" name=""/>
+        <p:cNvGrpSpPr/>
+        <p:nvPr/>
+      </p:nvGrpSpPr>
+      <p:grpSpPr>
+        <a:xfrm>
+          <a:off x="0" y="0"/>
+          <a:ext cx="0" cy="0"/>
+          <a:chOff x="0" y="0"/>
+          <a:chExt cx="0" cy="0"/>
+        </a:xfrm>
+      </p:grpSpPr>
+      <p:sp>
+        <p:nvSpPr>
+          <p:cNvPr id="2" name="Slide Image Placeholder 1"/>
+          <p:cNvSpPr>
+            <a:spLocks noGrp="1" noRot="1" noChangeAspect="1"/>
+          </p:cNvSpPr>
+          <p:nvPr>
+            <p:ph type="sldImg"/>
+          </p:nvPr>
+        </p:nvSpPr>
+        <p:spPr/>
+      </p:sp>
+      <p:sp>
+        <p:nvSpPr>
+          <p:cNvPr id="3" name="Notes Placeholder 2"/>
+          <p:cNvSpPr>
+            <a:spLocks noGrp="1"/>
+          </p:cNvSpPr>
+          <p:nvPr>
+            <p:ph type="body" idx="1"/>
+          </p:nvPr>
+        </p:nvSpPr>
+        <p:spPr/>
+        <p:txBody>
+          <a:bodyPr/>
+          <a:lstStyle/>
+          <a:p>
+            <a:r>
+              <a:rPr lang="en-US" dirty="0"/>
+              <a:t>Used pandas </a:t>
+            </a:r>
+            <a:r>
+              <a:rPr lang="en-US" dirty="0" err="1"/>
+              <a:t>read_html</a:t>
+            </a:r>
+            <a:r>
+              <a:rPr lang="en-US" dirty="0"/>
+              <a:t>() to get cat list</a:t>
+            </a:r>
+          </a:p>
+          <a:p>
+            <a:r>
+              <a:rPr lang="en-US" dirty="0"/>
+              <a:t>Sea??</a:t>
+            </a:r>
+          </a:p>
+          <a:p>
+            <a:r>
+              <a:rPr lang="en-US" dirty="0"/>
+              <a:t>Strongest positive correlations are nature related</a:t>
+            </a:r>
+          </a:p>
+          <a:p>
+            <a:endParaRPr lang="en-US" dirty="0"/>
+          </a:p>
+        </p:txBody>
+      </p:sp>
+      <p:sp>
+        <p:nvSpPr>
+          <p:cNvPr id="4" name="Slide Number Placeholder 3"/>
+          <p:cNvSpPr>
+            <a:spLocks noGrp="1"/>
+          </p:cNvSpPr>
+          <p:nvPr>
+            <p:ph type="sldNum" sz="quarter" idx="5"/>
+          </p:nvPr>
+        </p:nvSpPr>
+        <p:spPr/>
+        <p:txBody>
+          <a:bodyPr/>
+          <a:lstStyle/>
+          <a:p>
+            <a:fld id="{A5852CD4-E4D6-4640-BF52-AD4B3041F0E7}" type="slidenum">
+              <a:rPr lang="en-US" smtClean="0"/>
+              <a:t>9</a:t>
+            </a:fld>
+            <a:endParaRPr lang="en-US"/>
+          </a:p>
+        </p:txBody>
+      </p:sp>
+    </p:spTree>
+    <p:extLst>
+      <p:ext uri="{BB962C8B-B14F-4D97-AF65-F5344CB8AC3E}">
+        <p14:creationId xmlns:p14="http://schemas.microsoft.com/office/powerpoint/2010/main" val="3371332885"/>
+      </p:ext>
+    </p:extLst>
+  </p:cSld>
+  <p:clrMapOvr>
+    <a:masterClrMapping/>
+  </p:clrMapOvr>
+</p:notes>
+</file>
+
+<file path=ppt/notesSlides/notesSlide7.xml><?xml version="1.0" encoding="utf-8"?>
+<p:notes xmlns:a="http://schemas.openxmlformats.org/drawingml/2006/main" xmlns:r="http://schemas.openxmlformats.org/officeDocument/2006/relationships" xmlns:p="http://schemas.openxmlformats.org/presentationml/2006/main">
+  <p:cSld>
+    <p:spTree>
+      <p:nvGrpSpPr>
+        <p:cNvPr id="1" name=""/>
+        <p:cNvGrpSpPr/>
+        <p:nvPr/>
+      </p:nvGrpSpPr>
+      <p:grpSpPr>
+        <a:xfrm>
+          <a:off x="0" y="0"/>
+          <a:ext cx="0" cy="0"/>
+          <a:chOff x="0" y="0"/>
+          <a:chExt cx="0" cy="0"/>
+        </a:xfrm>
+      </p:grpSpPr>
+      <p:sp>
+        <p:nvSpPr>
+          <p:cNvPr id="2" name="Slide Image Placeholder 1"/>
+          <p:cNvSpPr>
+            <a:spLocks noGrp="1" noRot="1" noChangeAspect="1"/>
+          </p:cNvSpPr>
+          <p:nvPr>
+            <p:ph type="sldImg"/>
+          </p:nvPr>
+        </p:nvSpPr>
+        <p:spPr/>
+      </p:sp>
+      <p:sp>
+        <p:nvSpPr>
+          <p:cNvPr id="3" name="Notes Placeholder 2"/>
+          <p:cNvSpPr>
+            <a:spLocks noGrp="1"/>
+          </p:cNvSpPr>
+          <p:nvPr>
+            <p:ph type="body" idx="1"/>
+          </p:nvPr>
+        </p:nvSpPr>
+        <p:spPr/>
+        <p:txBody>
+          <a:bodyPr/>
+          <a:lstStyle/>
+          <a:p>
+            <a:endParaRPr lang="en-US"/>
+          </a:p>
+        </p:txBody>
+      </p:sp>
+      <p:sp>
+        <p:nvSpPr>
+          <p:cNvPr id="4" name="Slide Number Placeholder 3"/>
+          <p:cNvSpPr>
+            <a:spLocks noGrp="1"/>
+          </p:cNvSpPr>
+          <p:nvPr>
+            <p:ph type="sldNum" sz="quarter" idx="5"/>
+          </p:nvPr>
+        </p:nvSpPr>
+        <p:spPr/>
+        <p:txBody>
+          <a:bodyPr/>
+          <a:lstStyle/>
+          <a:p>
+            <a:fld id="{A5852CD4-E4D6-4640-BF52-AD4B3041F0E7}" type="slidenum">
+              <a:rPr lang="en-US" smtClean="0"/>
+              <a:t>11</a:t>
+            </a:fld>
+            <a:endParaRPr lang="en-US"/>
+          </a:p>
+        </p:txBody>
+      </p:sp>
+    </p:spTree>
+    <p:extLst>
+      <p:ext uri="{BB962C8B-B14F-4D97-AF65-F5344CB8AC3E}">
+        <p14:creationId xmlns:p14="http://schemas.microsoft.com/office/powerpoint/2010/main" val="2103441859"/>
+      </p:ext>
+    </p:extLst>
+  </p:cSld>
+  <p:clrMapOvr>
+    <a:masterClrMapping/>
+  </p:clrMapOvr>
+</p:notes>
+</file>
+
+<file path=ppt/notesSlides/notesSlide8.xml><?xml version="1.0" encoding="utf-8"?>
+<p:notes xmlns:a="http://schemas.openxmlformats.org/drawingml/2006/main" xmlns:r="http://schemas.openxmlformats.org/officeDocument/2006/relationships" xmlns:p="http://schemas.openxmlformats.org/presentationml/2006/main">
+  <p:cSld>
+    <p:spTree>
+      <p:nvGrpSpPr>
+        <p:cNvPr id="1" name=""/>
+        <p:cNvGrpSpPr/>
+        <p:nvPr/>
+      </p:nvGrpSpPr>
+      <p:grpSpPr>
+        <a:xfrm>
+          <a:off x="0" y="0"/>
+          <a:ext cx="0" cy="0"/>
+          <a:chOff x="0" y="0"/>
+          <a:chExt cx="0" cy="0"/>
+        </a:xfrm>
+      </p:grpSpPr>
+      <p:sp>
+        <p:nvSpPr>
+          <p:cNvPr id="2" name="Slide Image Placeholder 1"/>
+          <p:cNvSpPr>
+            <a:spLocks noGrp="1" noRot="1" noChangeAspect="1"/>
+          </p:cNvSpPr>
+          <p:nvPr>
+            <p:ph type="sldImg"/>
+          </p:nvPr>
+        </p:nvSpPr>
+        <p:spPr/>
+      </p:sp>
+      <p:sp>
+        <p:nvSpPr>
+          <p:cNvPr id="3" name="Notes Placeholder 2"/>
+          <p:cNvSpPr>
+            <a:spLocks noGrp="1"/>
+          </p:cNvSpPr>
+          <p:nvPr>
+            <p:ph type="body" idx="1"/>
+          </p:nvPr>
+        </p:nvSpPr>
+        <p:spPr/>
+        <p:txBody>
+          <a:bodyPr/>
+          <a:lstStyle/>
+          <a:p>
+            <a:endParaRPr lang="en-US" dirty="0"/>
+          </a:p>
+        </p:txBody>
+      </p:sp>
+      <p:sp>
+        <p:nvSpPr>
+          <p:cNvPr id="4" name="Slide Number Placeholder 3"/>
+          <p:cNvSpPr>
+            <a:spLocks noGrp="1"/>
+          </p:cNvSpPr>
+          <p:nvPr>
+            <p:ph type="sldNum" sz="quarter" idx="5"/>
+          </p:nvPr>
+        </p:nvSpPr>
+        <p:spPr/>
+        <p:txBody>
+          <a:bodyPr/>
+          <a:lstStyle/>
+          <a:p>
             <a:fld id="{81877F35-DD72-4AEE-98C4-BACA01E52352}" type="slidenum">
               <a:rPr lang="en-US" smtClean="0"/>
               <a:t>16</a:t>
@@ -5804,7 +6466,7 @@
 </p:notes>
 </file>
 
-<file path=ppt/notesSlides/notesSlide2.xml><?xml version="1.0" encoding="utf-8"?>
+<file path=ppt/notesSlides/notesSlide9.xml><?xml version="1.0" encoding="utf-8"?>
 <p:notes xmlns:a="http://schemas.openxmlformats.org/drawingml/2006/main" xmlns:r="http://schemas.openxmlformats.org/officeDocument/2006/relationships" xmlns:p="http://schemas.openxmlformats.org/presentationml/2006/main">
   <p:cSld>
     <p:spTree>
@@ -6035,7 +6697,7 @@
           <a:p>
             <a:fld id="{F3E3D61B-7364-4AC2-9DB3-C4410285676E}" type="datetimeFigureOut">
               <a:rPr lang="en-US" smtClean="0"/>
-              <a:t>4/6/23</a:t>
+              <a:t>4/9/2023</a:t>
             </a:fld>
             <a:endParaRPr lang="en-US"/>
           </a:p>
@@ -6233,7 +6895,7 @@
           <a:p>
             <a:fld id="{F3E3D61B-7364-4AC2-9DB3-C4410285676E}" type="datetimeFigureOut">
               <a:rPr lang="en-US" smtClean="0"/>
-              <a:t>4/6/23</a:t>
+              <a:t>4/9/2023</a:t>
             </a:fld>
             <a:endParaRPr lang="en-US"/>
           </a:p>
@@ -6441,7 +7103,7 @@
           <a:p>
             <a:fld id="{F3E3D61B-7364-4AC2-9DB3-C4410285676E}" type="datetimeFigureOut">
               <a:rPr lang="en-US" smtClean="0"/>
-              <a:t>4/6/23</a:t>
+              <a:t>4/9/2023</a:t>
             </a:fld>
             <a:endParaRPr lang="en-US"/>
           </a:p>
@@ -6639,7 +7301,7 @@
           <a:p>
             <a:fld id="{F3E3D61B-7364-4AC2-9DB3-C4410285676E}" type="datetimeFigureOut">
               <a:rPr lang="en-US" smtClean="0"/>
-              <a:t>4/6/23</a:t>
+              <a:t>4/9/2023</a:t>
             </a:fld>
             <a:endParaRPr lang="en-US"/>
           </a:p>
@@ -6914,7 +7576,7 @@
           <a:p>
             <a:fld id="{F3E3D61B-7364-4AC2-9DB3-C4410285676E}" type="datetimeFigureOut">
               <a:rPr lang="en-US" smtClean="0"/>
-              <a:t>4/6/23</a:t>
+              <a:t>4/9/2023</a:t>
             </a:fld>
             <a:endParaRPr lang="en-US"/>
           </a:p>
@@ -7179,7 +7841,7 @@
           <a:p>
             <a:fld id="{F3E3D61B-7364-4AC2-9DB3-C4410285676E}" type="datetimeFigureOut">
               <a:rPr lang="en-US" smtClean="0"/>
-              <a:t>4/6/23</a:t>
+              <a:t>4/9/2023</a:t>
             </a:fld>
             <a:endParaRPr lang="en-US"/>
           </a:p>
@@ -7591,7 +8253,7 @@
           <a:p>
             <a:fld id="{F3E3D61B-7364-4AC2-9DB3-C4410285676E}" type="datetimeFigureOut">
               <a:rPr lang="en-US" smtClean="0"/>
-              <a:t>4/6/23</a:t>
+              <a:t>4/9/2023</a:t>
             </a:fld>
             <a:endParaRPr lang="en-US"/>
           </a:p>
@@ -7732,7 +8394,7 @@
           <a:p>
             <a:fld id="{F3E3D61B-7364-4AC2-9DB3-C4410285676E}" type="datetimeFigureOut">
               <a:rPr lang="en-US" smtClean="0"/>
-              <a:t>4/6/23</a:t>
+              <a:t>4/9/2023</a:t>
             </a:fld>
             <a:endParaRPr lang="en-US"/>
           </a:p>
@@ -7845,7 +8507,7 @@
           <a:p>
             <a:fld id="{F3E3D61B-7364-4AC2-9DB3-C4410285676E}" type="datetimeFigureOut">
               <a:rPr lang="en-US" smtClean="0"/>
-              <a:t>4/6/23</a:t>
+              <a:t>4/9/2023</a:t>
             </a:fld>
             <a:endParaRPr lang="en-US"/>
           </a:p>
@@ -8156,7 +8818,7 @@
           <a:p>
             <a:fld id="{F3E3D61B-7364-4AC2-9DB3-C4410285676E}" type="datetimeFigureOut">
               <a:rPr lang="en-US" smtClean="0"/>
-              <a:t>4/6/23</a:t>
+              <a:t>4/9/2023</a:t>
             </a:fld>
             <a:endParaRPr lang="en-US"/>
           </a:p>
@@ -8444,7 +9106,7 @@
           <a:p>
             <a:fld id="{F3E3D61B-7364-4AC2-9DB3-C4410285676E}" type="datetimeFigureOut">
               <a:rPr lang="en-US" smtClean="0"/>
-              <a:t>4/6/23</a:t>
+              <a:t>4/9/2023</a:t>
             </a:fld>
             <a:endParaRPr lang="en-US"/>
           </a:p>
@@ -8685,7 +9347,7 @@
           <a:p>
             <a:fld id="{F3E3D61B-7364-4AC2-9DB3-C4410285676E}" type="datetimeFigureOut">
               <a:rPr lang="en-US" smtClean="0"/>
-              <a:t>4/6/23</a:t>
+              <a:t>4/9/2023</a:t>
             </a:fld>
             <a:endParaRPr lang="en-US"/>
           </a:p>
@@ -12542,7 +13204,7 @@
           <p:nvPr/>
         </p:nvPicPr>
         <p:blipFill rotWithShape="1">
-          <a:blip r:embed="rId2"/>
+          <a:blip r:embed="rId3"/>
           <a:srcRect l="8625" r="11269"/>
           <a:stretch/>
         </p:blipFill>
@@ -12571,7 +13233,7 @@
           <p:nvPr/>
         </p:nvPicPr>
         <p:blipFill rotWithShape="1">
-          <a:blip r:embed="rId3"/>
+          <a:blip r:embed="rId4"/>
           <a:srcRect l="8366" r="17350"/>
           <a:stretch/>
         </p:blipFill>
@@ -17743,7 +18405,7 @@
                 <a:effectLst/>
                 <a:latin typeface="Roboto" panose="02000000000000000000" pitchFamily="2" charset="0"/>
               </a:rPr>
-              <a:t>We got our home data from Zillow Research Data</a:t>
+              <a:t>We got our home data from Zillow Research &amp; Data</a:t>
             </a:r>
           </a:p>
           <a:p>
@@ -17762,7 +18424,7 @@
               <a:rPr lang="en-US" sz="1800" dirty="0">
                 <a:latin typeface="Roboto" panose="02000000000000000000" pitchFamily="2" charset="0"/>
               </a:rPr>
-              <a:t>The data set uses Zillow Home Value Index (ZHVI) to describe the typical home price at different geographical levels</a:t>
+              <a:t>The data set uses the Zillow Home Value Index (ZHVI) to describe the typical home price at different geographical levels</a:t>
             </a:r>
           </a:p>
           <a:p>
@@ -18479,7 +19141,7 @@
           <p:nvPr/>
         </p:nvPicPr>
         <p:blipFill>
-          <a:blip r:embed="rId2"/>
+          <a:blip r:embed="rId3"/>
           <a:stretch>
             <a:fillRect/>
           </a:stretch>
@@ -19145,7 +19807,7 @@
         </p:xfrm>
         <a:graphic>
           <a:graphicData uri="http://schemas.openxmlformats.org/drawingml/2006/diagram">
-            <dgm:relIds xmlns:dgm="http://schemas.openxmlformats.org/drawingml/2006/diagram" xmlns:r="http://schemas.openxmlformats.org/officeDocument/2006/relationships" r:dm="rId2" r:lo="rId3" r:qs="rId4" r:cs="rId5"/>
+            <dgm:relIds xmlns:dgm="http://schemas.openxmlformats.org/drawingml/2006/diagram" xmlns:r="http://schemas.openxmlformats.org/officeDocument/2006/relationships" r:dm="rId3" r:lo="rId4" r:qs="rId5" r:cs="rId6"/>
           </a:graphicData>
         </a:graphic>
       </p:graphicFrame>
@@ -19164,7 +19826,7 @@
           <p:nvPr/>
         </p:nvPicPr>
         <p:blipFill>
-          <a:blip r:embed="rId7"/>
+          <a:blip r:embed="rId8"/>
           <a:stretch>
             <a:fillRect/>
           </a:stretch>
@@ -19194,7 +19856,7 @@
           <p:nvPr/>
         </p:nvPicPr>
         <p:blipFill>
-          <a:blip r:embed="rId8"/>
+          <a:blip r:embed="rId9"/>
           <a:stretch>
             <a:fillRect/>
           </a:stretch>
@@ -19224,7 +19886,7 @@
           <p:nvPr/>
         </p:nvPicPr>
         <p:blipFill>
-          <a:blip r:embed="rId9"/>
+          <a:blip r:embed="rId10"/>
           <a:stretch>
             <a:fillRect/>
           </a:stretch>
@@ -19880,7 +20542,7 @@
           </p:nvPr>
         </p:nvPicPr>
         <p:blipFill>
-          <a:blip r:embed="rId2"/>
+          <a:blip r:embed="rId3"/>
           <a:stretch>
             <a:fillRect/>
           </a:stretch>
@@ -20066,7 +20728,7 @@
           <p:nvPr/>
         </p:nvPicPr>
         <p:blipFill rotWithShape="1">
-          <a:blip r:embed="rId2"/>
+          <a:blip r:embed="rId3"/>
           <a:srcRect l="20618" r="28449"/>
           <a:stretch/>
         </p:blipFill>
@@ -20837,7 +21499,7 @@
           <p:nvPr/>
         </p:nvPicPr>
         <p:blipFill>
-          <a:blip r:embed="rId2"/>
+          <a:blip r:embed="rId3"/>
           <a:stretch>
             <a:fillRect/>
           </a:stretch>
@@ -21118,13 +21780,13 @@
           </p:nvPr>
         </p:nvPicPr>
         <p:blipFill>
-          <a:blip r:embed="rId2">
+          <a:blip r:embed="rId3">
             <a:extLst>
               <a:ext uri="{28A0092B-C50C-407E-A947-70E740481C1C}">
                 <a14:useLocalDpi xmlns:a14="http://schemas.microsoft.com/office/drawing/2010/main" val="0"/>
               </a:ext>
               <a:ext uri="{96DAC541-7B7A-43D3-8B79-37D633B846F1}">
-                <asvg:svgBlip xmlns:asvg="http://schemas.microsoft.com/office/drawing/2016/SVG/main" r:embed="rId3"/>
+                <asvg:svgBlip xmlns:asvg="http://schemas.microsoft.com/office/drawing/2016/SVG/main" r:embed="rId4"/>
               </a:ext>
             </a:extLst>
           </a:blip>
@@ -21315,7 +21977,7 @@
           <p:nvPr/>
         </p:nvPicPr>
         <p:blipFill>
-          <a:blip r:embed="rId4"/>
+          <a:blip r:embed="rId5"/>
           <a:stretch>
             <a:fillRect/>
           </a:stretch>
@@ -21345,7 +22007,7 @@
           <p:nvPr/>
         </p:nvPicPr>
         <p:blipFill>
-          <a:blip r:embed="rId5"/>
+          <a:blip r:embed="rId6"/>
           <a:stretch>
             <a:fillRect/>
           </a:stretch>

</xml_diff>